<commit_message>
API Cleanup, custom exception handling, updated presentation
</commit_message>
<xml_diff>
--- a/presentation/rest-api-json-graphing.pptx
+++ b/presentation/rest-api-json-graphing.pptx
@@ -8,17 +8,18 @@
     <p:sldId id="256" r:id="rId2"/>
     <p:sldId id="257" r:id="rId3"/>
     <p:sldId id="258" r:id="rId4"/>
-    <p:sldId id="259" r:id="rId5"/>
-    <p:sldId id="260" r:id="rId6"/>
-    <p:sldId id="261" r:id="rId7"/>
-    <p:sldId id="262" r:id="rId8"/>
-    <p:sldId id="269" r:id="rId9"/>
-    <p:sldId id="263" r:id="rId10"/>
-    <p:sldId id="264" r:id="rId11"/>
-    <p:sldId id="265" r:id="rId12"/>
-    <p:sldId id="266" r:id="rId13"/>
-    <p:sldId id="267" r:id="rId14"/>
-    <p:sldId id="268" r:id="rId15"/>
+    <p:sldId id="260" r:id="rId5"/>
+    <p:sldId id="261" r:id="rId6"/>
+    <p:sldId id="259" r:id="rId7"/>
+    <p:sldId id="270" r:id="rId8"/>
+    <p:sldId id="262" r:id="rId9"/>
+    <p:sldId id="269" r:id="rId10"/>
+    <p:sldId id="263" r:id="rId11"/>
+    <p:sldId id="264" r:id="rId12"/>
+    <p:sldId id="265" r:id="rId13"/>
+    <p:sldId id="266" r:id="rId14"/>
+    <p:sldId id="267" r:id="rId15"/>
+    <p:sldId id="268" r:id="rId16"/>
   </p:sldIdLst>
   <p:sldSz cx="12192000" cy="6858000"/>
   <p:notesSz cx="6858000" cy="9144000"/>
@@ -276,7 +277,7 @@
           <a:p>
             <a:fld id="{BE6EE1F1-89EF-4B99-8B75-ED2C5A1BA4D9}" type="datetimeFigureOut">
               <a:rPr lang="en-US" smtClean="0"/>
-              <a:t>2/15/2018</a:t>
+              <a:t>2/16/2018</a:t>
             </a:fld>
             <a:endParaRPr lang="en-US"/>
           </a:p>
@@ -474,7 +475,7 @@
           <a:p>
             <a:fld id="{BE6EE1F1-89EF-4B99-8B75-ED2C5A1BA4D9}" type="datetimeFigureOut">
               <a:rPr lang="en-US" smtClean="0"/>
-              <a:t>2/15/2018</a:t>
+              <a:t>2/16/2018</a:t>
             </a:fld>
             <a:endParaRPr lang="en-US"/>
           </a:p>
@@ -682,7 +683,7 @@
           <a:p>
             <a:fld id="{BE6EE1F1-89EF-4B99-8B75-ED2C5A1BA4D9}" type="datetimeFigureOut">
               <a:rPr lang="en-US" smtClean="0"/>
-              <a:t>2/15/2018</a:t>
+              <a:t>2/16/2018</a:t>
             </a:fld>
             <a:endParaRPr lang="en-US"/>
           </a:p>
@@ -880,7 +881,7 @@
           <a:p>
             <a:fld id="{BE6EE1F1-89EF-4B99-8B75-ED2C5A1BA4D9}" type="datetimeFigureOut">
               <a:rPr lang="en-US" smtClean="0"/>
-              <a:t>2/15/2018</a:t>
+              <a:t>2/16/2018</a:t>
             </a:fld>
             <a:endParaRPr lang="en-US"/>
           </a:p>
@@ -1155,7 +1156,7 @@
           <a:p>
             <a:fld id="{BE6EE1F1-89EF-4B99-8B75-ED2C5A1BA4D9}" type="datetimeFigureOut">
               <a:rPr lang="en-US" smtClean="0"/>
-              <a:t>2/15/2018</a:t>
+              <a:t>2/16/2018</a:t>
             </a:fld>
             <a:endParaRPr lang="en-US"/>
           </a:p>
@@ -1420,7 +1421,7 @@
           <a:p>
             <a:fld id="{BE6EE1F1-89EF-4B99-8B75-ED2C5A1BA4D9}" type="datetimeFigureOut">
               <a:rPr lang="en-US" smtClean="0"/>
-              <a:t>2/15/2018</a:t>
+              <a:t>2/16/2018</a:t>
             </a:fld>
             <a:endParaRPr lang="en-US"/>
           </a:p>
@@ -1832,7 +1833,7 @@
           <a:p>
             <a:fld id="{BE6EE1F1-89EF-4B99-8B75-ED2C5A1BA4D9}" type="datetimeFigureOut">
               <a:rPr lang="en-US" smtClean="0"/>
-              <a:t>2/15/2018</a:t>
+              <a:t>2/16/2018</a:t>
             </a:fld>
             <a:endParaRPr lang="en-US"/>
           </a:p>
@@ -1973,7 +1974,7 @@
           <a:p>
             <a:fld id="{BE6EE1F1-89EF-4B99-8B75-ED2C5A1BA4D9}" type="datetimeFigureOut">
               <a:rPr lang="en-US" smtClean="0"/>
-              <a:t>2/15/2018</a:t>
+              <a:t>2/16/2018</a:t>
             </a:fld>
             <a:endParaRPr lang="en-US"/>
           </a:p>
@@ -2086,7 +2087,7 @@
           <a:p>
             <a:fld id="{BE6EE1F1-89EF-4B99-8B75-ED2C5A1BA4D9}" type="datetimeFigureOut">
               <a:rPr lang="en-US" smtClean="0"/>
-              <a:t>2/15/2018</a:t>
+              <a:t>2/16/2018</a:t>
             </a:fld>
             <a:endParaRPr lang="en-US"/>
           </a:p>
@@ -2397,7 +2398,7 @@
           <a:p>
             <a:fld id="{BE6EE1F1-89EF-4B99-8B75-ED2C5A1BA4D9}" type="datetimeFigureOut">
               <a:rPr lang="en-US" smtClean="0"/>
-              <a:t>2/15/2018</a:t>
+              <a:t>2/16/2018</a:t>
             </a:fld>
             <a:endParaRPr lang="en-US"/>
           </a:p>
@@ -2685,7 +2686,7 @@
           <a:p>
             <a:fld id="{BE6EE1F1-89EF-4B99-8B75-ED2C5A1BA4D9}" type="datetimeFigureOut">
               <a:rPr lang="en-US" smtClean="0"/>
-              <a:t>2/15/2018</a:t>
+              <a:t>2/16/2018</a:t>
             </a:fld>
             <a:endParaRPr lang="en-US"/>
           </a:p>
@@ -2926,7 +2927,7 @@
           <a:p>
             <a:fld id="{BE6EE1F1-89EF-4B99-8B75-ED2C5A1BA4D9}" type="datetimeFigureOut">
               <a:rPr lang="en-US" smtClean="0"/>
-              <a:t>2/15/2018</a:t>
+              <a:t>2/16/2018</a:t>
             </a:fld>
             <a:endParaRPr lang="en-US"/>
           </a:p>
@@ -3448,6 +3449,184 @@
           <p:cNvPr id="2" name="Title 1">
             <a:extLst>
               <a:ext uri="{FF2B5EF4-FFF2-40B4-BE49-F238E27FC236}">
+                <a16:creationId xmlns:a16="http://schemas.microsoft.com/office/drawing/2014/main" id="{7596F920-6BF9-47D1-A0DA-0D717C6A3BA5}"/>
+              </a:ext>
+            </a:extLst>
+          </p:cNvPr>
+          <p:cNvSpPr>
+            <a:spLocks noGrp="1"/>
+          </p:cNvSpPr>
+          <p:nvPr>
+            <p:ph type="title"/>
+          </p:nvPr>
+        </p:nvSpPr>
+        <p:spPr/>
+        <p:txBody>
+          <a:bodyPr/>
+          <a:lstStyle/>
+          <a:p>
+            <a:r>
+              <a:rPr lang="en-US" dirty="0"/>
+              <a:t>JSON vs XML comparison</a:t>
+            </a:r>
+          </a:p>
+        </p:txBody>
+      </p:sp>
+      <p:sp>
+        <p:nvSpPr>
+          <p:cNvPr id="3" name="Text Placeholder 2">
+            <a:extLst>
+              <a:ext uri="{FF2B5EF4-FFF2-40B4-BE49-F238E27FC236}">
+                <a16:creationId xmlns:a16="http://schemas.microsoft.com/office/drawing/2014/main" id="{D5DB56BA-0641-4B84-9F77-6AE210C8D1AE}"/>
+              </a:ext>
+            </a:extLst>
+          </p:cNvPr>
+          <p:cNvSpPr>
+            <a:spLocks noGrp="1"/>
+          </p:cNvSpPr>
+          <p:nvPr>
+            <p:ph type="body" idx="1"/>
+          </p:nvPr>
+        </p:nvSpPr>
+        <p:spPr/>
+        <p:txBody>
+          <a:bodyPr/>
+          <a:lstStyle/>
+          <a:p>
+            <a:r>
+              <a:rPr lang="en-US" dirty="0"/>
+              <a:t>JSON</a:t>
+            </a:r>
+          </a:p>
+        </p:txBody>
+      </p:sp>
+      <p:pic>
+        <p:nvPicPr>
+          <p:cNvPr id="9" name="Content Placeholder 8">
+            <a:extLst>
+              <a:ext uri="{FF2B5EF4-FFF2-40B4-BE49-F238E27FC236}">
+                <a16:creationId xmlns:a16="http://schemas.microsoft.com/office/drawing/2014/main" id="{12E86F51-B57D-40DC-BEC8-7FEA4665AB76}"/>
+              </a:ext>
+            </a:extLst>
+          </p:cNvPr>
+          <p:cNvPicPr>
+            <a:picLocks noGrp="1" noChangeAspect="1"/>
+          </p:cNvPicPr>
+          <p:nvPr>
+            <p:ph sz="half" idx="2"/>
+          </p:nvPr>
+        </p:nvPicPr>
+        <p:blipFill>
+          <a:blip r:embed="rId2"/>
+          <a:stretch>
+            <a:fillRect/>
+          </a:stretch>
+        </p:blipFill>
+        <p:spPr>
+          <a:xfrm>
+            <a:off x="839788" y="2699544"/>
+            <a:ext cx="3048000" cy="3295650"/>
+          </a:xfrm>
+          <a:prstGeom prst="rect">
+            <a:avLst/>
+          </a:prstGeom>
+        </p:spPr>
+      </p:pic>
+      <p:sp>
+        <p:nvSpPr>
+          <p:cNvPr id="5" name="Text Placeholder 4">
+            <a:extLst>
+              <a:ext uri="{FF2B5EF4-FFF2-40B4-BE49-F238E27FC236}">
+                <a16:creationId xmlns:a16="http://schemas.microsoft.com/office/drawing/2014/main" id="{55CE5A3A-9316-4AEE-8327-BF9A990E954B}"/>
+              </a:ext>
+            </a:extLst>
+          </p:cNvPr>
+          <p:cNvSpPr>
+            <a:spLocks noGrp="1"/>
+          </p:cNvSpPr>
+          <p:nvPr>
+            <p:ph type="body" sz="quarter" idx="3"/>
+          </p:nvPr>
+        </p:nvSpPr>
+        <p:spPr/>
+        <p:txBody>
+          <a:bodyPr/>
+          <a:lstStyle/>
+          <a:p>
+            <a:r>
+              <a:rPr lang="en-US" dirty="0"/>
+              <a:t>XML</a:t>
+            </a:r>
+          </a:p>
+        </p:txBody>
+      </p:sp>
+      <p:pic>
+        <p:nvPicPr>
+          <p:cNvPr id="10" name="Content Placeholder 9">
+            <a:extLst>
+              <a:ext uri="{FF2B5EF4-FFF2-40B4-BE49-F238E27FC236}">
+                <a16:creationId xmlns:a16="http://schemas.microsoft.com/office/drawing/2014/main" id="{6C7843B1-E8A2-4F81-8A10-CBB1B7573092}"/>
+              </a:ext>
+            </a:extLst>
+          </p:cNvPr>
+          <p:cNvPicPr>
+            <a:picLocks noGrp="1" noChangeAspect="1"/>
+          </p:cNvPicPr>
+          <p:nvPr>
+            <p:ph sz="quarter" idx="4"/>
+          </p:nvPr>
+        </p:nvPicPr>
+        <p:blipFill>
+          <a:blip r:embed="rId3"/>
+          <a:stretch>
+            <a:fillRect/>
+          </a:stretch>
+        </p:blipFill>
+        <p:spPr>
+          <a:xfrm>
+            <a:off x="6172200" y="2832894"/>
+            <a:ext cx="3409950" cy="3028950"/>
+          </a:xfrm>
+          <a:prstGeom prst="rect">
+            <a:avLst/>
+          </a:prstGeom>
+        </p:spPr>
+      </p:pic>
+    </p:spTree>
+    <p:extLst>
+      <p:ext uri="{BB962C8B-B14F-4D97-AF65-F5344CB8AC3E}">
+        <p14:creationId xmlns:p14="http://schemas.microsoft.com/office/powerpoint/2010/main" val="943815495"/>
+      </p:ext>
+    </p:extLst>
+  </p:cSld>
+  <p:clrMapOvr>
+    <a:masterClrMapping/>
+  </p:clrMapOvr>
+</p:sld>
+</file>
+
+<file path=ppt/slides/slide11.xml><?xml version="1.0" encoding="utf-8"?>
+<p:sld xmlns:a="http://schemas.openxmlformats.org/drawingml/2006/main" xmlns:r="http://schemas.openxmlformats.org/officeDocument/2006/relationships" xmlns:p="http://schemas.openxmlformats.org/presentationml/2006/main">
+  <p:cSld>
+    <p:spTree>
+      <p:nvGrpSpPr>
+        <p:cNvPr id="1" name=""/>
+        <p:cNvGrpSpPr/>
+        <p:nvPr/>
+      </p:nvGrpSpPr>
+      <p:grpSpPr>
+        <a:xfrm>
+          <a:off x="0" y="0"/>
+          <a:ext cx="0" cy="0"/>
+          <a:chOff x="0" y="0"/>
+          <a:chExt cx="0" cy="0"/>
+        </a:xfrm>
+      </p:grpSpPr>
+      <p:sp>
+        <p:nvSpPr>
+          <p:cNvPr id="2" name="Title 1">
+            <a:extLst>
+              <a:ext uri="{FF2B5EF4-FFF2-40B4-BE49-F238E27FC236}">
                 <a16:creationId xmlns:a16="http://schemas.microsoft.com/office/drawing/2014/main" id="{E0F21451-C318-4D6A-ABB4-042E8B141C8B}"/>
               </a:ext>
             </a:extLst>
@@ -3466,8 +3645,13 @@
           <a:p>
             <a:r>
               <a:rPr lang="en-US" dirty="0"/>
-              <a:t>Example REST Call</a:t>
-            </a:r>
+              <a:t>Example REST Call using </a:t>
+            </a:r>
+            <a:r>
+              <a:rPr lang="en-US" dirty="0" err="1"/>
+              <a:t>cURL</a:t>
+            </a:r>
+            <a:endParaRPr lang="en-US" dirty="0"/>
           </a:p>
         </p:txBody>
       </p:sp>
@@ -3559,7 +3743,7 @@
             </a:pPr>
             <a:r>
               <a:rPr lang="en-US" dirty="0"/>
-              <a:t>Congrats! You just accessed a REST API</a:t>
+              <a:t>Congrats! You just accessed a REST API!</a:t>
             </a:r>
           </a:p>
           <a:p>
@@ -3613,7 +3797,7 @@
 </p:sld>
 </file>
 
-<file path=ppt/slides/slide11.xml><?xml version="1.0" encoding="utf-8"?>
+<file path=ppt/slides/slide12.xml><?xml version="1.0" encoding="utf-8"?>
 <p:sld xmlns:a="http://schemas.openxmlformats.org/drawingml/2006/main" xmlns:r="http://schemas.openxmlformats.org/officeDocument/2006/relationships" xmlns:p="http://schemas.openxmlformats.org/presentationml/2006/main">
   <p:cSld>
     <p:spTree>
@@ -3699,7 +3883,7 @@
 </p:sld>
 </file>
 
-<file path=ppt/slides/slide12.xml><?xml version="1.0" encoding="utf-8"?>
+<file path=ppt/slides/slide13.xml><?xml version="1.0" encoding="utf-8"?>
 <p:sld xmlns:a="http://schemas.openxmlformats.org/drawingml/2006/main" xmlns:r="http://schemas.openxmlformats.org/officeDocument/2006/relationships" xmlns:p="http://schemas.openxmlformats.org/presentationml/2006/main">
   <p:cSld>
     <p:spTree>
@@ -3821,7 +4005,7 @@
 </p:sld>
 </file>
 
-<file path=ppt/slides/slide13.xml><?xml version="1.0" encoding="utf-8"?>
+<file path=ppt/slides/slide14.xml><?xml version="1.0" encoding="utf-8"?>
 <p:sld xmlns:a="http://schemas.openxmlformats.org/drawingml/2006/main" xmlns:r="http://schemas.openxmlformats.org/officeDocument/2006/relationships" xmlns:p="http://schemas.openxmlformats.org/presentationml/2006/main">
   <p:cSld>
     <p:spTree>
@@ -3928,7 +4112,7 @@
 </p:sld>
 </file>
 
-<file path=ppt/slides/slide14.xml><?xml version="1.0" encoding="utf-8"?>
+<file path=ppt/slides/slide15.xml><?xml version="1.0" encoding="utf-8"?>
 <p:sld xmlns:a="http://schemas.openxmlformats.org/drawingml/2006/main" xmlns:r="http://schemas.openxmlformats.org/officeDocument/2006/relationships" xmlns:p="http://schemas.openxmlformats.org/presentationml/2006/main">
   <p:cSld>
     <p:spTree>
@@ -4386,12 +4570,32 @@
           <a:lstStyle/>
           <a:p>
             <a:r>
+              <a:rPr lang="en-US" b="1" dirty="0" err="1"/>
+              <a:t>RE</a:t>
+            </a:r>
+            <a:r>
               <a:rPr lang="en-US" dirty="0" err="1"/>
-              <a:t>REpresentational</a:t>
-            </a:r>
-            <a:r>
-              <a:rPr lang="en-US" dirty="0"/>
-              <a:t> State Transfer (REST)</a:t>
+              <a:t>presentational</a:t>
+            </a:r>
+            <a:r>
+              <a:rPr lang="en-US" dirty="0"/>
+              <a:t> </a:t>
+            </a:r>
+            <a:r>
+              <a:rPr lang="en-US" b="1" dirty="0"/>
+              <a:t>S</a:t>
+            </a:r>
+            <a:r>
+              <a:rPr lang="en-US" dirty="0"/>
+              <a:t>tate </a:t>
+            </a:r>
+            <a:r>
+              <a:rPr lang="en-US" b="1" dirty="0"/>
+              <a:t>T</a:t>
+            </a:r>
+            <a:r>
+              <a:rPr lang="en-US" dirty="0"/>
+              <a:t>ransfer (REST)</a:t>
             </a:r>
           </a:p>
           <a:p>
@@ -4418,15 +4622,7 @@
           <a:p>
             <a:r>
               <a:rPr lang="en-US" dirty="0"/>
-              <a:t>Client/Server – no </a:t>
-            </a:r>
-            <a:r>
-              <a:rPr lang="en-US" dirty="0" err="1"/>
-              <a:t>dependencey</a:t>
-            </a:r>
-            <a:r>
-              <a:rPr lang="en-US" dirty="0"/>
-              <a:t> between each other</a:t>
+              <a:t>Client/Server – no dependency between each other</a:t>
             </a:r>
           </a:p>
           <a:p>
@@ -4484,7 +4680,7 @@
           <p:cNvPr id="2" name="Title 1">
             <a:extLst>
               <a:ext uri="{FF2B5EF4-FFF2-40B4-BE49-F238E27FC236}">
-                <a16:creationId xmlns:a16="http://schemas.microsoft.com/office/drawing/2014/main" id="{93A12AE6-E689-4B0B-A037-C639EC6231F2}"/>
+                <a16:creationId xmlns:a16="http://schemas.microsoft.com/office/drawing/2014/main" id="{B72D55D4-007F-4DDF-A765-7149095DB9E6}"/>
               </a:ext>
             </a:extLst>
           </p:cNvPr>
@@ -4502,7 +4698,7 @@
           <a:p>
             <a:r>
               <a:rPr lang="en-US" dirty="0"/>
-              <a:t>HTTP Request Methods</a:t>
+              <a:t>REST APIs</a:t>
             </a:r>
           </a:p>
         </p:txBody>
@@ -4512,7 +4708,7 @@
           <p:cNvPr id="3" name="Content Placeholder 2">
             <a:extLst>
               <a:ext uri="{FF2B5EF4-FFF2-40B4-BE49-F238E27FC236}">
-                <a16:creationId xmlns:a16="http://schemas.microsoft.com/office/drawing/2014/main" id="{52EF77AE-F9AB-433C-9AC2-B505129A28E0}"/>
+                <a16:creationId xmlns:a16="http://schemas.microsoft.com/office/drawing/2014/main" id="{330438BD-4938-4B65-B5C8-D9EDA468B39F}"/>
               </a:ext>
             </a:extLst>
           </p:cNvPr>
@@ -4526,80 +4722,97 @@
         <p:spPr/>
         <p:txBody>
           <a:bodyPr>
-            <a:normAutofit/>
+            <a:normAutofit fontScale="92500" lnSpcReduction="20000"/>
           </a:bodyPr>
           <a:lstStyle/>
           <a:p>
             <a:r>
               <a:rPr lang="en-US" dirty="0"/>
-              <a:t>Methods:</a:t>
+              <a:t>API – Application Program Interface</a:t>
+            </a:r>
+          </a:p>
+          <a:p>
+            <a:r>
+              <a:rPr lang="en-US" dirty="0"/>
+              <a:t>HTTP request methods used to interact</a:t>
+            </a:r>
+          </a:p>
+          <a:p>
+            <a:r>
+              <a:rPr lang="en-US" dirty="0"/>
+              <a:t>Used for retrieving and modifying data</a:t>
+            </a:r>
+          </a:p>
+          <a:p>
+            <a:r>
+              <a:rPr lang="en-US" dirty="0"/>
+              <a:t>Pros:</a:t>
             </a:r>
           </a:p>
           <a:p>
             <a:pPr lvl="1"/>
             <a:r>
               <a:rPr lang="en-US" dirty="0"/>
-              <a:t>GET – request information – idempotent</a:t>
+              <a:t>Standard method of communication</a:t>
             </a:r>
           </a:p>
           <a:p>
             <a:pPr lvl="1"/>
             <a:r>
               <a:rPr lang="en-US" dirty="0"/>
-              <a:t>POST – submit information</a:t>
+              <a:t>Programming language-agnostic ; use the best tool for the job</a:t>
             </a:r>
           </a:p>
           <a:p>
             <a:pPr lvl="1"/>
             <a:r>
               <a:rPr lang="en-US" dirty="0"/>
-              <a:t>PUT – replace a resource</a:t>
+              <a:t>Neither the server nor the client is dependent on each other</a:t>
             </a:r>
           </a:p>
           <a:p>
             <a:pPr lvl="1"/>
             <a:r>
               <a:rPr lang="en-US" dirty="0"/>
-              <a:t>PATCH – partially modify a resource</a:t>
+              <a:t>Simple to secure</a:t>
             </a:r>
           </a:p>
           <a:p>
             <a:pPr lvl="1"/>
             <a:r>
               <a:rPr lang="en-US" dirty="0"/>
-              <a:t>DELETE – delete a resource</a:t>
+              <a:t>Can use without writing code (</a:t>
+            </a:r>
+            <a:r>
+              <a:rPr lang="en-US" dirty="0" err="1"/>
+              <a:t>cURL</a:t>
+            </a:r>
+            <a:r>
+              <a:rPr lang="en-US" dirty="0"/>
+              <a:t>)</a:t>
             </a:r>
           </a:p>
           <a:p>
             <a:pPr lvl="1"/>
             <a:r>
               <a:rPr lang="en-US" dirty="0"/>
-              <a:t>HEAD, CONNECT, OPTIONS, TRACE – additional methods</a:t>
+              <a:t>Securable</a:t>
+            </a:r>
+          </a:p>
+          <a:p>
+            <a:r>
+              <a:rPr lang="en-US" dirty="0"/>
+              <a:t>Cons:</a:t>
             </a:r>
           </a:p>
           <a:p>
             <a:pPr lvl="1"/>
-            <a:endParaRPr lang="en-US" dirty="0"/>
-          </a:p>
-          <a:p>
-            <a:r>
-              <a:rPr lang="en-US" dirty="0"/>
-              <a:t>Mirrors:</a:t>
-            </a:r>
-          </a:p>
-          <a:p>
-            <a:pPr lvl="1"/>
-            <a:r>
-              <a:rPr lang="en-US" dirty="0"/>
-              <a:t>Create (POST), Read (GET), Update (PUT/PATCH), Delete (DELETE)</a:t>
-            </a:r>
-          </a:p>
-          <a:p>
-            <a:pPr lvl="1"/>
-            <a:endParaRPr lang="en-US" dirty="0"/>
-          </a:p>
-          <a:p>
-            <a:pPr lvl="1"/>
+            <a:r>
+              <a:rPr lang="en-US" dirty="0"/>
+              <a:t>??</a:t>
+            </a:r>
+          </a:p>
+          <a:p>
             <a:endParaRPr lang="en-US" dirty="0"/>
           </a:p>
         </p:txBody>
@@ -4607,7 +4820,7 @@
     </p:spTree>
     <p:extLst>
       <p:ext uri="{BB962C8B-B14F-4D97-AF65-F5344CB8AC3E}">
-        <p14:creationId xmlns:p14="http://schemas.microsoft.com/office/powerpoint/2010/main" val="2050633878"/>
+        <p14:creationId xmlns:p14="http://schemas.microsoft.com/office/powerpoint/2010/main" val="3272526947"/>
       </p:ext>
     </p:extLst>
   </p:cSld>
@@ -4639,7 +4852,7 @@
           <p:cNvPr id="2" name="Title 1">
             <a:extLst>
               <a:ext uri="{FF2B5EF4-FFF2-40B4-BE49-F238E27FC236}">
-                <a16:creationId xmlns:a16="http://schemas.microsoft.com/office/drawing/2014/main" id="{B72D55D4-007F-4DDF-A765-7149095DB9E6}"/>
+                <a16:creationId xmlns:a16="http://schemas.microsoft.com/office/drawing/2014/main" id="{4668879E-16D8-41E3-9496-B4144A3A21A6}"/>
               </a:ext>
             </a:extLst>
           </p:cNvPr>
@@ -4657,7 +4870,7 @@
           <a:p>
             <a:r>
               <a:rPr lang="en-US" dirty="0"/>
-              <a:t>REST APIs</a:t>
+              <a:t>REST Alternatives</a:t>
             </a:r>
           </a:p>
         </p:txBody>
@@ -4667,7 +4880,7 @@
           <p:cNvPr id="3" name="Content Placeholder 2">
             <a:extLst>
               <a:ext uri="{FF2B5EF4-FFF2-40B4-BE49-F238E27FC236}">
-                <a16:creationId xmlns:a16="http://schemas.microsoft.com/office/drawing/2014/main" id="{330438BD-4938-4B65-B5C8-D9EDA468B39F}"/>
+                <a16:creationId xmlns:a16="http://schemas.microsoft.com/office/drawing/2014/main" id="{07E266C7-EB9C-4B6F-8AD8-601CE4EFED2F}"/>
               </a:ext>
             </a:extLst>
           </p:cNvPr>
@@ -4687,99 +4900,85 @@
           <a:p>
             <a:r>
               <a:rPr lang="en-US" dirty="0"/>
-              <a:t>API – Application Program Interface</a:t>
-            </a:r>
-          </a:p>
-          <a:p>
-            <a:r>
-              <a:rPr lang="en-US" dirty="0"/>
-              <a:t>HTTP request methods used to interact</a:t>
-            </a:r>
-          </a:p>
-          <a:p>
-            <a:r>
-              <a:rPr lang="en-US" dirty="0"/>
-              <a:t>Used for retrieving and modifying data</a:t>
-            </a:r>
-          </a:p>
-          <a:p>
-            <a:r>
-              <a:rPr lang="en-US" dirty="0"/>
-              <a:t>Pros:</a:t>
+              <a:t>SOAP (Simple Object Access Protocol)</a:t>
             </a:r>
           </a:p>
           <a:p>
             <a:pPr lvl="1"/>
             <a:r>
               <a:rPr lang="en-US" dirty="0"/>
-              <a:t>Standard method of communication</a:t>
+              <a:t>XML-based, no JSON support</a:t>
             </a:r>
           </a:p>
           <a:p>
             <a:pPr lvl="1"/>
             <a:r>
               <a:rPr lang="en-US" dirty="0"/>
-              <a:t>Programming language-agnostic ; use the best tool for the job</a:t>
+              <a:t>Generally slower, uses more bandwidth, rapidly going out of style</a:t>
             </a:r>
           </a:p>
           <a:p>
             <a:pPr lvl="1"/>
             <a:r>
               <a:rPr lang="en-US" dirty="0"/>
-              <a:t>Neither the server nor the client is dependent on each other</a:t>
+              <a:t>Not fun to use</a:t>
+            </a:r>
+          </a:p>
+          <a:p>
+            <a:pPr marL="457200" lvl="1" indent="0">
+              <a:buNone/>
+            </a:pPr>
+            <a:endParaRPr lang="en-US" dirty="0"/>
+          </a:p>
+          <a:p>
+            <a:r>
+              <a:rPr lang="en-US" dirty="0"/>
+              <a:t>RPC (Remote Procedure Calls)</a:t>
             </a:r>
           </a:p>
           <a:p>
             <a:pPr lvl="1"/>
             <a:r>
               <a:rPr lang="en-US" dirty="0"/>
-              <a:t>Simple to secure</a:t>
+              <a:t>Verb-based – URI is the action</a:t>
             </a:r>
           </a:p>
           <a:p>
             <a:pPr lvl="1"/>
             <a:r>
               <a:rPr lang="en-US" dirty="0"/>
-              <a:t>Can use without writing code (</a:t>
-            </a:r>
-            <a:r>
-              <a:rPr lang="en-US" dirty="0" err="1"/>
-              <a:t>cURL</a:t>
-            </a:r>
-            <a:r>
-              <a:rPr lang="en-US" dirty="0"/>
-              <a:t>)</a:t>
+              <a:t>Less Common</a:t>
             </a:r>
           </a:p>
           <a:p>
             <a:pPr lvl="1"/>
             <a:r>
               <a:rPr lang="en-US" dirty="0"/>
-              <a:t>Securable</a:t>
-            </a:r>
-          </a:p>
-          <a:p>
-            <a:r>
-              <a:rPr lang="en-US" dirty="0"/>
-              <a:t>Cons:</a:t>
+              <a:t>Requires underlying knowledge of the system being accessed</a:t>
+            </a:r>
+          </a:p>
+          <a:p>
+            <a:endParaRPr lang="en-US" dirty="0"/>
+          </a:p>
+          <a:p>
+            <a:r>
+              <a:rPr lang="en-US" dirty="0"/>
+              <a:t>Web Scraping</a:t>
             </a:r>
           </a:p>
           <a:p>
             <a:pPr lvl="1"/>
             <a:r>
               <a:rPr lang="en-US" dirty="0"/>
-              <a:t>??</a:t>
-            </a:r>
-          </a:p>
-          <a:p>
-            <a:endParaRPr lang="en-US" dirty="0"/>
+              <a:t>Often your only choice</a:t>
+            </a:r>
           </a:p>
         </p:txBody>
       </p:sp>
     </p:spTree>
     <p:extLst>
       <p:ext uri="{BB962C8B-B14F-4D97-AF65-F5344CB8AC3E}">
-        <p14:creationId xmlns:p14="http://schemas.microsoft.com/office/powerpoint/2010/main" val="3272526947"/>
+        <p14:creationId xmlns:p14="http://schemas.microsoft.com/office/powerpoint/2010/main" val="952043324"/>
       </p:ext>
     </p:extLst>
   </p:cSld>
@@ -4811,7 +5010,7 @@
           <p:cNvPr id="2" name="Title 1">
             <a:extLst>
               <a:ext uri="{FF2B5EF4-FFF2-40B4-BE49-F238E27FC236}">
-                <a16:creationId xmlns:a16="http://schemas.microsoft.com/office/drawing/2014/main" id="{4668879E-16D8-41E3-9496-B4144A3A21A6}"/>
+                <a16:creationId xmlns:a16="http://schemas.microsoft.com/office/drawing/2014/main" id="{93A12AE6-E689-4B0B-A037-C639EC6231F2}"/>
               </a:ext>
             </a:extLst>
           </p:cNvPr>
@@ -4829,7 +5028,7 @@
           <a:p>
             <a:r>
               <a:rPr lang="en-US" dirty="0"/>
-              <a:t>REST Alternatives</a:t>
+              <a:t>HTTP Request Methods</a:t>
             </a:r>
           </a:p>
         </p:txBody>
@@ -4839,7 +5038,7 @@
           <p:cNvPr id="3" name="Content Placeholder 2">
             <a:extLst>
               <a:ext uri="{FF2B5EF4-FFF2-40B4-BE49-F238E27FC236}">
-                <a16:creationId xmlns:a16="http://schemas.microsoft.com/office/drawing/2014/main" id="{07E266C7-EB9C-4B6F-8AD8-601CE4EFED2F}"/>
+                <a16:creationId xmlns:a16="http://schemas.microsoft.com/office/drawing/2014/main" id="{52EF77AE-F9AB-433C-9AC2-B505129A28E0}"/>
               </a:ext>
             </a:extLst>
           </p:cNvPr>
@@ -4853,84 +5052,88 @@
         <p:spPr/>
         <p:txBody>
           <a:bodyPr>
-            <a:normAutofit lnSpcReduction="10000"/>
+            <a:normAutofit/>
           </a:bodyPr>
           <a:lstStyle/>
           <a:p>
             <a:r>
               <a:rPr lang="en-US" dirty="0"/>
-              <a:t>SOAP (Simple Object Access Protocol)</a:t>
+              <a:t>Methods:</a:t>
             </a:r>
           </a:p>
           <a:p>
             <a:pPr lvl="1"/>
             <a:r>
               <a:rPr lang="en-US" dirty="0"/>
-              <a:t>As fun to use as putting soap in your mouth</a:t>
+              <a:t>GET – request resource – idempotent</a:t>
             </a:r>
           </a:p>
           <a:p>
             <a:pPr lvl="1"/>
             <a:r>
               <a:rPr lang="en-US" dirty="0"/>
-              <a:t>XML-based, no JSON support</a:t>
+              <a:t>POST – submit resource – not idempotent</a:t>
             </a:r>
           </a:p>
           <a:p>
             <a:pPr lvl="1"/>
             <a:r>
               <a:rPr lang="en-US" dirty="0"/>
-              <a:t>Generally slower, uses more bandwidth, going out of style</a:t>
-            </a:r>
-          </a:p>
-          <a:p>
-            <a:pPr marL="457200" lvl="1" indent="0">
-              <a:buNone/>
-            </a:pPr>
+              <a:t>PUT – replace a resource</a:t>
+            </a:r>
+          </a:p>
+          <a:p>
+            <a:pPr lvl="1"/>
+            <a:r>
+              <a:rPr lang="en-US" dirty="0"/>
+              <a:t>PATCH – partially modify a resource</a:t>
+            </a:r>
+          </a:p>
+          <a:p>
+            <a:pPr lvl="1"/>
+            <a:r>
+              <a:rPr lang="en-US" dirty="0"/>
+              <a:t>DELETE – delete a resource</a:t>
+            </a:r>
+          </a:p>
+          <a:p>
+            <a:pPr lvl="1"/>
+            <a:r>
+              <a:rPr lang="en-US" dirty="0"/>
+              <a:t>HEAD, CONNECT, OPTIONS, TRACE – additional methods</a:t>
+            </a:r>
+          </a:p>
+          <a:p>
+            <a:pPr lvl="1"/>
             <a:endParaRPr lang="en-US" dirty="0"/>
           </a:p>
           <a:p>
             <a:r>
               <a:rPr lang="en-US" dirty="0"/>
-              <a:t>RPC (Remote Procedure Calls)</a:t>
+              <a:t>Mirrors:</a:t>
             </a:r>
           </a:p>
           <a:p>
             <a:pPr lvl="1"/>
             <a:r>
               <a:rPr lang="en-US" dirty="0"/>
-              <a:t>Verb-based – URI is the action</a:t>
+              <a:t>Create (POST), Read (GET), Update (PUT/PATCH), Delete (DELETE)</a:t>
             </a:r>
           </a:p>
           <a:p>
             <a:pPr lvl="1"/>
-            <a:r>
-              <a:rPr lang="en-US" dirty="0"/>
-              <a:t>Less Common</a:t>
-            </a:r>
-          </a:p>
-          <a:p>
             <a:endParaRPr lang="en-US" dirty="0"/>
           </a:p>
           <a:p>
-            <a:r>
-              <a:rPr lang="en-US" dirty="0"/>
-              <a:t>Web Scraping</a:t>
-            </a:r>
-          </a:p>
-          <a:p>
             <a:pPr lvl="1"/>
-            <a:r>
-              <a:rPr lang="en-US" dirty="0"/>
-              <a:t>Often your only choice</a:t>
-            </a:r>
+            <a:endParaRPr lang="en-US" dirty="0"/>
           </a:p>
         </p:txBody>
       </p:sp>
     </p:spTree>
     <p:extLst>
       <p:ext uri="{BB962C8B-B14F-4D97-AF65-F5344CB8AC3E}">
-        <p14:creationId xmlns:p14="http://schemas.microsoft.com/office/powerpoint/2010/main" val="952043324"/>
+        <p14:creationId xmlns:p14="http://schemas.microsoft.com/office/powerpoint/2010/main" val="2050633878"/>
       </p:ext>
     </p:extLst>
   </p:cSld>
@@ -4962,7 +5165,7 @@
           <p:cNvPr id="2" name="Title 1">
             <a:extLst>
               <a:ext uri="{FF2B5EF4-FFF2-40B4-BE49-F238E27FC236}">
-                <a16:creationId xmlns:a16="http://schemas.microsoft.com/office/drawing/2014/main" id="{5AC061A8-3222-4737-BA67-2059BA44B4F2}"/>
+                <a16:creationId xmlns:a16="http://schemas.microsoft.com/office/drawing/2014/main" id="{D8A9FAC0-E3C8-4AE3-AD56-4EA22B5A4795}"/>
               </a:ext>
             </a:extLst>
           </p:cNvPr>
@@ -4980,7 +5183,7 @@
           <a:p>
             <a:r>
               <a:rPr lang="en-US" dirty="0"/>
-              <a:t>JSON</a:t>
+              <a:t>HTTP Request Examples:</a:t>
             </a:r>
           </a:p>
         </p:txBody>
@@ -4990,7 +5193,7 @@
           <p:cNvPr id="3" name="Content Placeholder 2">
             <a:extLst>
               <a:ext uri="{FF2B5EF4-FFF2-40B4-BE49-F238E27FC236}">
-                <a16:creationId xmlns:a16="http://schemas.microsoft.com/office/drawing/2014/main" id="{F7807747-7275-4E78-8A60-F7803EF3B263}"/>
+                <a16:creationId xmlns:a16="http://schemas.microsoft.com/office/drawing/2014/main" id="{458C901A-4D2F-4E57-B4E1-75F5EAC3D820}"/>
               </a:ext>
             </a:extLst>
           </p:cNvPr>
@@ -5003,70 +5206,191 @@
         </p:nvSpPr>
         <p:spPr/>
         <p:txBody>
-          <a:bodyPr>
-            <a:normAutofit lnSpcReduction="10000"/>
-          </a:bodyPr>
-          <a:lstStyle/>
-          <a:p>
-            <a:r>
-              <a:rPr lang="en-US" dirty="0"/>
-              <a:t>JavaScript Object Notation (JSON)</a:t>
-            </a:r>
-          </a:p>
-          <a:p>
-            <a:r>
-              <a:rPr lang="en-US" dirty="0"/>
-              <a:t>Open standard file format</a:t>
-            </a:r>
-          </a:p>
-          <a:p>
-            <a:r>
-              <a:rPr lang="en-US" dirty="0"/>
-              <a:t>Human-readable, less verbose</a:t>
-            </a:r>
-          </a:p>
-          <a:p>
-            <a:r>
-              <a:rPr lang="en-US" dirty="0"/>
-              <a:t>Attribute/value pairs</a:t>
-            </a:r>
-          </a:p>
-          <a:p>
-            <a:r>
-              <a:rPr lang="en-US" dirty="0"/>
-              <a:t>Language-independent, schema-less</a:t>
-            </a:r>
-          </a:p>
-          <a:p>
-            <a:r>
-              <a:rPr lang="en-US" dirty="0"/>
-              <a:t>Widely supported by most programming languages</a:t>
-            </a:r>
-          </a:p>
-          <a:p>
-            <a:r>
-              <a:rPr lang="en-US" dirty="0"/>
-              <a:t>Smaller footprint than XML</a:t>
-            </a:r>
-          </a:p>
-          <a:p>
-            <a:r>
-              <a:rPr lang="en-US" dirty="0"/>
-              <a:t>Faster</a:t>
-            </a:r>
-          </a:p>
-          <a:p>
-            <a:r>
-              <a:rPr lang="en-US" dirty="0"/>
-              <a:t>Natural fit with REST</a:t>
-            </a:r>
+          <a:bodyPr/>
+          <a:lstStyle/>
+          <a:p>
+            <a:pPr marL="0" indent="0">
+              <a:buNone/>
+            </a:pPr>
+            <a:r>
+              <a:rPr lang="en-US" dirty="0"/>
+              <a:t>Same endpoint - </a:t>
+            </a:r>
+            <a:r>
+              <a:rPr lang="en-US" sz="2400" dirty="0">
+                <a:latin typeface="Courier New" panose="02070309020205020404" pitchFamily="49" charset="0"/>
+                <a:cs typeface="Courier New" panose="02070309020205020404" pitchFamily="49" charset="0"/>
+              </a:rPr>
+              <a:t>/</a:t>
+            </a:r>
+            <a:r>
+              <a:rPr lang="en-US" sz="2400" dirty="0" err="1">
+                <a:latin typeface="Courier New" panose="02070309020205020404" pitchFamily="49" charset="0"/>
+                <a:cs typeface="Courier New" panose="02070309020205020404" pitchFamily="49" charset="0"/>
+              </a:rPr>
+              <a:t>api</a:t>
+            </a:r>
+            <a:r>
+              <a:rPr lang="en-US" sz="2400" dirty="0">
+                <a:latin typeface="Courier New" panose="02070309020205020404" pitchFamily="49" charset="0"/>
+                <a:cs typeface="Courier New" panose="02070309020205020404" pitchFamily="49" charset="0"/>
+              </a:rPr>
+              <a:t>/users/{id}</a:t>
+            </a:r>
+            <a:r>
+              <a:rPr lang="en-US" dirty="0"/>
+              <a:t> - used for multiple operations:</a:t>
+            </a:r>
+            <a:br>
+              <a:rPr lang="en-US" dirty="0"/>
+            </a:br>
+            <a:endParaRPr lang="en-US" dirty="0"/>
+          </a:p>
+          <a:p>
+            <a:r>
+              <a:rPr lang="en-US" sz="2200" dirty="0">
+                <a:latin typeface="Courier New" panose="02070309020205020404" pitchFamily="49" charset="0"/>
+                <a:ea typeface="Hack" panose="020B0609030202020204" pitchFamily="49" charset="0"/>
+                <a:cs typeface="Courier New" panose="02070309020205020404" pitchFamily="49" charset="0"/>
+              </a:rPr>
+              <a:t>GET /</a:t>
+            </a:r>
+            <a:r>
+              <a:rPr lang="en-US" sz="2200" dirty="0" err="1">
+                <a:latin typeface="Courier New" panose="02070309020205020404" pitchFamily="49" charset="0"/>
+                <a:ea typeface="Hack" panose="020B0609030202020204" pitchFamily="49" charset="0"/>
+                <a:cs typeface="Courier New" panose="02070309020205020404" pitchFamily="49" charset="0"/>
+              </a:rPr>
+              <a:t>api</a:t>
+            </a:r>
+            <a:r>
+              <a:rPr lang="en-US" sz="2200" dirty="0">
+                <a:latin typeface="Courier New" panose="02070309020205020404" pitchFamily="49" charset="0"/>
+                <a:ea typeface="Hack" panose="020B0609030202020204" pitchFamily="49" charset="0"/>
+                <a:cs typeface="Courier New" panose="02070309020205020404" pitchFamily="49" charset="0"/>
+              </a:rPr>
+              <a:t>/users/{id}</a:t>
+            </a:r>
+          </a:p>
+          <a:p>
+            <a:r>
+              <a:rPr lang="en-US" sz="2200" dirty="0">
+                <a:latin typeface="Courier New" panose="02070309020205020404" pitchFamily="49" charset="0"/>
+                <a:ea typeface="Hack" panose="020B0609030202020204" pitchFamily="49" charset="0"/>
+                <a:cs typeface="Courier New" panose="02070309020205020404" pitchFamily="49" charset="0"/>
+              </a:rPr>
+              <a:t>PUT /</a:t>
+            </a:r>
+            <a:r>
+              <a:rPr lang="en-US" sz="2200" dirty="0" err="1">
+                <a:latin typeface="Courier New" panose="02070309020205020404" pitchFamily="49" charset="0"/>
+                <a:ea typeface="Hack" panose="020B0609030202020204" pitchFamily="49" charset="0"/>
+                <a:cs typeface="Courier New" panose="02070309020205020404" pitchFamily="49" charset="0"/>
+              </a:rPr>
+              <a:t>api</a:t>
+            </a:r>
+            <a:r>
+              <a:rPr lang="en-US" sz="2200" dirty="0">
+                <a:latin typeface="Courier New" panose="02070309020205020404" pitchFamily="49" charset="0"/>
+                <a:ea typeface="Hack" panose="020B0609030202020204" pitchFamily="49" charset="0"/>
+                <a:cs typeface="Courier New" panose="02070309020205020404" pitchFamily="49" charset="0"/>
+              </a:rPr>
+              <a:t>/users/{id}</a:t>
+            </a:r>
+          </a:p>
+          <a:p>
+            <a:r>
+              <a:rPr lang="en-US" sz="2200" dirty="0">
+                <a:latin typeface="Courier New" panose="02070309020205020404" pitchFamily="49" charset="0"/>
+                <a:ea typeface="Hack" panose="020B0609030202020204" pitchFamily="49" charset="0"/>
+                <a:cs typeface="Courier New" panose="02070309020205020404" pitchFamily="49" charset="0"/>
+              </a:rPr>
+              <a:t>PATCH /</a:t>
+            </a:r>
+            <a:r>
+              <a:rPr lang="en-US" sz="2200" dirty="0" err="1">
+                <a:latin typeface="Courier New" panose="02070309020205020404" pitchFamily="49" charset="0"/>
+                <a:ea typeface="Hack" panose="020B0609030202020204" pitchFamily="49" charset="0"/>
+                <a:cs typeface="Courier New" panose="02070309020205020404" pitchFamily="49" charset="0"/>
+              </a:rPr>
+              <a:t>api</a:t>
+            </a:r>
+            <a:r>
+              <a:rPr lang="en-US" sz="2200" dirty="0">
+                <a:latin typeface="Courier New" panose="02070309020205020404" pitchFamily="49" charset="0"/>
+                <a:ea typeface="Hack" panose="020B0609030202020204" pitchFamily="49" charset="0"/>
+                <a:cs typeface="Courier New" panose="02070309020205020404" pitchFamily="49" charset="0"/>
+              </a:rPr>
+              <a:t>/users/{id}</a:t>
+            </a:r>
+          </a:p>
+          <a:p>
+            <a:r>
+              <a:rPr lang="en-US" sz="2200" dirty="0">
+                <a:latin typeface="Courier New" panose="02070309020205020404" pitchFamily="49" charset="0"/>
+                <a:ea typeface="Hack" panose="020B0609030202020204" pitchFamily="49" charset="0"/>
+                <a:cs typeface="Courier New" panose="02070309020205020404" pitchFamily="49" charset="0"/>
+              </a:rPr>
+              <a:t>DELETE /</a:t>
+            </a:r>
+            <a:r>
+              <a:rPr lang="en-US" sz="2200" dirty="0" err="1">
+                <a:latin typeface="Courier New" panose="02070309020205020404" pitchFamily="49" charset="0"/>
+                <a:ea typeface="Hack" panose="020B0609030202020204" pitchFamily="49" charset="0"/>
+                <a:cs typeface="Courier New" panose="02070309020205020404" pitchFamily="49" charset="0"/>
+              </a:rPr>
+              <a:t>api</a:t>
+            </a:r>
+            <a:r>
+              <a:rPr lang="en-US" sz="2200" dirty="0">
+                <a:latin typeface="Courier New" panose="02070309020205020404" pitchFamily="49" charset="0"/>
+                <a:ea typeface="Hack" panose="020B0609030202020204" pitchFamily="49" charset="0"/>
+                <a:cs typeface="Courier New" panose="02070309020205020404" pitchFamily="49" charset="0"/>
+              </a:rPr>
+              <a:t>/users/{id}</a:t>
+            </a:r>
+          </a:p>
+          <a:p>
+            <a:r>
+              <a:rPr lang="en-US" sz="2200" dirty="0">
+                <a:latin typeface="Courier New" panose="02070309020205020404" pitchFamily="49" charset="0"/>
+                <a:ea typeface="Hack" panose="020B0609030202020204" pitchFamily="49" charset="0"/>
+                <a:cs typeface="Courier New" panose="02070309020205020404" pitchFamily="49" charset="0"/>
+              </a:rPr>
+              <a:t>POST /</a:t>
+            </a:r>
+            <a:r>
+              <a:rPr lang="en-US" sz="2200" dirty="0" err="1">
+                <a:latin typeface="Courier New" panose="02070309020205020404" pitchFamily="49" charset="0"/>
+                <a:ea typeface="Hack" panose="020B0609030202020204" pitchFamily="49" charset="0"/>
+                <a:cs typeface="Courier New" panose="02070309020205020404" pitchFamily="49" charset="0"/>
+              </a:rPr>
+              <a:t>api</a:t>
+            </a:r>
+            <a:r>
+              <a:rPr lang="en-US" sz="2200" dirty="0">
+                <a:latin typeface="Courier New" panose="02070309020205020404" pitchFamily="49" charset="0"/>
+                <a:ea typeface="Hack" panose="020B0609030202020204" pitchFamily="49" charset="0"/>
+                <a:cs typeface="Courier New" panose="02070309020205020404" pitchFamily="49" charset="0"/>
+              </a:rPr>
+              <a:t>/users</a:t>
+            </a:r>
+          </a:p>
+          <a:p>
+            <a:endParaRPr lang="en-US" dirty="0"/>
+          </a:p>
+          <a:p>
+            <a:pPr marL="0" indent="0">
+              <a:buNone/>
+            </a:pPr>
+            <a:endParaRPr lang="en-US" dirty="0"/>
           </a:p>
         </p:txBody>
       </p:sp>
     </p:spTree>
     <p:extLst>
       <p:ext uri="{BB962C8B-B14F-4D97-AF65-F5344CB8AC3E}">
-        <p14:creationId xmlns:p14="http://schemas.microsoft.com/office/powerpoint/2010/main" val="548842597"/>
+        <p14:creationId xmlns:p14="http://schemas.microsoft.com/office/powerpoint/2010/main" val="555897768"/>
       </p:ext>
     </p:extLst>
   </p:cSld>
@@ -5098,7 +5422,7 @@
           <p:cNvPr id="2" name="Title 1">
             <a:extLst>
               <a:ext uri="{FF2B5EF4-FFF2-40B4-BE49-F238E27FC236}">
-                <a16:creationId xmlns:a16="http://schemas.microsoft.com/office/drawing/2014/main" id="{4668879E-16D8-41E3-9496-B4144A3A21A6}"/>
+                <a16:creationId xmlns:a16="http://schemas.microsoft.com/office/drawing/2014/main" id="{5AC061A8-3222-4737-BA67-2059BA44B4F2}"/>
               </a:ext>
             </a:extLst>
           </p:cNvPr>
@@ -5116,7 +5440,7 @@
           <a:p>
             <a:r>
               <a:rPr lang="en-US" dirty="0"/>
-              <a:t>JSON Alternatives</a:t>
+              <a:t>JSON</a:t>
             </a:r>
           </a:p>
         </p:txBody>
@@ -5126,7 +5450,7 @@
           <p:cNvPr id="3" name="Content Placeholder 2">
             <a:extLst>
               <a:ext uri="{FF2B5EF4-FFF2-40B4-BE49-F238E27FC236}">
-                <a16:creationId xmlns:a16="http://schemas.microsoft.com/office/drawing/2014/main" id="{07E266C7-EB9C-4B6F-8AD8-601CE4EFED2F}"/>
+                <a16:creationId xmlns:a16="http://schemas.microsoft.com/office/drawing/2014/main" id="{F7807747-7275-4E78-8A60-F7803EF3B263}"/>
               </a:ext>
             </a:extLst>
           </p:cNvPr>
@@ -5137,148 +5461,92 @@
             <p:ph idx="1"/>
           </p:nvPr>
         </p:nvSpPr>
-        <p:spPr>
-          <a:xfrm>
-            <a:off x="838200" y="1825624"/>
-            <a:ext cx="10515600" cy="4399007"/>
-          </a:xfrm>
-        </p:spPr>
+        <p:spPr/>
         <p:txBody>
           <a:bodyPr>
-            <a:normAutofit fontScale="70000" lnSpcReduction="20000"/>
+            <a:normAutofit lnSpcReduction="10000"/>
           </a:bodyPr>
           <a:lstStyle/>
           <a:p>
             <a:r>
-              <a:rPr lang="en-US" dirty="0"/>
-              <a:t>XML (</a:t>
-            </a:r>
-            <a:r>
-              <a:rPr lang="en-US" dirty="0" err="1"/>
-              <a:t>eXtensible</a:t>
-            </a:r>
-            <a:r>
-              <a:rPr lang="en-US" dirty="0"/>
-              <a:t> Markup Language)</a:t>
-            </a:r>
-          </a:p>
-          <a:p>
-            <a:pPr lvl="1"/>
-            <a:r>
-              <a:rPr lang="en-US" dirty="0"/>
-              <a:t>Schema-based</a:t>
-            </a:r>
-          </a:p>
-          <a:p>
-            <a:pPr lvl="1"/>
-            <a:r>
-              <a:rPr lang="en-US" dirty="0"/>
-              <a:t>Requires XML parser</a:t>
-            </a:r>
-          </a:p>
-          <a:p>
-            <a:pPr lvl="1"/>
-            <a:r>
-              <a:rPr lang="en-US" dirty="0"/>
-              <a:t>Less compact</a:t>
-            </a:r>
-            <a:br>
-              <a:rPr lang="en-US" dirty="0"/>
-            </a:br>
-            <a:endParaRPr lang="en-US" dirty="0"/>
-          </a:p>
-          <a:p>
-            <a:r>
-              <a:rPr lang="en-US" dirty="0"/>
-              <a:t>Programming language-specific serialization</a:t>
-            </a:r>
-          </a:p>
-          <a:p>
-            <a:pPr lvl="1"/>
-            <a:r>
-              <a:rPr lang="en-US" sz="1900" dirty="0">
-                <a:latin typeface="Courier New" panose="02070309020205020404" pitchFamily="49" charset="0"/>
-                <a:cs typeface="Courier New" panose="02070309020205020404" pitchFamily="49" charset="0"/>
-              </a:rPr>
-              <a:t>serialize($object);</a:t>
-            </a:r>
-            <a:r>
-              <a:rPr lang="en-US" dirty="0">
-                <a:cs typeface="Courier New" panose="02070309020205020404" pitchFamily="49" charset="0"/>
-              </a:rPr>
-              <a:t> </a:t>
-            </a:r>
-            <a:r>
-              <a:rPr lang="en-US" dirty="0"/>
-              <a:t>in PHP, for example</a:t>
-            </a:r>
-          </a:p>
-          <a:p>
-            <a:pPr lvl="1"/>
-            <a:r>
-              <a:rPr lang="en-US" dirty="0"/>
-              <a:t>Need to use same language to parse</a:t>
-            </a:r>
-            <a:br>
-              <a:rPr lang="en-US" dirty="0"/>
-            </a:br>
-            <a:endParaRPr lang="en-US" dirty="0"/>
-          </a:p>
-          <a:p>
-            <a:r>
-              <a:rPr lang="en-US" dirty="0"/>
-              <a:t>Custom string/binary data</a:t>
-            </a:r>
-          </a:p>
-          <a:p>
-            <a:pPr lvl="1"/>
-            <a:r>
-              <a:rPr lang="en-US" dirty="0"/>
-              <a:t>Must know data specification, write custom parser (Half-Life </a:t>
-            </a:r>
-            <a:r>
-              <a:rPr lang="en-US" dirty="0" err="1"/>
-              <a:t>rcon</a:t>
-            </a:r>
-            <a:r>
-              <a:rPr lang="en-US" dirty="0"/>
-              <a:t> protocol)</a:t>
-            </a:r>
-            <a:br>
-              <a:rPr lang="en-US" dirty="0"/>
-            </a:br>
-            <a:endParaRPr lang="en-US" dirty="0"/>
-          </a:p>
-          <a:p>
-            <a:r>
-              <a:rPr lang="en-US" dirty="0"/>
-              <a:t>Other</a:t>
-            </a:r>
-          </a:p>
-          <a:p>
-            <a:pPr lvl="1"/>
-            <a:r>
-              <a:rPr lang="en-US" dirty="0"/>
-              <a:t>YAML</a:t>
-            </a:r>
-          </a:p>
-          <a:p>
-            <a:pPr lvl="1"/>
-            <a:r>
-              <a:rPr lang="en-US" dirty="0"/>
-              <a:t>BSON, </a:t>
-            </a:r>
-            <a:r>
-              <a:rPr lang="en-US" dirty="0" err="1"/>
-              <a:t>MessagePack</a:t>
-            </a:r>
-            <a:endParaRPr lang="en-US" dirty="0"/>
-          </a:p>
-          <a:p>
-            <a:pPr lvl="1"/>
-            <a:r>
-              <a:rPr lang="en-US" dirty="0"/>
-              <a:t>Protocol Buffers</a:t>
+              <a:rPr lang="en-US" b="1" dirty="0"/>
+              <a:t>J</a:t>
+            </a:r>
+            <a:r>
+              <a:rPr lang="en-US" dirty="0"/>
+              <a:t>ava</a:t>
+            </a:r>
+            <a:r>
+              <a:rPr lang="en-US" b="1" dirty="0"/>
+              <a:t>S</a:t>
+            </a:r>
+            <a:r>
+              <a:rPr lang="en-US" dirty="0"/>
+              <a:t>cript </a:t>
+            </a:r>
+            <a:r>
+              <a:rPr lang="en-US" b="1" dirty="0"/>
+              <a:t>O</a:t>
+            </a:r>
+            <a:r>
+              <a:rPr lang="en-US" dirty="0"/>
+              <a:t>bject </a:t>
+            </a:r>
+            <a:r>
+              <a:rPr lang="en-US" b="1" dirty="0"/>
+              <a:t>N</a:t>
+            </a:r>
+            <a:r>
+              <a:rPr lang="en-US" dirty="0"/>
+              <a:t>otation (JSON)</a:t>
+            </a:r>
+          </a:p>
+          <a:p>
+            <a:r>
+              <a:rPr lang="en-US" dirty="0"/>
+              <a:t>Open standard file format</a:t>
+            </a:r>
+          </a:p>
+          <a:p>
+            <a:r>
+              <a:rPr lang="en-US" dirty="0"/>
+              <a:t>Human-readable, less verbose</a:t>
+            </a:r>
+          </a:p>
+          <a:p>
+            <a:r>
+              <a:rPr lang="en-US" dirty="0"/>
+              <a:t>Attribute/value pairs</a:t>
+            </a:r>
+          </a:p>
+          <a:p>
+            <a:r>
+              <a:rPr lang="en-US" dirty="0"/>
+              <a:t>Language-independent, schema-less</a:t>
+            </a:r>
+          </a:p>
+          <a:p>
+            <a:r>
+              <a:rPr lang="en-US" dirty="0"/>
+              <a:t>Widely supported by most programming languages</a:t>
+            </a:r>
+          </a:p>
+          <a:p>
+            <a:r>
+              <a:rPr lang="en-US" dirty="0"/>
+              <a:t>Smaller footprint than XML</a:t>
+            </a:r>
+          </a:p>
+          <a:p>
+            <a:r>
+              <a:rPr lang="en-US" dirty="0"/>
+              <a:t>Faster</a:t>
+            </a:r>
+          </a:p>
+          <a:p>
+            <a:r>
+              <a:rPr lang="en-US" dirty="0"/>
+              <a:t>Natural fit with REST</a:t>
             </a:r>
           </a:p>
         </p:txBody>
@@ -5286,7 +5554,7 @@
     </p:spTree>
     <p:extLst>
       <p:ext uri="{BB962C8B-B14F-4D97-AF65-F5344CB8AC3E}">
-        <p14:creationId xmlns:p14="http://schemas.microsoft.com/office/powerpoint/2010/main" val="3611362657"/>
+        <p14:creationId xmlns:p14="http://schemas.microsoft.com/office/powerpoint/2010/main" val="548842597"/>
       </p:ext>
     </p:extLst>
   </p:cSld>
@@ -5318,7 +5586,7 @@
           <p:cNvPr id="2" name="Title 1">
             <a:extLst>
               <a:ext uri="{FF2B5EF4-FFF2-40B4-BE49-F238E27FC236}">
-                <a16:creationId xmlns:a16="http://schemas.microsoft.com/office/drawing/2014/main" id="{7596F920-6BF9-47D1-A0DA-0D717C6A3BA5}"/>
+                <a16:creationId xmlns:a16="http://schemas.microsoft.com/office/drawing/2014/main" id="{4668879E-16D8-41E3-9496-B4144A3A21A6}"/>
               </a:ext>
             </a:extLst>
           </p:cNvPr>
@@ -5336,135 +5604,201 @@
           <a:p>
             <a:r>
               <a:rPr lang="en-US" dirty="0"/>
-              <a:t>JSON vs XML comparison</a:t>
-            </a:r>
-          </a:p>
-        </p:txBody>
-      </p:sp>
-      <p:sp>
-        <p:nvSpPr>
-          <p:cNvPr id="3" name="Text Placeholder 2">
-            <a:extLst>
-              <a:ext uri="{FF2B5EF4-FFF2-40B4-BE49-F238E27FC236}">
-                <a16:creationId xmlns:a16="http://schemas.microsoft.com/office/drawing/2014/main" id="{D5DB56BA-0641-4B84-9F77-6AE210C8D1AE}"/>
-              </a:ext>
-            </a:extLst>
-          </p:cNvPr>
-          <p:cNvSpPr>
-            <a:spLocks noGrp="1"/>
-          </p:cNvSpPr>
-          <p:nvPr>
-            <p:ph type="body" idx="1"/>
-          </p:nvPr>
-        </p:nvSpPr>
-        <p:spPr/>
-        <p:txBody>
-          <a:bodyPr/>
-          <a:lstStyle/>
-          <a:p>
-            <a:r>
-              <a:rPr lang="en-US" dirty="0"/>
-              <a:t>JSON</a:t>
-            </a:r>
-          </a:p>
-        </p:txBody>
-      </p:sp>
-      <p:pic>
-        <p:nvPicPr>
-          <p:cNvPr id="9" name="Content Placeholder 8">
-            <a:extLst>
-              <a:ext uri="{FF2B5EF4-FFF2-40B4-BE49-F238E27FC236}">
-                <a16:creationId xmlns:a16="http://schemas.microsoft.com/office/drawing/2014/main" id="{12E86F51-B57D-40DC-BEC8-7FEA4665AB76}"/>
-              </a:ext>
-            </a:extLst>
-          </p:cNvPr>
-          <p:cNvPicPr>
-            <a:picLocks noGrp="1" noChangeAspect="1"/>
-          </p:cNvPicPr>
-          <p:nvPr>
-            <p:ph sz="half" idx="2"/>
-          </p:nvPr>
-        </p:nvPicPr>
-        <p:blipFill>
-          <a:blip r:embed="rId2"/>
-          <a:stretch>
-            <a:fillRect/>
-          </a:stretch>
-        </p:blipFill>
+              <a:t>JSON Alternatives</a:t>
+            </a:r>
+          </a:p>
+        </p:txBody>
+      </p:sp>
+      <p:sp>
+        <p:nvSpPr>
+          <p:cNvPr id="3" name="Content Placeholder 2">
+            <a:extLst>
+              <a:ext uri="{FF2B5EF4-FFF2-40B4-BE49-F238E27FC236}">
+                <a16:creationId xmlns:a16="http://schemas.microsoft.com/office/drawing/2014/main" id="{07E266C7-EB9C-4B6F-8AD8-601CE4EFED2F}"/>
+              </a:ext>
+            </a:extLst>
+          </p:cNvPr>
+          <p:cNvSpPr>
+            <a:spLocks noGrp="1"/>
+          </p:cNvSpPr>
+          <p:nvPr>
+            <p:ph idx="1"/>
+          </p:nvPr>
+        </p:nvSpPr>
         <p:spPr>
           <a:xfrm>
-            <a:off x="839788" y="2699544"/>
-            <a:ext cx="3048000" cy="3295650"/>
+            <a:off x="838200" y="1825624"/>
+            <a:ext cx="10515600" cy="4399007"/>
           </a:xfrm>
-          <a:prstGeom prst="rect">
-            <a:avLst/>
-          </a:prstGeom>
         </p:spPr>
-      </p:pic>
-      <p:sp>
-        <p:nvSpPr>
-          <p:cNvPr id="5" name="Text Placeholder 4">
-            <a:extLst>
-              <a:ext uri="{FF2B5EF4-FFF2-40B4-BE49-F238E27FC236}">
-                <a16:creationId xmlns:a16="http://schemas.microsoft.com/office/drawing/2014/main" id="{55CE5A3A-9316-4AEE-8327-BF9A990E954B}"/>
-              </a:ext>
-            </a:extLst>
-          </p:cNvPr>
-          <p:cNvSpPr>
-            <a:spLocks noGrp="1"/>
-          </p:cNvSpPr>
-          <p:nvPr>
-            <p:ph type="body" sz="quarter" idx="3"/>
-          </p:nvPr>
-        </p:nvSpPr>
-        <p:spPr/>
-        <p:txBody>
-          <a:bodyPr/>
-          <a:lstStyle/>
-          <a:p>
-            <a:r>
-              <a:rPr lang="en-US" dirty="0"/>
-              <a:t>XML</a:t>
-            </a:r>
-          </a:p>
-        </p:txBody>
-      </p:sp>
-      <p:pic>
-        <p:nvPicPr>
-          <p:cNvPr id="10" name="Content Placeholder 9">
-            <a:extLst>
-              <a:ext uri="{FF2B5EF4-FFF2-40B4-BE49-F238E27FC236}">
-                <a16:creationId xmlns:a16="http://schemas.microsoft.com/office/drawing/2014/main" id="{6C7843B1-E8A2-4F81-8A10-CBB1B7573092}"/>
-              </a:ext>
-            </a:extLst>
-          </p:cNvPr>
-          <p:cNvPicPr>
-            <a:picLocks noGrp="1" noChangeAspect="1"/>
-          </p:cNvPicPr>
-          <p:nvPr>
-            <p:ph sz="quarter" idx="4"/>
-          </p:nvPr>
-        </p:nvPicPr>
-        <p:blipFill>
-          <a:blip r:embed="rId3"/>
-          <a:stretch>
-            <a:fillRect/>
-          </a:stretch>
-        </p:blipFill>
-        <p:spPr>
-          <a:xfrm>
-            <a:off x="6172200" y="2832894"/>
-            <a:ext cx="3409950" cy="3028950"/>
-          </a:xfrm>
-          <a:prstGeom prst="rect">
-            <a:avLst/>
-          </a:prstGeom>
-        </p:spPr>
-      </p:pic>
+        <p:txBody>
+          <a:bodyPr>
+            <a:normAutofit fontScale="70000" lnSpcReduction="20000"/>
+          </a:bodyPr>
+          <a:lstStyle/>
+          <a:p>
+            <a:r>
+              <a:rPr lang="en-US" dirty="0"/>
+              <a:t>XML (</a:t>
+            </a:r>
+            <a:r>
+              <a:rPr lang="en-US" dirty="0" err="1"/>
+              <a:t>e</a:t>
+            </a:r>
+            <a:r>
+              <a:rPr lang="en-US" b="1" dirty="0" err="1"/>
+              <a:t>X</a:t>
+            </a:r>
+            <a:r>
+              <a:rPr lang="en-US" dirty="0" err="1"/>
+              <a:t>tensible</a:t>
+            </a:r>
+            <a:r>
+              <a:rPr lang="en-US" dirty="0"/>
+              <a:t> </a:t>
+            </a:r>
+            <a:r>
+              <a:rPr lang="en-US" b="1" dirty="0"/>
+              <a:t>M</a:t>
+            </a:r>
+            <a:r>
+              <a:rPr lang="en-US" dirty="0"/>
+              <a:t>arkup </a:t>
+            </a:r>
+            <a:r>
+              <a:rPr lang="en-US" b="1" dirty="0"/>
+              <a:t>L</a:t>
+            </a:r>
+            <a:r>
+              <a:rPr lang="en-US" dirty="0"/>
+              <a:t>anguage)</a:t>
+            </a:r>
+          </a:p>
+          <a:p>
+            <a:pPr lvl="1"/>
+            <a:r>
+              <a:rPr lang="en-US" dirty="0"/>
+              <a:t>Schema-based</a:t>
+            </a:r>
+          </a:p>
+          <a:p>
+            <a:pPr lvl="1"/>
+            <a:r>
+              <a:rPr lang="en-US" dirty="0"/>
+              <a:t>Requires XML parser</a:t>
+            </a:r>
+          </a:p>
+          <a:p>
+            <a:pPr lvl="1"/>
+            <a:r>
+              <a:rPr lang="en-US" dirty="0"/>
+              <a:t>Less compact</a:t>
+            </a:r>
+            <a:br>
+              <a:rPr lang="en-US" dirty="0"/>
+            </a:br>
+            <a:endParaRPr lang="en-US" dirty="0"/>
+          </a:p>
+          <a:p>
+            <a:r>
+              <a:rPr lang="en-US" dirty="0"/>
+              <a:t>Programming language-specific serialization</a:t>
+            </a:r>
+          </a:p>
+          <a:p>
+            <a:pPr lvl="1"/>
+            <a:r>
+              <a:rPr lang="en-US" sz="1900" dirty="0">
+                <a:latin typeface="Courier New" panose="02070309020205020404" pitchFamily="49" charset="0"/>
+                <a:cs typeface="Courier New" panose="02070309020205020404" pitchFamily="49" charset="0"/>
+              </a:rPr>
+              <a:t>serialize($object);</a:t>
+            </a:r>
+            <a:r>
+              <a:rPr lang="en-US" dirty="0">
+                <a:cs typeface="Courier New" panose="02070309020205020404" pitchFamily="49" charset="0"/>
+              </a:rPr>
+              <a:t> </a:t>
+            </a:r>
+            <a:r>
+              <a:rPr lang="en-US" dirty="0"/>
+              <a:t>in PHP, for example</a:t>
+            </a:r>
+          </a:p>
+          <a:p>
+            <a:pPr lvl="1"/>
+            <a:r>
+              <a:rPr lang="en-US" dirty="0"/>
+              <a:t>Need to use same language to parse</a:t>
+            </a:r>
+            <a:br>
+              <a:rPr lang="en-US" dirty="0"/>
+            </a:br>
+            <a:endParaRPr lang="en-US" dirty="0"/>
+          </a:p>
+          <a:p>
+            <a:r>
+              <a:rPr lang="en-US" dirty="0"/>
+              <a:t>Custom string/binary data</a:t>
+            </a:r>
+          </a:p>
+          <a:p>
+            <a:pPr lvl="1"/>
+            <a:r>
+              <a:rPr lang="en-US" dirty="0"/>
+              <a:t>Must know data specification, write custom parser (Half-Life </a:t>
+            </a:r>
+            <a:r>
+              <a:rPr lang="en-US" dirty="0" err="1"/>
+              <a:t>rcon</a:t>
+            </a:r>
+            <a:r>
+              <a:rPr lang="en-US" dirty="0"/>
+              <a:t> protocol)</a:t>
+            </a:r>
+            <a:br>
+              <a:rPr lang="en-US" dirty="0"/>
+            </a:br>
+            <a:endParaRPr lang="en-US" dirty="0"/>
+          </a:p>
+          <a:p>
+            <a:r>
+              <a:rPr lang="en-US" dirty="0"/>
+              <a:t>Other</a:t>
+            </a:r>
+          </a:p>
+          <a:p>
+            <a:pPr lvl="1"/>
+            <a:r>
+              <a:rPr lang="en-US" dirty="0"/>
+              <a:t>YAML</a:t>
+            </a:r>
+          </a:p>
+          <a:p>
+            <a:pPr lvl="1"/>
+            <a:r>
+              <a:rPr lang="en-US" dirty="0"/>
+              <a:t>BSON (MongoDB), </a:t>
+            </a:r>
+            <a:r>
+              <a:rPr lang="en-US" dirty="0" err="1"/>
+              <a:t>MessagePack</a:t>
+            </a:r>
+            <a:endParaRPr lang="en-US" dirty="0"/>
+          </a:p>
+          <a:p>
+            <a:pPr lvl="1"/>
+            <a:r>
+              <a:rPr lang="en-US" dirty="0"/>
+              <a:t>Protocol Buffers (Google)</a:t>
+            </a:r>
+          </a:p>
+        </p:txBody>
+      </p:sp>
     </p:spTree>
     <p:extLst>
       <p:ext uri="{BB962C8B-B14F-4D97-AF65-F5344CB8AC3E}">
-        <p14:creationId xmlns:p14="http://schemas.microsoft.com/office/powerpoint/2010/main" val="943815495"/>
+        <p14:creationId xmlns:p14="http://schemas.microsoft.com/office/powerpoint/2010/main" val="3611362657"/>
       </p:ext>
     </p:extLst>
   </p:cSld>

</xml_diff>

<commit_message>
Presentation updates; switching <- to = in R
</commit_message>
<xml_diff>
--- a/presentation/rest-api-json-graphing.pptx
+++ b/presentation/rest-api-json-graphing.pptx
@@ -7,19 +7,21 @@
   <p:sldIdLst>
     <p:sldId id="256" r:id="rId2"/>
     <p:sldId id="257" r:id="rId3"/>
-    <p:sldId id="258" r:id="rId4"/>
-    <p:sldId id="260" r:id="rId5"/>
-    <p:sldId id="261" r:id="rId6"/>
-    <p:sldId id="259" r:id="rId7"/>
-    <p:sldId id="270" r:id="rId8"/>
-    <p:sldId id="262" r:id="rId9"/>
-    <p:sldId id="269" r:id="rId10"/>
-    <p:sldId id="263" r:id="rId11"/>
-    <p:sldId id="264" r:id="rId12"/>
-    <p:sldId id="265" r:id="rId13"/>
-    <p:sldId id="266" r:id="rId14"/>
-    <p:sldId id="267" r:id="rId15"/>
-    <p:sldId id="268" r:id="rId16"/>
+    <p:sldId id="272" r:id="rId4"/>
+    <p:sldId id="271" r:id="rId5"/>
+    <p:sldId id="258" r:id="rId6"/>
+    <p:sldId id="260" r:id="rId7"/>
+    <p:sldId id="261" r:id="rId8"/>
+    <p:sldId id="259" r:id="rId9"/>
+    <p:sldId id="270" r:id="rId10"/>
+    <p:sldId id="262" r:id="rId11"/>
+    <p:sldId id="263" r:id="rId12"/>
+    <p:sldId id="269" r:id="rId13"/>
+    <p:sldId id="264" r:id="rId14"/>
+    <p:sldId id="265" r:id="rId15"/>
+    <p:sldId id="266" r:id="rId16"/>
+    <p:sldId id="267" r:id="rId17"/>
+    <p:sldId id="268" r:id="rId18"/>
   </p:sldIdLst>
   <p:sldSz cx="12192000" cy="6858000"/>
   <p:notesSz cx="6858000" cy="9144000"/>
@@ -277,7 +279,7 @@
           <a:p>
             <a:fld id="{BE6EE1F1-89EF-4B99-8B75-ED2C5A1BA4D9}" type="datetimeFigureOut">
               <a:rPr lang="en-US" smtClean="0"/>
-              <a:t>2/17/2018</a:t>
+              <a:t>2/19/2018</a:t>
             </a:fld>
             <a:endParaRPr lang="en-US"/>
           </a:p>
@@ -475,7 +477,7 @@
           <a:p>
             <a:fld id="{BE6EE1F1-89EF-4B99-8B75-ED2C5A1BA4D9}" type="datetimeFigureOut">
               <a:rPr lang="en-US" smtClean="0"/>
-              <a:t>2/17/2018</a:t>
+              <a:t>2/19/2018</a:t>
             </a:fld>
             <a:endParaRPr lang="en-US"/>
           </a:p>
@@ -683,7 +685,7 @@
           <a:p>
             <a:fld id="{BE6EE1F1-89EF-4B99-8B75-ED2C5A1BA4D9}" type="datetimeFigureOut">
               <a:rPr lang="en-US" smtClean="0"/>
-              <a:t>2/17/2018</a:t>
+              <a:t>2/19/2018</a:t>
             </a:fld>
             <a:endParaRPr lang="en-US"/>
           </a:p>
@@ -881,7 +883,7 @@
           <a:p>
             <a:fld id="{BE6EE1F1-89EF-4B99-8B75-ED2C5A1BA4D9}" type="datetimeFigureOut">
               <a:rPr lang="en-US" smtClean="0"/>
-              <a:t>2/17/2018</a:t>
+              <a:t>2/19/2018</a:t>
             </a:fld>
             <a:endParaRPr lang="en-US"/>
           </a:p>
@@ -1156,7 +1158,7 @@
           <a:p>
             <a:fld id="{BE6EE1F1-89EF-4B99-8B75-ED2C5A1BA4D9}" type="datetimeFigureOut">
               <a:rPr lang="en-US" smtClean="0"/>
-              <a:t>2/17/2018</a:t>
+              <a:t>2/19/2018</a:t>
             </a:fld>
             <a:endParaRPr lang="en-US"/>
           </a:p>
@@ -1421,7 +1423,7 @@
           <a:p>
             <a:fld id="{BE6EE1F1-89EF-4B99-8B75-ED2C5A1BA4D9}" type="datetimeFigureOut">
               <a:rPr lang="en-US" smtClean="0"/>
-              <a:t>2/17/2018</a:t>
+              <a:t>2/19/2018</a:t>
             </a:fld>
             <a:endParaRPr lang="en-US"/>
           </a:p>
@@ -1833,7 +1835,7 @@
           <a:p>
             <a:fld id="{BE6EE1F1-89EF-4B99-8B75-ED2C5A1BA4D9}" type="datetimeFigureOut">
               <a:rPr lang="en-US" smtClean="0"/>
-              <a:t>2/17/2018</a:t>
+              <a:t>2/19/2018</a:t>
             </a:fld>
             <a:endParaRPr lang="en-US"/>
           </a:p>
@@ -1974,7 +1976,7 @@
           <a:p>
             <a:fld id="{BE6EE1F1-89EF-4B99-8B75-ED2C5A1BA4D9}" type="datetimeFigureOut">
               <a:rPr lang="en-US" smtClean="0"/>
-              <a:t>2/17/2018</a:t>
+              <a:t>2/19/2018</a:t>
             </a:fld>
             <a:endParaRPr lang="en-US"/>
           </a:p>
@@ -2087,7 +2089,7 @@
           <a:p>
             <a:fld id="{BE6EE1F1-89EF-4B99-8B75-ED2C5A1BA4D9}" type="datetimeFigureOut">
               <a:rPr lang="en-US" smtClean="0"/>
-              <a:t>2/17/2018</a:t>
+              <a:t>2/19/2018</a:t>
             </a:fld>
             <a:endParaRPr lang="en-US"/>
           </a:p>
@@ -2398,7 +2400,7 @@
           <a:p>
             <a:fld id="{BE6EE1F1-89EF-4B99-8B75-ED2C5A1BA4D9}" type="datetimeFigureOut">
               <a:rPr lang="en-US" smtClean="0"/>
-              <a:t>2/17/2018</a:t>
+              <a:t>2/19/2018</a:t>
             </a:fld>
             <a:endParaRPr lang="en-US"/>
           </a:p>
@@ -2686,7 +2688,7 @@
           <a:p>
             <a:fld id="{BE6EE1F1-89EF-4B99-8B75-ED2C5A1BA4D9}" type="datetimeFigureOut">
               <a:rPr lang="en-US" smtClean="0"/>
-              <a:t>2/17/2018</a:t>
+              <a:t>2/19/2018</a:t>
             </a:fld>
             <a:endParaRPr lang="en-US"/>
           </a:p>
@@ -2927,7 +2929,7 @@
           <a:p>
             <a:fld id="{BE6EE1F1-89EF-4B99-8B75-ED2C5A1BA4D9}" type="datetimeFigureOut">
               <a:rPr lang="en-US" smtClean="0"/>
-              <a:t>2/17/2018</a:t>
+              <a:t>2/19/2018</a:t>
             </a:fld>
             <a:endParaRPr lang="en-US"/>
           </a:p>
@@ -3449,6 +3451,170 @@
           <p:cNvPr id="2" name="Title 1">
             <a:extLst>
               <a:ext uri="{FF2B5EF4-FFF2-40B4-BE49-F238E27FC236}">
+                <a16:creationId xmlns:a16="http://schemas.microsoft.com/office/drawing/2014/main" id="{5AC061A8-3222-4737-BA67-2059BA44B4F2}"/>
+              </a:ext>
+            </a:extLst>
+          </p:cNvPr>
+          <p:cNvSpPr>
+            <a:spLocks noGrp="1"/>
+          </p:cNvSpPr>
+          <p:nvPr>
+            <p:ph type="title"/>
+          </p:nvPr>
+        </p:nvSpPr>
+        <p:spPr/>
+        <p:txBody>
+          <a:bodyPr/>
+          <a:lstStyle/>
+          <a:p>
+            <a:r>
+              <a:rPr lang="en-US" dirty="0"/>
+              <a:t>JSON</a:t>
+            </a:r>
+          </a:p>
+        </p:txBody>
+      </p:sp>
+      <p:sp>
+        <p:nvSpPr>
+          <p:cNvPr id="3" name="Content Placeholder 2">
+            <a:extLst>
+              <a:ext uri="{FF2B5EF4-FFF2-40B4-BE49-F238E27FC236}">
+                <a16:creationId xmlns:a16="http://schemas.microsoft.com/office/drawing/2014/main" id="{F7807747-7275-4E78-8A60-F7803EF3B263}"/>
+              </a:ext>
+            </a:extLst>
+          </p:cNvPr>
+          <p:cNvSpPr>
+            <a:spLocks noGrp="1"/>
+          </p:cNvSpPr>
+          <p:nvPr>
+            <p:ph idx="1"/>
+          </p:nvPr>
+        </p:nvSpPr>
+        <p:spPr/>
+        <p:txBody>
+          <a:bodyPr>
+            <a:normAutofit lnSpcReduction="10000"/>
+          </a:bodyPr>
+          <a:lstStyle/>
+          <a:p>
+            <a:r>
+              <a:rPr lang="en-US" b="1" dirty="0"/>
+              <a:t>J</a:t>
+            </a:r>
+            <a:r>
+              <a:rPr lang="en-US" dirty="0"/>
+              <a:t>ava</a:t>
+            </a:r>
+            <a:r>
+              <a:rPr lang="en-US" b="1" dirty="0"/>
+              <a:t>S</a:t>
+            </a:r>
+            <a:r>
+              <a:rPr lang="en-US" dirty="0"/>
+              <a:t>cript </a:t>
+            </a:r>
+            <a:r>
+              <a:rPr lang="en-US" b="1" dirty="0"/>
+              <a:t>O</a:t>
+            </a:r>
+            <a:r>
+              <a:rPr lang="en-US" dirty="0"/>
+              <a:t>bject </a:t>
+            </a:r>
+            <a:r>
+              <a:rPr lang="en-US" b="1" dirty="0"/>
+              <a:t>N</a:t>
+            </a:r>
+            <a:r>
+              <a:rPr lang="en-US" dirty="0"/>
+              <a:t>otation (JSON)</a:t>
+            </a:r>
+          </a:p>
+          <a:p>
+            <a:r>
+              <a:rPr lang="en-US" dirty="0"/>
+              <a:t>Open standard file format</a:t>
+            </a:r>
+          </a:p>
+          <a:p>
+            <a:r>
+              <a:rPr lang="en-US" dirty="0"/>
+              <a:t>Human-readable, less verbose</a:t>
+            </a:r>
+          </a:p>
+          <a:p>
+            <a:r>
+              <a:rPr lang="en-US" dirty="0"/>
+              <a:t>Attribute/value pairs</a:t>
+            </a:r>
+          </a:p>
+          <a:p>
+            <a:r>
+              <a:rPr lang="en-US" dirty="0"/>
+              <a:t>Language-independent, schema-less</a:t>
+            </a:r>
+          </a:p>
+          <a:p>
+            <a:r>
+              <a:rPr lang="en-US" dirty="0"/>
+              <a:t>Widely supported by most programming languages</a:t>
+            </a:r>
+          </a:p>
+          <a:p>
+            <a:r>
+              <a:rPr lang="en-US" dirty="0"/>
+              <a:t>Smaller footprint than XML</a:t>
+            </a:r>
+          </a:p>
+          <a:p>
+            <a:r>
+              <a:rPr lang="en-US" dirty="0"/>
+              <a:t>Faster</a:t>
+            </a:r>
+          </a:p>
+          <a:p>
+            <a:r>
+              <a:rPr lang="en-US" dirty="0"/>
+              <a:t>Natural fit with REST</a:t>
+            </a:r>
+          </a:p>
+        </p:txBody>
+      </p:sp>
+    </p:spTree>
+    <p:extLst>
+      <p:ext uri="{BB962C8B-B14F-4D97-AF65-F5344CB8AC3E}">
+        <p14:creationId xmlns:p14="http://schemas.microsoft.com/office/powerpoint/2010/main" val="548842597"/>
+      </p:ext>
+    </p:extLst>
+  </p:cSld>
+  <p:clrMapOvr>
+    <a:masterClrMapping/>
+  </p:clrMapOvr>
+</p:sld>
+</file>
+
+<file path=ppt/slides/slide11.xml><?xml version="1.0" encoding="utf-8"?>
+<p:sld xmlns:a="http://schemas.openxmlformats.org/drawingml/2006/main" xmlns:r="http://schemas.openxmlformats.org/officeDocument/2006/relationships" xmlns:p="http://schemas.openxmlformats.org/presentationml/2006/main">
+  <p:cSld>
+    <p:spTree>
+      <p:nvGrpSpPr>
+        <p:cNvPr id="1" name=""/>
+        <p:cNvGrpSpPr/>
+        <p:nvPr/>
+      </p:nvGrpSpPr>
+      <p:grpSpPr>
+        <a:xfrm>
+          <a:off x="0" y="0"/>
+          <a:ext cx="0" cy="0"/>
+          <a:chOff x="0" y="0"/>
+          <a:chExt cx="0" cy="0"/>
+        </a:xfrm>
+      </p:grpSpPr>
+      <p:sp>
+        <p:nvSpPr>
+          <p:cNvPr id="2" name="Title 1">
+            <a:extLst>
+              <a:ext uri="{FF2B5EF4-FFF2-40B4-BE49-F238E27FC236}">
                 <a16:creationId xmlns:a16="http://schemas.microsoft.com/office/drawing/2014/main" id="{7596F920-6BF9-47D1-A0DA-0D717C6A3BA5}"/>
               </a:ext>
             </a:extLst>
@@ -3605,7 +3771,7 @@
 </p:sld>
 </file>
 
-<file path=ppt/slides/slide11.xml><?xml version="1.0" encoding="utf-8"?>
+<file path=ppt/slides/slide12.xml><?xml version="1.0" encoding="utf-8"?>
 <p:sld xmlns:a="http://schemas.openxmlformats.org/drawingml/2006/main" xmlns:r="http://schemas.openxmlformats.org/officeDocument/2006/relationships" xmlns:p="http://schemas.openxmlformats.org/presentationml/2006/main">
   <p:cSld>
     <p:spTree>
@@ -3627,6 +3793,392 @@
           <p:cNvPr id="2" name="Title 1">
             <a:extLst>
               <a:ext uri="{FF2B5EF4-FFF2-40B4-BE49-F238E27FC236}">
+                <a16:creationId xmlns:a16="http://schemas.microsoft.com/office/drawing/2014/main" id="{4668879E-16D8-41E3-9496-B4144A3A21A6}"/>
+              </a:ext>
+            </a:extLst>
+          </p:cNvPr>
+          <p:cNvSpPr>
+            <a:spLocks noGrp="1"/>
+          </p:cNvSpPr>
+          <p:nvPr>
+            <p:ph type="title"/>
+          </p:nvPr>
+        </p:nvSpPr>
+        <p:spPr/>
+        <p:txBody>
+          <a:bodyPr/>
+          <a:lstStyle/>
+          <a:p>
+            <a:r>
+              <a:rPr lang="en-US" dirty="0"/>
+              <a:t>JSON Alternatives</a:t>
+            </a:r>
+          </a:p>
+        </p:txBody>
+      </p:sp>
+      <p:sp>
+        <p:nvSpPr>
+          <p:cNvPr id="3" name="Content Placeholder 2">
+            <a:extLst>
+              <a:ext uri="{FF2B5EF4-FFF2-40B4-BE49-F238E27FC236}">
+                <a16:creationId xmlns:a16="http://schemas.microsoft.com/office/drawing/2014/main" id="{07E266C7-EB9C-4B6F-8AD8-601CE4EFED2F}"/>
+              </a:ext>
+            </a:extLst>
+          </p:cNvPr>
+          <p:cNvSpPr>
+            <a:spLocks noGrp="1"/>
+          </p:cNvSpPr>
+          <p:nvPr>
+            <p:ph idx="1"/>
+          </p:nvPr>
+        </p:nvSpPr>
+        <p:spPr>
+          <a:xfrm>
+            <a:off x="838200" y="1825624"/>
+            <a:ext cx="10515600" cy="4399007"/>
+          </a:xfrm>
+        </p:spPr>
+        <p:txBody>
+          <a:bodyPr>
+            <a:normAutofit fontScale="70000" lnSpcReduction="20000"/>
+          </a:bodyPr>
+          <a:lstStyle/>
+          <a:p>
+            <a:r>
+              <a:rPr lang="en-US" dirty="0"/>
+              <a:t>XML (</a:t>
+            </a:r>
+            <a:r>
+              <a:rPr lang="en-US" dirty="0" err="1"/>
+              <a:t>e</a:t>
+            </a:r>
+            <a:r>
+              <a:rPr lang="en-US" b="1" dirty="0" err="1"/>
+              <a:t>X</a:t>
+            </a:r>
+            <a:r>
+              <a:rPr lang="en-US" dirty="0" err="1"/>
+              <a:t>tensible</a:t>
+            </a:r>
+            <a:r>
+              <a:rPr lang="en-US" dirty="0"/>
+              <a:t> </a:t>
+            </a:r>
+            <a:r>
+              <a:rPr lang="en-US" b="1" dirty="0"/>
+              <a:t>M</a:t>
+            </a:r>
+            <a:r>
+              <a:rPr lang="en-US" dirty="0"/>
+              <a:t>arkup </a:t>
+            </a:r>
+            <a:r>
+              <a:rPr lang="en-US" b="1" dirty="0"/>
+              <a:t>L</a:t>
+            </a:r>
+            <a:r>
+              <a:rPr lang="en-US" dirty="0"/>
+              <a:t>anguage)</a:t>
+            </a:r>
+          </a:p>
+          <a:p>
+            <a:pPr lvl="1"/>
+            <a:r>
+              <a:rPr lang="en-US" dirty="0"/>
+              <a:t>Schema-based</a:t>
+            </a:r>
+          </a:p>
+          <a:p>
+            <a:pPr lvl="1"/>
+            <a:r>
+              <a:rPr lang="en-US" dirty="0"/>
+              <a:t>Requires XML parser</a:t>
+            </a:r>
+          </a:p>
+          <a:p>
+            <a:pPr lvl="1"/>
+            <a:r>
+              <a:rPr lang="en-US" dirty="0"/>
+              <a:t>Less compact</a:t>
+            </a:r>
+            <a:br>
+              <a:rPr lang="en-US" dirty="0"/>
+            </a:br>
+            <a:endParaRPr lang="en-US" dirty="0"/>
+          </a:p>
+          <a:p>
+            <a:r>
+              <a:rPr lang="en-US" dirty="0"/>
+              <a:t>Programming language-specific serialization</a:t>
+            </a:r>
+          </a:p>
+          <a:p>
+            <a:pPr lvl="1"/>
+            <a:r>
+              <a:rPr lang="en-US" sz="1900" dirty="0">
+                <a:latin typeface="Courier New" panose="02070309020205020404" pitchFamily="49" charset="0"/>
+                <a:cs typeface="Courier New" panose="02070309020205020404" pitchFamily="49" charset="0"/>
+              </a:rPr>
+              <a:t>serialize($object);</a:t>
+            </a:r>
+            <a:r>
+              <a:rPr lang="en-US" dirty="0">
+                <a:cs typeface="Courier New" panose="02070309020205020404" pitchFamily="49" charset="0"/>
+              </a:rPr>
+              <a:t> </a:t>
+            </a:r>
+            <a:r>
+              <a:rPr lang="en-US" dirty="0"/>
+              <a:t>in PHP, for example</a:t>
+            </a:r>
+          </a:p>
+          <a:p>
+            <a:pPr lvl="1"/>
+            <a:r>
+              <a:rPr lang="en-US" dirty="0"/>
+              <a:t>Need to use same language to parse</a:t>
+            </a:r>
+            <a:br>
+              <a:rPr lang="en-US" dirty="0"/>
+            </a:br>
+            <a:endParaRPr lang="en-US" dirty="0"/>
+          </a:p>
+          <a:p>
+            <a:r>
+              <a:rPr lang="en-US" dirty="0"/>
+              <a:t>Custom string/binary data</a:t>
+            </a:r>
+          </a:p>
+          <a:p>
+            <a:pPr lvl="1"/>
+            <a:r>
+              <a:rPr lang="en-US" dirty="0"/>
+              <a:t>Must know data specification, write custom parser (Half-Life </a:t>
+            </a:r>
+            <a:r>
+              <a:rPr lang="en-US" dirty="0" err="1"/>
+              <a:t>rcon</a:t>
+            </a:r>
+            <a:r>
+              <a:rPr lang="en-US" dirty="0"/>
+              <a:t> protocol)</a:t>
+            </a:r>
+            <a:br>
+              <a:rPr lang="en-US" dirty="0"/>
+            </a:br>
+            <a:endParaRPr lang="en-US" dirty="0"/>
+          </a:p>
+          <a:p>
+            <a:r>
+              <a:rPr lang="en-US" dirty="0"/>
+              <a:t>Other</a:t>
+            </a:r>
+          </a:p>
+          <a:p>
+            <a:pPr lvl="1"/>
+            <a:r>
+              <a:rPr lang="en-US" dirty="0"/>
+              <a:t>YAML</a:t>
+            </a:r>
+          </a:p>
+          <a:p>
+            <a:pPr lvl="1"/>
+            <a:r>
+              <a:rPr lang="en-US" dirty="0"/>
+              <a:t>BSON (MongoDB), </a:t>
+            </a:r>
+            <a:r>
+              <a:rPr lang="en-US" dirty="0" err="1"/>
+              <a:t>MessagePack</a:t>
+            </a:r>
+            <a:endParaRPr lang="en-US" dirty="0"/>
+          </a:p>
+          <a:p>
+            <a:pPr lvl="1"/>
+            <a:r>
+              <a:rPr lang="en-US" dirty="0"/>
+              <a:t>Protocol Buffers (Google)</a:t>
+            </a:r>
+          </a:p>
+        </p:txBody>
+      </p:sp>
+      <p:sp>
+        <p:nvSpPr>
+          <p:cNvPr id="4" name="TextBox 3">
+            <a:extLst>
+              <a:ext uri="{FF2B5EF4-FFF2-40B4-BE49-F238E27FC236}">
+                <a16:creationId xmlns:a16="http://schemas.microsoft.com/office/drawing/2014/main" id="{6CE70CD0-0576-479A-8DA7-EF4E0F7A327B}"/>
+              </a:ext>
+            </a:extLst>
+          </p:cNvPr>
+          <p:cNvSpPr txBox="1"/>
+          <p:nvPr/>
+        </p:nvSpPr>
+        <p:spPr>
+          <a:xfrm>
+            <a:off x="5857768" y="2872356"/>
+            <a:ext cx="4926349" cy="1200329"/>
+          </a:xfrm>
+          <a:prstGeom prst="rect">
+            <a:avLst/>
+          </a:prstGeom>
+          <a:noFill/>
+        </p:spPr>
+        <p:txBody>
+          <a:bodyPr wrap="none" rtlCol="0">
+            <a:spAutoFit/>
+          </a:bodyPr>
+          <a:lstStyle/>
+          <a:p>
+            <a:r>
+              <a:rPr lang="en-US" sz="1200" dirty="0">
+                <a:latin typeface="Courier New" panose="02070309020205020404" pitchFamily="49" charset="0"/>
+                <a:cs typeface="Courier New" panose="02070309020205020404" pitchFamily="49" charset="0"/>
+              </a:rPr>
+              <a:t>O:15:"App\Entity\User":6:{s:19:"App\Entity\</a:t>
+            </a:r>
+            <a:r>
+              <a:rPr lang="en-US" sz="1200" dirty="0" err="1">
+                <a:latin typeface="Courier New" panose="02070309020205020404" pitchFamily="49" charset="0"/>
+                <a:cs typeface="Courier New" panose="02070309020205020404" pitchFamily="49" charset="0"/>
+              </a:rPr>
+              <a:t>Userid</a:t>
+            </a:r>
+            <a:r>
+              <a:rPr lang="en-US" sz="1200" dirty="0">
+                <a:latin typeface="Courier New" panose="02070309020205020404" pitchFamily="49" charset="0"/>
+                <a:cs typeface="Courier New" panose="02070309020205020404" pitchFamily="49" charset="0"/>
+              </a:rPr>
+              <a:t>";</a:t>
+            </a:r>
+          </a:p>
+          <a:p>
+            <a:r>
+              <a:rPr lang="en-US" sz="1200" dirty="0">
+                <a:latin typeface="Courier New" panose="02070309020205020404" pitchFamily="49" charset="0"/>
+                <a:cs typeface="Courier New" panose="02070309020205020404" pitchFamily="49" charset="0"/>
+              </a:rPr>
+              <a:t>i:2;s:25:"App\Entity\Userusername";s:5:"sloan";</a:t>
+            </a:r>
+          </a:p>
+          <a:p>
+            <a:r>
+              <a:rPr lang="en-US" sz="1200" dirty="0">
+                <a:latin typeface="Courier New" panose="02070309020205020404" pitchFamily="49" charset="0"/>
+                <a:cs typeface="Courier New" panose="02070309020205020404" pitchFamily="49" charset="0"/>
+              </a:rPr>
+              <a:t>s:23:"App\Entity\UserapiKey";s:9:"sloan2018";</a:t>
+            </a:r>
+          </a:p>
+          <a:p>
+            <a:r>
+              <a:rPr lang="en-US" sz="1200" dirty="0">
+                <a:latin typeface="Courier New" panose="02070309020205020404" pitchFamily="49" charset="0"/>
+                <a:cs typeface="Courier New" panose="02070309020205020404" pitchFamily="49" charset="0"/>
+              </a:rPr>
+              <a:t>s:22:"App\Entity\Useremail";N;</a:t>
+            </a:r>
+          </a:p>
+          <a:p>
+            <a:r>
+              <a:rPr lang="en-US" sz="1200" dirty="0">
+                <a:latin typeface="Courier New" panose="02070309020205020404" pitchFamily="49" charset="0"/>
+                <a:cs typeface="Courier New" panose="02070309020205020404" pitchFamily="49" charset="0"/>
+              </a:rPr>
+              <a:t>s:29:"App\Entity\</a:t>
+            </a:r>
+            <a:r>
+              <a:rPr lang="en-US" sz="1200" dirty="0" err="1">
+                <a:latin typeface="Courier New" panose="02070309020205020404" pitchFamily="49" charset="0"/>
+                <a:cs typeface="Courier New" panose="02070309020205020404" pitchFamily="49" charset="0"/>
+              </a:rPr>
+              <a:t>UserisSuperAdmin</a:t>
+            </a:r>
+            <a:r>
+              <a:rPr lang="en-US" sz="1200" dirty="0">
+                <a:latin typeface="Courier New" panose="02070309020205020404" pitchFamily="49" charset="0"/>
+                <a:cs typeface="Courier New" panose="02070309020205020404" pitchFamily="49" charset="0"/>
+              </a:rPr>
+              <a:t>";</a:t>
+            </a:r>
+          </a:p>
+          <a:p>
+            <a:r>
+              <a:rPr lang="en-US" sz="1200" dirty="0">
+                <a:latin typeface="Courier New" panose="02070309020205020404" pitchFamily="49" charset="0"/>
+                <a:cs typeface="Courier New" panose="02070309020205020404" pitchFamily="49" charset="0"/>
+              </a:rPr>
+              <a:t>b:0;s:24:"App\Entity\UserisAdmin";b:1;}</a:t>
+            </a:r>
+            <a:endParaRPr lang="en-US" sz="1200" dirty="0"/>
+          </a:p>
+        </p:txBody>
+      </p:sp>
+      <p:pic>
+        <p:nvPicPr>
+          <p:cNvPr id="5" name="Picture 4">
+            <a:extLst>
+              <a:ext uri="{FF2B5EF4-FFF2-40B4-BE49-F238E27FC236}">
+                <a16:creationId xmlns:a16="http://schemas.microsoft.com/office/drawing/2014/main" id="{13FD1F25-6FDC-4416-BB19-FE0BA3C85F97}"/>
+              </a:ext>
+            </a:extLst>
+          </p:cNvPr>
+          <p:cNvPicPr>
+            <a:picLocks noChangeAspect="1"/>
+          </p:cNvPicPr>
+          <p:nvPr/>
+        </p:nvPicPr>
+        <p:blipFill>
+          <a:blip r:embed="rId2"/>
+          <a:stretch>
+            <a:fillRect/>
+          </a:stretch>
+        </p:blipFill>
+        <p:spPr>
+          <a:xfrm>
+            <a:off x="5857768" y="4740317"/>
+            <a:ext cx="5126321" cy="1467129"/>
+          </a:xfrm>
+          <a:prstGeom prst="rect">
+            <a:avLst/>
+          </a:prstGeom>
+        </p:spPr>
+      </p:pic>
+    </p:spTree>
+    <p:extLst>
+      <p:ext uri="{BB962C8B-B14F-4D97-AF65-F5344CB8AC3E}">
+        <p14:creationId xmlns:p14="http://schemas.microsoft.com/office/powerpoint/2010/main" val="3611362657"/>
+      </p:ext>
+    </p:extLst>
+  </p:cSld>
+  <p:clrMapOvr>
+    <a:masterClrMapping/>
+  </p:clrMapOvr>
+</p:sld>
+</file>
+
+<file path=ppt/slides/slide13.xml><?xml version="1.0" encoding="utf-8"?>
+<p:sld xmlns:a="http://schemas.openxmlformats.org/drawingml/2006/main" xmlns:r="http://schemas.openxmlformats.org/officeDocument/2006/relationships" xmlns:p="http://schemas.openxmlformats.org/presentationml/2006/main">
+  <p:cSld>
+    <p:spTree>
+      <p:nvGrpSpPr>
+        <p:cNvPr id="1" name=""/>
+        <p:cNvGrpSpPr/>
+        <p:nvPr/>
+      </p:nvGrpSpPr>
+      <p:grpSpPr>
+        <a:xfrm>
+          <a:off x="0" y="0"/>
+          <a:ext cx="0" cy="0"/>
+          <a:chOff x="0" y="0"/>
+          <a:chExt cx="0" cy="0"/>
+        </a:xfrm>
+      </p:grpSpPr>
+      <p:sp>
+        <p:nvSpPr>
+          <p:cNvPr id="2" name="Title 1">
+            <a:extLst>
+              <a:ext uri="{FF2B5EF4-FFF2-40B4-BE49-F238E27FC236}">
                 <a16:creationId xmlns:a16="http://schemas.microsoft.com/office/drawing/2014/main" id="{E0F21451-C318-4D6A-ABB4-042E8B141C8B}"/>
               </a:ext>
             </a:extLst>
@@ -3745,12 +4297,6 @@
               <a:rPr lang="en-US" dirty="0"/>
               <a:t>Congrats! You just accessed a REST API!</a:t>
             </a:r>
-          </a:p>
-          <a:p>
-            <a:endParaRPr lang="en-US" sz="1000" dirty="0">
-              <a:latin typeface="Courier New" panose="02070309020205020404" pitchFamily="49" charset="0"/>
-              <a:cs typeface="Courier New" panose="02070309020205020404" pitchFamily="49" charset="0"/>
-            </a:endParaRPr>
           </a:p>
         </p:txBody>
       </p:sp>
@@ -3797,214 +4343,6 @@
 </p:sld>
 </file>
 
-<file path=ppt/slides/slide12.xml><?xml version="1.0" encoding="utf-8"?>
-<p:sld xmlns:a="http://schemas.openxmlformats.org/drawingml/2006/main" xmlns:r="http://schemas.openxmlformats.org/officeDocument/2006/relationships" xmlns:p="http://schemas.openxmlformats.org/presentationml/2006/main">
-  <p:cSld>
-    <p:spTree>
-      <p:nvGrpSpPr>
-        <p:cNvPr id="1" name=""/>
-        <p:cNvGrpSpPr/>
-        <p:nvPr/>
-      </p:nvGrpSpPr>
-      <p:grpSpPr>
-        <a:xfrm>
-          <a:off x="0" y="0"/>
-          <a:ext cx="0" cy="0"/>
-          <a:chOff x="0" y="0"/>
-          <a:chExt cx="0" cy="0"/>
-        </a:xfrm>
-      </p:grpSpPr>
-      <p:sp>
-        <p:nvSpPr>
-          <p:cNvPr id="2" name="Title 1">
-            <a:extLst>
-              <a:ext uri="{FF2B5EF4-FFF2-40B4-BE49-F238E27FC236}">
-                <a16:creationId xmlns:a16="http://schemas.microsoft.com/office/drawing/2014/main" id="{9A76ACC3-7B41-45F6-B2E2-3491E3FBC648}"/>
-              </a:ext>
-            </a:extLst>
-          </p:cNvPr>
-          <p:cNvSpPr>
-            <a:spLocks noGrp="1"/>
-          </p:cNvSpPr>
-          <p:nvPr>
-            <p:ph type="title"/>
-          </p:nvPr>
-        </p:nvSpPr>
-        <p:spPr/>
-        <p:txBody>
-          <a:bodyPr/>
-          <a:lstStyle/>
-          <a:p>
-            <a:r>
-              <a:rPr lang="en-US" dirty="0"/>
-              <a:t>Graphs/Charts</a:t>
-            </a:r>
-          </a:p>
-        </p:txBody>
-      </p:sp>
-      <p:sp>
-        <p:nvSpPr>
-          <p:cNvPr id="3" name="Content Placeholder 2">
-            <a:extLst>
-              <a:ext uri="{FF2B5EF4-FFF2-40B4-BE49-F238E27FC236}">
-                <a16:creationId xmlns:a16="http://schemas.microsoft.com/office/drawing/2014/main" id="{187C6C6B-59A3-436F-BE69-2EA6209E8190}"/>
-              </a:ext>
-            </a:extLst>
-          </p:cNvPr>
-          <p:cNvSpPr>
-            <a:spLocks noGrp="1"/>
-          </p:cNvSpPr>
-          <p:nvPr>
-            <p:ph idx="1"/>
-          </p:nvPr>
-        </p:nvSpPr>
-        <p:spPr/>
-        <p:txBody>
-          <a:bodyPr/>
-          <a:lstStyle/>
-          <a:p>
-            <a:r>
-              <a:rPr lang="en-US" dirty="0"/>
-              <a:t>Text is fun, but what about visuals?</a:t>
-            </a:r>
-          </a:p>
-        </p:txBody>
-      </p:sp>
-    </p:spTree>
-    <p:extLst>
-      <p:ext uri="{BB962C8B-B14F-4D97-AF65-F5344CB8AC3E}">
-        <p14:creationId xmlns:p14="http://schemas.microsoft.com/office/powerpoint/2010/main" val="2959523029"/>
-      </p:ext>
-    </p:extLst>
-  </p:cSld>
-  <p:clrMapOvr>
-    <a:masterClrMapping/>
-  </p:clrMapOvr>
-</p:sld>
-</file>
-
-<file path=ppt/slides/slide13.xml><?xml version="1.0" encoding="utf-8"?>
-<p:sld xmlns:a="http://schemas.openxmlformats.org/drawingml/2006/main" xmlns:r="http://schemas.openxmlformats.org/officeDocument/2006/relationships" xmlns:p="http://schemas.openxmlformats.org/presentationml/2006/main">
-  <p:cSld>
-    <p:spTree>
-      <p:nvGrpSpPr>
-        <p:cNvPr id="1" name=""/>
-        <p:cNvGrpSpPr/>
-        <p:nvPr/>
-      </p:nvGrpSpPr>
-      <p:grpSpPr>
-        <a:xfrm>
-          <a:off x="0" y="0"/>
-          <a:ext cx="0" cy="0"/>
-          <a:chOff x="0" y="0"/>
-          <a:chExt cx="0" cy="0"/>
-        </a:xfrm>
-      </p:grpSpPr>
-      <p:sp>
-        <p:nvSpPr>
-          <p:cNvPr id="2" name="Title 1">
-            <a:extLst>
-              <a:ext uri="{FF2B5EF4-FFF2-40B4-BE49-F238E27FC236}">
-                <a16:creationId xmlns:a16="http://schemas.microsoft.com/office/drawing/2014/main" id="{F17578BA-08FC-43B7-8AFD-3FD1332B4F43}"/>
-              </a:ext>
-            </a:extLst>
-          </p:cNvPr>
-          <p:cNvSpPr>
-            <a:spLocks noGrp="1"/>
-          </p:cNvSpPr>
-          <p:nvPr>
-            <p:ph type="title"/>
-          </p:nvPr>
-        </p:nvSpPr>
-        <p:spPr/>
-        <p:txBody>
-          <a:bodyPr/>
-          <a:lstStyle/>
-          <a:p>
-            <a:r>
-              <a:rPr lang="en-US" dirty="0"/>
-              <a:t>Graphs/Charts</a:t>
-            </a:r>
-          </a:p>
-        </p:txBody>
-      </p:sp>
-      <p:pic>
-        <p:nvPicPr>
-          <p:cNvPr id="7" name="Content Placeholder 6">
-            <a:extLst>
-              <a:ext uri="{FF2B5EF4-FFF2-40B4-BE49-F238E27FC236}">
-                <a16:creationId xmlns:a16="http://schemas.microsoft.com/office/drawing/2014/main" id="{B0204F91-9000-47EE-B498-AD3812BA4BD6}"/>
-              </a:ext>
-            </a:extLst>
-          </p:cNvPr>
-          <p:cNvPicPr>
-            <a:picLocks noGrp="1" noChangeAspect="1"/>
-          </p:cNvPicPr>
-          <p:nvPr>
-            <p:ph sz="half" idx="2"/>
-          </p:nvPr>
-        </p:nvPicPr>
-        <p:blipFill>
-          <a:blip r:embed="rId2"/>
-          <a:stretch>
-            <a:fillRect/>
-          </a:stretch>
-        </p:blipFill>
-        <p:spPr>
-          <a:xfrm>
-            <a:off x="839788" y="1539552"/>
-            <a:ext cx="2946469" cy="4650112"/>
-          </a:xfrm>
-          <a:prstGeom prst="rect">
-            <a:avLst/>
-          </a:prstGeom>
-        </p:spPr>
-      </p:pic>
-      <p:pic>
-        <p:nvPicPr>
-          <p:cNvPr id="8" name="Content Placeholder 7">
-            <a:extLst>
-              <a:ext uri="{FF2B5EF4-FFF2-40B4-BE49-F238E27FC236}">
-                <a16:creationId xmlns:a16="http://schemas.microsoft.com/office/drawing/2014/main" id="{2FB83A3D-BF9D-432A-A674-CEB4D7C2BBB3}"/>
-              </a:ext>
-            </a:extLst>
-          </p:cNvPr>
-          <p:cNvPicPr>
-            <a:picLocks noGrp="1" noChangeAspect="1"/>
-          </p:cNvPicPr>
-          <p:nvPr>
-            <p:ph sz="quarter" idx="4"/>
-          </p:nvPr>
-        </p:nvPicPr>
-        <p:blipFill>
-          <a:blip r:embed="rId3"/>
-          <a:stretch>
-            <a:fillRect/>
-          </a:stretch>
-        </p:blipFill>
-        <p:spPr>
-          <a:xfrm>
-            <a:off x="6657306" y="1825626"/>
-            <a:ext cx="3476625" cy="4229100"/>
-          </a:xfrm>
-          <a:prstGeom prst="rect">
-            <a:avLst/>
-          </a:prstGeom>
-        </p:spPr>
-      </p:pic>
-    </p:spTree>
-    <p:extLst>
-      <p:ext uri="{BB962C8B-B14F-4D97-AF65-F5344CB8AC3E}">
-        <p14:creationId xmlns:p14="http://schemas.microsoft.com/office/powerpoint/2010/main" val="3092173656"/>
-      </p:ext>
-    </p:extLst>
-  </p:cSld>
-  <p:clrMapOvr>
-    <a:masterClrMapping/>
-  </p:clrMapOvr>
-</p:sld>
-</file>
-
 <file path=ppt/slides/slide14.xml><?xml version="1.0" encoding="utf-8"?>
 <p:sld xmlns:a="http://schemas.openxmlformats.org/drawingml/2006/main" xmlns:r="http://schemas.openxmlformats.org/officeDocument/2006/relationships" xmlns:p="http://schemas.openxmlformats.org/presentationml/2006/main">
   <p:cSld>
@@ -4027,7 +4365,7 @@
           <p:cNvPr id="2" name="Title 1">
             <a:extLst>
               <a:ext uri="{FF2B5EF4-FFF2-40B4-BE49-F238E27FC236}">
-                <a16:creationId xmlns:a16="http://schemas.microsoft.com/office/drawing/2014/main" id="{F7B38E9D-D0D0-4C86-AF2C-325708B0AD23}"/>
+                <a16:creationId xmlns:a16="http://schemas.microsoft.com/office/drawing/2014/main" id="{9A76ACC3-7B41-45F6-B2E2-3491E3FBC648}"/>
               </a:ext>
             </a:extLst>
           </p:cNvPr>
@@ -4045,7 +4383,7 @@
           <a:p>
             <a:r>
               <a:rPr lang="en-US" dirty="0"/>
-              <a:t>Let’s do this thing!</a:t>
+              <a:t>Graphs/Charts</a:t>
             </a:r>
           </a:p>
         </p:txBody>
@@ -4055,7 +4393,7 @@
           <p:cNvPr id="3" name="Content Placeholder 2">
             <a:extLst>
               <a:ext uri="{FF2B5EF4-FFF2-40B4-BE49-F238E27FC236}">
-                <a16:creationId xmlns:a16="http://schemas.microsoft.com/office/drawing/2014/main" id="{3EF8A8A5-B720-4C9A-A576-CF0B43A03F9C}"/>
+                <a16:creationId xmlns:a16="http://schemas.microsoft.com/office/drawing/2014/main" id="{187C6C6B-59A3-436F-BE69-2EA6209E8190}"/>
               </a:ext>
             </a:extLst>
           </p:cNvPr>
@@ -4073,28 +4411,7 @@
           <a:p>
             <a:r>
               <a:rPr lang="en-US" dirty="0"/>
-              <a:t>Goals:</a:t>
-            </a:r>
-          </a:p>
-          <a:p>
-            <a:pPr lvl="1"/>
-            <a:r>
-              <a:rPr lang="en-US" dirty="0"/>
-              <a:t>Add ourselves as a user to access the REST API</a:t>
-            </a:r>
-          </a:p>
-          <a:p>
-            <a:pPr lvl="1"/>
-            <a:r>
-              <a:rPr lang="en-US" dirty="0"/>
-              <a:t>Retrieve data</a:t>
-            </a:r>
-          </a:p>
-          <a:p>
-            <a:pPr lvl="1"/>
-            <a:r>
-              <a:rPr lang="en-US" dirty="0"/>
-              <a:t>Make some graphs!</a:t>
+              <a:t>Text is fun, but what about visuals?</a:t>
             </a:r>
           </a:p>
         </p:txBody>
@@ -4102,7 +4419,7 @@
     </p:spTree>
     <p:extLst>
       <p:ext uri="{BB962C8B-B14F-4D97-AF65-F5344CB8AC3E}">
-        <p14:creationId xmlns:p14="http://schemas.microsoft.com/office/powerpoint/2010/main" val="58623132"/>
+        <p14:creationId xmlns:p14="http://schemas.microsoft.com/office/powerpoint/2010/main" val="2959523029"/>
       </p:ext>
     </p:extLst>
   </p:cSld>
@@ -4134,6 +4451,284 @@
           <p:cNvPr id="2" name="Title 1">
             <a:extLst>
               <a:ext uri="{FF2B5EF4-FFF2-40B4-BE49-F238E27FC236}">
+                <a16:creationId xmlns:a16="http://schemas.microsoft.com/office/drawing/2014/main" id="{F17578BA-08FC-43B7-8AFD-3FD1332B4F43}"/>
+              </a:ext>
+            </a:extLst>
+          </p:cNvPr>
+          <p:cNvSpPr>
+            <a:spLocks noGrp="1"/>
+          </p:cNvSpPr>
+          <p:nvPr>
+            <p:ph type="title"/>
+          </p:nvPr>
+        </p:nvSpPr>
+        <p:spPr/>
+        <p:txBody>
+          <a:bodyPr/>
+          <a:lstStyle/>
+          <a:p>
+            <a:r>
+              <a:rPr lang="en-US" dirty="0"/>
+              <a:t>JSON to Graphs/Charts</a:t>
+            </a:r>
+          </a:p>
+        </p:txBody>
+      </p:sp>
+      <p:pic>
+        <p:nvPicPr>
+          <p:cNvPr id="7" name="Content Placeholder 6">
+            <a:extLst>
+              <a:ext uri="{FF2B5EF4-FFF2-40B4-BE49-F238E27FC236}">
+                <a16:creationId xmlns:a16="http://schemas.microsoft.com/office/drawing/2014/main" id="{B0204F91-9000-47EE-B498-AD3812BA4BD6}"/>
+              </a:ext>
+            </a:extLst>
+          </p:cNvPr>
+          <p:cNvPicPr>
+            <a:picLocks noGrp="1" noChangeAspect="1"/>
+          </p:cNvPicPr>
+          <p:nvPr>
+            <p:ph sz="half" idx="2"/>
+          </p:nvPr>
+        </p:nvPicPr>
+        <p:blipFill>
+          <a:blip r:embed="rId2"/>
+          <a:stretch>
+            <a:fillRect/>
+          </a:stretch>
+        </p:blipFill>
+        <p:spPr>
+          <a:xfrm>
+            <a:off x="839788" y="1539552"/>
+            <a:ext cx="2946469" cy="4650112"/>
+          </a:xfrm>
+          <a:prstGeom prst="rect">
+            <a:avLst/>
+          </a:prstGeom>
+        </p:spPr>
+      </p:pic>
+      <p:pic>
+        <p:nvPicPr>
+          <p:cNvPr id="8" name="Content Placeholder 7">
+            <a:extLst>
+              <a:ext uri="{FF2B5EF4-FFF2-40B4-BE49-F238E27FC236}">
+                <a16:creationId xmlns:a16="http://schemas.microsoft.com/office/drawing/2014/main" id="{2FB83A3D-BF9D-432A-A674-CEB4D7C2BBB3}"/>
+              </a:ext>
+            </a:extLst>
+          </p:cNvPr>
+          <p:cNvPicPr>
+            <a:picLocks noGrp="1" noChangeAspect="1"/>
+          </p:cNvPicPr>
+          <p:nvPr>
+            <p:ph sz="quarter" idx="4"/>
+          </p:nvPr>
+        </p:nvPicPr>
+        <p:blipFill>
+          <a:blip r:embed="rId3"/>
+          <a:stretch>
+            <a:fillRect/>
+          </a:stretch>
+        </p:blipFill>
+        <p:spPr>
+          <a:xfrm>
+            <a:off x="6657306" y="1825626"/>
+            <a:ext cx="3476625" cy="4229100"/>
+          </a:xfrm>
+          <a:prstGeom prst="rect">
+            <a:avLst/>
+          </a:prstGeom>
+        </p:spPr>
+      </p:pic>
+      <p:sp>
+        <p:nvSpPr>
+          <p:cNvPr id="3" name="Arrow: Right 2">
+            <a:extLst>
+              <a:ext uri="{FF2B5EF4-FFF2-40B4-BE49-F238E27FC236}">
+                <a16:creationId xmlns:a16="http://schemas.microsoft.com/office/drawing/2014/main" id="{D853C63D-19CA-44C6-A70F-91D2BCE27A2B}"/>
+              </a:ext>
+            </a:extLst>
+          </p:cNvPr>
+          <p:cNvSpPr/>
+          <p:nvPr/>
+        </p:nvSpPr>
+        <p:spPr>
+          <a:xfrm>
+            <a:off x="4591965" y="3414730"/>
+            <a:ext cx="1259632" cy="513184"/>
+          </a:xfrm>
+          <a:prstGeom prst="rightArrow">
+            <a:avLst/>
+          </a:prstGeom>
+          <a:solidFill>
+            <a:schemeClr val="bg2"/>
+          </a:solidFill>
+        </p:spPr>
+        <p:style>
+          <a:lnRef idx="2">
+            <a:schemeClr val="accent1">
+              <a:shade val="50000"/>
+            </a:schemeClr>
+          </a:lnRef>
+          <a:fillRef idx="1">
+            <a:schemeClr val="accent1"/>
+          </a:fillRef>
+          <a:effectRef idx="0">
+            <a:schemeClr val="accent1"/>
+          </a:effectRef>
+          <a:fontRef idx="minor">
+            <a:schemeClr val="lt1"/>
+          </a:fontRef>
+        </p:style>
+        <p:txBody>
+          <a:bodyPr rtlCol="0" anchor="ctr"/>
+          <a:lstStyle/>
+          <a:p>
+            <a:pPr algn="ctr"/>
+            <a:endParaRPr lang="en-US"/>
+          </a:p>
+        </p:txBody>
+      </p:sp>
+    </p:spTree>
+    <p:extLst>
+      <p:ext uri="{BB962C8B-B14F-4D97-AF65-F5344CB8AC3E}">
+        <p14:creationId xmlns:p14="http://schemas.microsoft.com/office/powerpoint/2010/main" val="3092173656"/>
+      </p:ext>
+    </p:extLst>
+  </p:cSld>
+  <p:clrMapOvr>
+    <a:masterClrMapping/>
+  </p:clrMapOvr>
+</p:sld>
+</file>
+
+<file path=ppt/slides/slide16.xml><?xml version="1.0" encoding="utf-8"?>
+<p:sld xmlns:a="http://schemas.openxmlformats.org/drawingml/2006/main" xmlns:r="http://schemas.openxmlformats.org/officeDocument/2006/relationships" xmlns:p="http://schemas.openxmlformats.org/presentationml/2006/main">
+  <p:cSld>
+    <p:spTree>
+      <p:nvGrpSpPr>
+        <p:cNvPr id="1" name=""/>
+        <p:cNvGrpSpPr/>
+        <p:nvPr/>
+      </p:nvGrpSpPr>
+      <p:grpSpPr>
+        <a:xfrm>
+          <a:off x="0" y="0"/>
+          <a:ext cx="0" cy="0"/>
+          <a:chOff x="0" y="0"/>
+          <a:chExt cx="0" cy="0"/>
+        </a:xfrm>
+      </p:grpSpPr>
+      <p:sp>
+        <p:nvSpPr>
+          <p:cNvPr id="2" name="Title 1">
+            <a:extLst>
+              <a:ext uri="{FF2B5EF4-FFF2-40B4-BE49-F238E27FC236}">
+                <a16:creationId xmlns:a16="http://schemas.microsoft.com/office/drawing/2014/main" id="{F7B38E9D-D0D0-4C86-AF2C-325708B0AD23}"/>
+              </a:ext>
+            </a:extLst>
+          </p:cNvPr>
+          <p:cNvSpPr>
+            <a:spLocks noGrp="1"/>
+          </p:cNvSpPr>
+          <p:nvPr>
+            <p:ph type="title"/>
+          </p:nvPr>
+        </p:nvSpPr>
+        <p:spPr/>
+        <p:txBody>
+          <a:bodyPr/>
+          <a:lstStyle/>
+          <a:p>
+            <a:r>
+              <a:rPr lang="en-US" dirty="0"/>
+              <a:t>Let’s do this thing!</a:t>
+            </a:r>
+          </a:p>
+        </p:txBody>
+      </p:sp>
+      <p:sp>
+        <p:nvSpPr>
+          <p:cNvPr id="3" name="Content Placeholder 2">
+            <a:extLst>
+              <a:ext uri="{FF2B5EF4-FFF2-40B4-BE49-F238E27FC236}">
+                <a16:creationId xmlns:a16="http://schemas.microsoft.com/office/drawing/2014/main" id="{3EF8A8A5-B720-4C9A-A576-CF0B43A03F9C}"/>
+              </a:ext>
+            </a:extLst>
+          </p:cNvPr>
+          <p:cNvSpPr>
+            <a:spLocks noGrp="1"/>
+          </p:cNvSpPr>
+          <p:nvPr>
+            <p:ph idx="1"/>
+          </p:nvPr>
+        </p:nvSpPr>
+        <p:spPr/>
+        <p:txBody>
+          <a:bodyPr/>
+          <a:lstStyle/>
+          <a:p>
+            <a:r>
+              <a:rPr lang="en-US" dirty="0"/>
+              <a:t>Goals:</a:t>
+            </a:r>
+          </a:p>
+          <a:p>
+            <a:pPr lvl="1"/>
+            <a:r>
+              <a:rPr lang="en-US" dirty="0"/>
+              <a:t>Add ourselves as a user to access the REST API</a:t>
+            </a:r>
+          </a:p>
+          <a:p>
+            <a:pPr lvl="1"/>
+            <a:r>
+              <a:rPr lang="en-US" dirty="0"/>
+              <a:t>Retrieve data</a:t>
+            </a:r>
+          </a:p>
+          <a:p>
+            <a:pPr lvl="1"/>
+            <a:r>
+              <a:rPr lang="en-US" dirty="0"/>
+              <a:t>Make some graphs!</a:t>
+            </a:r>
+          </a:p>
+        </p:txBody>
+      </p:sp>
+    </p:spTree>
+    <p:extLst>
+      <p:ext uri="{BB962C8B-B14F-4D97-AF65-F5344CB8AC3E}">
+        <p14:creationId xmlns:p14="http://schemas.microsoft.com/office/powerpoint/2010/main" val="58623132"/>
+      </p:ext>
+    </p:extLst>
+  </p:cSld>
+  <p:clrMapOvr>
+    <a:masterClrMapping/>
+  </p:clrMapOvr>
+</p:sld>
+</file>
+
+<file path=ppt/slides/slide17.xml><?xml version="1.0" encoding="utf-8"?>
+<p:sld xmlns:a="http://schemas.openxmlformats.org/drawingml/2006/main" xmlns:r="http://schemas.openxmlformats.org/officeDocument/2006/relationships" xmlns:p="http://schemas.openxmlformats.org/presentationml/2006/main">
+  <p:cSld>
+    <p:spTree>
+      <p:nvGrpSpPr>
+        <p:cNvPr id="1" name=""/>
+        <p:cNvGrpSpPr/>
+        <p:nvPr/>
+      </p:nvGrpSpPr>
+      <p:grpSpPr>
+        <a:xfrm>
+          <a:off x="0" y="0"/>
+          <a:ext cx="0" cy="0"/>
+          <a:chOff x="0" y="0"/>
+          <a:chExt cx="0" cy="0"/>
+        </a:xfrm>
+      </p:grpSpPr>
+      <p:sp>
+        <p:nvSpPr>
+          <p:cNvPr id="2" name="Title 1">
+            <a:extLst>
+              <a:ext uri="{FF2B5EF4-FFF2-40B4-BE49-F238E27FC236}">
                 <a16:creationId xmlns:a16="http://schemas.microsoft.com/office/drawing/2014/main" id="{2DE17E8A-5D07-41AA-AF0C-C4AEF11CF0D6}"/>
               </a:ext>
             </a:extLst>
@@ -4215,10 +4810,38 @@
           <a:p>
             <a:pPr lvl="1"/>
             <a:r>
+              <a:rPr lang="en-US" dirty="0"/>
+              <a:t>Twitter @_</a:t>
+            </a:r>
+            <a:r>
+              <a:rPr lang="en-US" dirty="0" err="1"/>
+              <a:t>jasonroman</a:t>
+            </a:r>
+            <a:endParaRPr lang="en-US" dirty="0"/>
+          </a:p>
+          <a:p>
+            <a:pPr lvl="1"/>
+            <a:r>
+              <a:rPr lang="en-US"/>
+              <a:t>Email: j</a:t>
+            </a:r>
+            <a:r>
+              <a:rPr lang="en-US" dirty="0"/>
+              <a:t>@jayroman</a:t>
+            </a:r>
+            <a:r>
+              <a:rPr lang="en-US"/>
+              <a:t>.com</a:t>
+            </a:r>
+            <a:endParaRPr lang="en-US" dirty="0"/>
+          </a:p>
+          <a:p>
+            <a:pPr lvl="1"/>
+            <a:r>
               <a:rPr lang="en-US" dirty="0">
                 <a:hlinkClick r:id="rId4"/>
               </a:rPr>
-              <a:t>https://twitter.com/_jasonroman</a:t>
+              <a:t>https://github.com/jasonroman/</a:t>
             </a:r>
             <a:endParaRPr lang="en-US" dirty="0"/>
           </a:p>
@@ -4227,16 +4850,6 @@
             <a:r>
               <a:rPr lang="en-US" dirty="0">
                 <a:hlinkClick r:id="rId5"/>
-              </a:rPr>
-              <a:t>https://github.com/jasonroman/</a:t>
-            </a:r>
-            <a:endParaRPr lang="en-US" dirty="0"/>
-          </a:p>
-          <a:p>
-            <a:pPr lvl="1"/>
-            <a:r>
-              <a:rPr lang="en-US" dirty="0">
-                <a:hlinkClick r:id="rId6"/>
               </a:rPr>
               <a:t>http://jayroman.com/</a:t>
             </a:r>
@@ -4523,7 +5136,7 @@
           <p:cNvPr id="2" name="Title 1">
             <a:extLst>
               <a:ext uri="{FF2B5EF4-FFF2-40B4-BE49-F238E27FC236}">
-                <a16:creationId xmlns:a16="http://schemas.microsoft.com/office/drawing/2014/main" id="{7BBA5516-1CE5-48F7-ACEF-469D78066822}"/>
+                <a16:creationId xmlns:a16="http://schemas.microsoft.com/office/drawing/2014/main" id="{5A2415E5-821D-46C5-96D1-49116215D109}"/>
               </a:ext>
             </a:extLst>
           </p:cNvPr>
@@ -4541,7 +5154,7 @@
           <a:p>
             <a:r>
               <a:rPr lang="en-US" dirty="0"/>
-              <a:t>REST Basics</a:t>
+              <a:t>What are we doing here?</a:t>
             </a:r>
           </a:p>
         </p:txBody>
@@ -4551,7 +5164,7 @@
           <p:cNvPr id="3" name="Content Placeholder 2">
             <a:extLst>
               <a:ext uri="{FF2B5EF4-FFF2-40B4-BE49-F238E27FC236}">
-                <a16:creationId xmlns:a16="http://schemas.microsoft.com/office/drawing/2014/main" id="{5DABD2B0-4F42-4DF9-AA89-EBD5A3A2C279}"/>
+                <a16:creationId xmlns:a16="http://schemas.microsoft.com/office/drawing/2014/main" id="{32E6A961-9859-4C74-BB7A-10D65DDE0E59}"/>
               </a:ext>
             </a:extLst>
           </p:cNvPr>
@@ -4564,83 +5177,24 @@
         </p:nvSpPr>
         <p:spPr/>
         <p:txBody>
-          <a:bodyPr>
-            <a:normAutofit fontScale="85000" lnSpcReduction="20000"/>
-          </a:bodyPr>
-          <a:lstStyle/>
-          <a:p>
-            <a:r>
-              <a:rPr lang="en-US" b="1" dirty="0" err="1"/>
-              <a:t>RE</a:t>
-            </a:r>
-            <a:r>
-              <a:rPr lang="en-US" dirty="0" err="1"/>
-              <a:t>presentational</a:t>
-            </a:r>
-            <a:r>
-              <a:rPr lang="en-US" dirty="0"/>
-              <a:t> </a:t>
-            </a:r>
-            <a:r>
-              <a:rPr lang="en-US" b="1" dirty="0"/>
-              <a:t>S</a:t>
-            </a:r>
-            <a:r>
-              <a:rPr lang="en-US" dirty="0"/>
-              <a:t>tate </a:t>
-            </a:r>
-            <a:r>
-              <a:rPr lang="en-US" b="1" dirty="0"/>
-              <a:t>T</a:t>
-            </a:r>
-            <a:r>
-              <a:rPr lang="en-US" dirty="0"/>
-              <a:t>ransfer (REST)</a:t>
-            </a:r>
-          </a:p>
-          <a:p>
-            <a:endParaRPr lang="en-US" dirty="0"/>
-          </a:p>
-          <a:p>
-            <a:r>
-              <a:rPr lang="en-US" dirty="0"/>
-              <a:t>Uniform communication architecture</a:t>
-            </a:r>
-          </a:p>
-          <a:p>
-            <a:endParaRPr lang="en-US" dirty="0"/>
-          </a:p>
-          <a:p>
-            <a:r>
-              <a:rPr lang="en-US" dirty="0"/>
-              <a:t>Stateless – each request treated as new/independent</a:t>
-            </a:r>
-          </a:p>
-          <a:p>
-            <a:endParaRPr lang="en-US" dirty="0"/>
-          </a:p>
-          <a:p>
-            <a:r>
-              <a:rPr lang="en-US" dirty="0"/>
-              <a:t>Client/Server – no dependency between each other</a:t>
-            </a:r>
-          </a:p>
-          <a:p>
-            <a:endParaRPr lang="en-US" dirty="0"/>
-          </a:p>
-          <a:p>
-            <a:r>
-              <a:rPr lang="en-US" dirty="0"/>
-              <a:t>Cacheable</a:t>
-            </a:r>
-          </a:p>
-          <a:p>
-            <a:endParaRPr lang="en-US" dirty="0"/>
-          </a:p>
-          <a:p>
-            <a:r>
-              <a:rPr lang="en-US" dirty="0"/>
-              <a:t>Layered</a:t>
+          <a:bodyPr/>
+          <a:lstStyle/>
+          <a:p>
+            <a:r>
+              <a:rPr lang="en-US" dirty="0"/>
+              <a:t>Someone else has data</a:t>
+            </a:r>
+          </a:p>
+          <a:p>
+            <a:r>
+              <a:rPr lang="en-US" dirty="0"/>
+              <a:t>Get it!</a:t>
+            </a:r>
+          </a:p>
+          <a:p>
+            <a:r>
+              <a:rPr lang="en-US" dirty="0"/>
+              <a:t>Make it pretty</a:t>
             </a:r>
           </a:p>
         </p:txBody>
@@ -4648,7 +5202,7 @@
     </p:spTree>
     <p:extLst>
       <p:ext uri="{BB962C8B-B14F-4D97-AF65-F5344CB8AC3E}">
-        <p14:creationId xmlns:p14="http://schemas.microsoft.com/office/powerpoint/2010/main" val="769954474"/>
+        <p14:creationId xmlns:p14="http://schemas.microsoft.com/office/powerpoint/2010/main" val="849855984"/>
       </p:ext>
     </p:extLst>
   </p:cSld>
@@ -4677,150 +5231,505 @@
       </p:grpSpPr>
       <p:sp>
         <p:nvSpPr>
-          <p:cNvPr id="2" name="Title 1">
-            <a:extLst>
-              <a:ext uri="{FF2B5EF4-FFF2-40B4-BE49-F238E27FC236}">
-                <a16:creationId xmlns:a16="http://schemas.microsoft.com/office/drawing/2014/main" id="{B72D55D4-007F-4DDF-A765-7149095DB9E6}"/>
-              </a:ext>
-            </a:extLst>
-          </p:cNvPr>
-          <p:cNvSpPr>
-            <a:spLocks noGrp="1"/>
-          </p:cNvSpPr>
-          <p:nvPr>
-            <p:ph type="title"/>
-          </p:nvPr>
-        </p:nvSpPr>
-        <p:spPr/>
-        <p:txBody>
-          <a:bodyPr/>
-          <a:lstStyle/>
-          <a:p>
-            <a:r>
-              <a:rPr lang="en-US" dirty="0"/>
-              <a:t>REST APIs</a:t>
-            </a:r>
-          </a:p>
-        </p:txBody>
-      </p:sp>
-      <p:sp>
-        <p:nvSpPr>
-          <p:cNvPr id="3" name="Content Placeholder 2">
-            <a:extLst>
-              <a:ext uri="{FF2B5EF4-FFF2-40B4-BE49-F238E27FC236}">
-                <a16:creationId xmlns:a16="http://schemas.microsoft.com/office/drawing/2014/main" id="{330438BD-4938-4B65-B5C8-D9EDA468B39F}"/>
-              </a:ext>
-            </a:extLst>
-          </p:cNvPr>
-          <p:cNvSpPr>
-            <a:spLocks noGrp="1"/>
-          </p:cNvSpPr>
-          <p:nvPr>
-            <p:ph idx="1"/>
-          </p:nvPr>
-        </p:nvSpPr>
-        <p:spPr/>
-        <p:txBody>
-          <a:bodyPr>
-            <a:normAutofit fontScale="92500" lnSpcReduction="20000"/>
+          <p:cNvPr id="13" name="Flowchart: Magnetic Disk 12">
+            <a:extLst>
+              <a:ext uri="{FF2B5EF4-FFF2-40B4-BE49-F238E27FC236}">
+                <a16:creationId xmlns:a16="http://schemas.microsoft.com/office/drawing/2014/main" id="{70EC1397-A8EB-48E9-A934-1B4E35197ACD}"/>
+              </a:ext>
+            </a:extLst>
+          </p:cNvPr>
+          <p:cNvSpPr/>
+          <p:nvPr/>
+        </p:nvSpPr>
+        <p:spPr>
+          <a:xfrm>
+            <a:off x="7637406" y="1382300"/>
+            <a:ext cx="2130803" cy="964734"/>
+          </a:xfrm>
+          <a:prstGeom prst="flowChartMagneticDisk">
+            <a:avLst/>
+          </a:prstGeom>
+          <a:solidFill>
+            <a:schemeClr val="bg1">
+              <a:lumMod val="50000"/>
+            </a:schemeClr>
+          </a:solidFill>
+        </p:spPr>
+        <p:style>
+          <a:lnRef idx="2">
+            <a:schemeClr val="accent1">
+              <a:shade val="50000"/>
+            </a:schemeClr>
+          </a:lnRef>
+          <a:fillRef idx="1">
+            <a:schemeClr val="accent1"/>
+          </a:fillRef>
+          <a:effectRef idx="0">
+            <a:schemeClr val="accent1"/>
+          </a:effectRef>
+          <a:fontRef idx="minor">
+            <a:schemeClr val="lt1"/>
+          </a:fontRef>
+        </p:style>
+        <p:txBody>
+          <a:bodyPr rtlCol="0" anchor="ctr"/>
+          <a:lstStyle/>
+          <a:p>
+            <a:pPr algn="ctr"/>
+            <a:r>
+              <a:rPr lang="en-US" dirty="0"/>
+              <a:t>Server / REST API</a:t>
+            </a:r>
+          </a:p>
+        </p:txBody>
+      </p:sp>
+      <p:sp>
+        <p:nvSpPr>
+          <p:cNvPr id="14" name="Flowchart: Process 13">
+            <a:extLst>
+              <a:ext uri="{FF2B5EF4-FFF2-40B4-BE49-F238E27FC236}">
+                <a16:creationId xmlns:a16="http://schemas.microsoft.com/office/drawing/2014/main" id="{06E0F24A-D70B-4F7C-A667-B3D0B0AE3F84}"/>
+              </a:ext>
+            </a:extLst>
+          </p:cNvPr>
+          <p:cNvSpPr/>
+          <p:nvPr/>
+        </p:nvSpPr>
+        <p:spPr>
+          <a:xfrm>
+            <a:off x="1773500" y="1382300"/>
+            <a:ext cx="1770077" cy="964734"/>
+          </a:xfrm>
+          <a:prstGeom prst="flowChartProcess">
+            <a:avLst/>
+          </a:prstGeom>
+        </p:spPr>
+        <p:style>
+          <a:lnRef idx="2">
+            <a:schemeClr val="accent1">
+              <a:shade val="50000"/>
+            </a:schemeClr>
+          </a:lnRef>
+          <a:fillRef idx="1">
+            <a:schemeClr val="accent1"/>
+          </a:fillRef>
+          <a:effectRef idx="0">
+            <a:schemeClr val="accent1"/>
+          </a:effectRef>
+          <a:fontRef idx="minor">
+            <a:schemeClr val="lt1"/>
+          </a:fontRef>
+        </p:style>
+        <p:txBody>
+          <a:bodyPr rtlCol="0" anchor="ctr"/>
+          <a:lstStyle/>
+          <a:p>
+            <a:pPr algn="ctr"/>
+            <a:r>
+              <a:rPr lang="en-US" dirty="0"/>
+              <a:t>Client</a:t>
+            </a:r>
+          </a:p>
+        </p:txBody>
+      </p:sp>
+      <p:cxnSp>
+        <p:nvCxnSpPr>
+          <p:cNvPr id="19" name="Straight Arrow Connector 18">
+            <a:extLst>
+              <a:ext uri="{FF2B5EF4-FFF2-40B4-BE49-F238E27FC236}">
+                <a16:creationId xmlns:a16="http://schemas.microsoft.com/office/drawing/2014/main" id="{DDD48E5B-2F88-4B97-AE2D-7B833EF4A2FF}"/>
+              </a:ext>
+            </a:extLst>
+          </p:cNvPr>
+          <p:cNvCxnSpPr>
+            <a:cxnSpLocks/>
+            <a:stCxn id="14" idx="3"/>
+            <a:endCxn id="13" idx="2"/>
+          </p:cNvCxnSpPr>
+          <p:nvPr/>
+        </p:nvCxnSpPr>
+        <p:spPr>
+          <a:xfrm>
+            <a:off x="3543577" y="1864667"/>
+            <a:ext cx="4093829" cy="0"/>
+          </a:xfrm>
+          <a:prstGeom prst="straightConnector1">
+            <a:avLst/>
+          </a:prstGeom>
+          <a:ln>
+            <a:tailEnd type="triangle" w="lg" len="lg"/>
+          </a:ln>
+        </p:spPr>
+        <p:style>
+          <a:lnRef idx="1">
+            <a:schemeClr val="accent1"/>
+          </a:lnRef>
+          <a:fillRef idx="0">
+            <a:schemeClr val="accent1"/>
+          </a:fillRef>
+          <a:effectRef idx="0">
+            <a:schemeClr val="accent1"/>
+          </a:effectRef>
+          <a:fontRef idx="minor">
+            <a:schemeClr val="tx1"/>
+          </a:fontRef>
+        </p:style>
+      </p:cxnSp>
+      <p:cxnSp>
+        <p:nvCxnSpPr>
+          <p:cNvPr id="27" name="Connector: Elbow 26">
+            <a:extLst>
+              <a:ext uri="{FF2B5EF4-FFF2-40B4-BE49-F238E27FC236}">
+                <a16:creationId xmlns:a16="http://schemas.microsoft.com/office/drawing/2014/main" id="{2D2123DB-B39C-42B7-B847-17B989989649}"/>
+              </a:ext>
+            </a:extLst>
+          </p:cNvPr>
+          <p:cNvCxnSpPr>
+            <a:cxnSpLocks/>
+            <a:stCxn id="13" idx="3"/>
+            <a:endCxn id="14" idx="2"/>
+          </p:cNvCxnSpPr>
+          <p:nvPr/>
+        </p:nvCxnSpPr>
+        <p:spPr>
+          <a:xfrm rot="5400000">
+            <a:off x="5680674" y="-675100"/>
+            <a:ext cx="12700" cy="6044269"/>
+          </a:xfrm>
+          <a:prstGeom prst="bentConnector3">
+            <a:avLst>
+              <a:gd name="adj1" fmla="val 1800000"/>
+            </a:avLst>
+          </a:prstGeom>
+          <a:ln>
+            <a:tailEnd type="triangle" w="lg" len="lg"/>
+          </a:ln>
+        </p:spPr>
+        <p:style>
+          <a:lnRef idx="1">
+            <a:schemeClr val="accent1"/>
+          </a:lnRef>
+          <a:fillRef idx="0">
+            <a:schemeClr val="accent1"/>
+          </a:fillRef>
+          <a:effectRef idx="0">
+            <a:schemeClr val="accent1"/>
+          </a:effectRef>
+          <a:fontRef idx="minor">
+            <a:schemeClr val="tx1"/>
+          </a:fontRef>
+        </p:style>
+      </p:cxnSp>
+      <p:sp>
+        <p:nvSpPr>
+          <p:cNvPr id="30" name="TextBox 29">
+            <a:extLst>
+              <a:ext uri="{FF2B5EF4-FFF2-40B4-BE49-F238E27FC236}">
+                <a16:creationId xmlns:a16="http://schemas.microsoft.com/office/drawing/2014/main" id="{F3BD2CE5-55E5-4415-AB6A-F792DD24D467}"/>
+              </a:ext>
+            </a:extLst>
+          </p:cNvPr>
+          <p:cNvSpPr txBox="1"/>
+          <p:nvPr/>
+        </p:nvSpPr>
+        <p:spPr>
+          <a:xfrm>
+            <a:off x="4634140" y="1522938"/>
+            <a:ext cx="1912703" cy="338554"/>
+          </a:xfrm>
+          <a:prstGeom prst="rect">
+            <a:avLst/>
+          </a:prstGeom>
+          <a:noFill/>
+        </p:spPr>
+        <p:txBody>
+          <a:bodyPr wrap="none" rtlCol="0">
+            <a:spAutoFit/>
           </a:bodyPr>
           <a:lstStyle/>
           <a:p>
             <a:r>
-              <a:rPr lang="en-US" dirty="0"/>
-              <a:t>API – Application Program Interface</a:t>
-            </a:r>
-          </a:p>
-          <a:p>
-            <a:r>
-              <a:rPr lang="en-US" dirty="0"/>
-              <a:t>HTTP request methods used to interact</a:t>
-            </a:r>
-          </a:p>
-          <a:p>
-            <a:r>
-              <a:rPr lang="en-US" dirty="0"/>
-              <a:t>Used for retrieving and modifying data</a:t>
-            </a:r>
-          </a:p>
-          <a:p>
-            <a:r>
-              <a:rPr lang="en-US" dirty="0"/>
-              <a:t>Pros:</a:t>
-            </a:r>
-          </a:p>
-          <a:p>
-            <a:pPr lvl="1"/>
-            <a:r>
-              <a:rPr lang="en-US" dirty="0"/>
-              <a:t>Standard method of communication</a:t>
-            </a:r>
-          </a:p>
-          <a:p>
-            <a:pPr lvl="1"/>
-            <a:r>
-              <a:rPr lang="en-US" dirty="0"/>
-              <a:t>Programming language-agnostic ; use the best tool for the job</a:t>
-            </a:r>
-          </a:p>
-          <a:p>
-            <a:pPr lvl="1"/>
-            <a:r>
-              <a:rPr lang="en-US" dirty="0"/>
-              <a:t>Neither the server nor the client is dependent on each other</a:t>
-            </a:r>
-          </a:p>
-          <a:p>
-            <a:pPr lvl="1"/>
-            <a:r>
-              <a:rPr lang="en-US" dirty="0"/>
-              <a:t>Simple to secure</a:t>
-            </a:r>
-          </a:p>
-          <a:p>
-            <a:pPr lvl="1"/>
-            <a:r>
-              <a:rPr lang="en-US" dirty="0"/>
-              <a:t>Can use without writing code (</a:t>
-            </a:r>
-            <a:r>
-              <a:rPr lang="en-US" dirty="0" err="1"/>
-              <a:t>cURL</a:t>
-            </a:r>
-            <a:r>
-              <a:rPr lang="en-US" dirty="0"/>
-              <a:t>)</a:t>
-            </a:r>
-          </a:p>
-          <a:p>
-            <a:pPr lvl="1"/>
-            <a:r>
-              <a:rPr lang="en-US" dirty="0"/>
-              <a:t>Securable</a:t>
-            </a:r>
-          </a:p>
-          <a:p>
-            <a:r>
-              <a:rPr lang="en-US" dirty="0"/>
-              <a:t>Cons:</a:t>
-            </a:r>
-          </a:p>
-          <a:p>
-            <a:pPr lvl="1"/>
-            <a:r>
-              <a:rPr lang="en-US" dirty="0"/>
-              <a:t>??</a:t>
-            </a:r>
-          </a:p>
-          <a:p>
-            <a:endParaRPr lang="en-US" dirty="0"/>
+              <a:rPr lang="en-US" sz="1600" dirty="0">
+                <a:latin typeface="Courier New" panose="02070309020205020404" pitchFamily="49" charset="0"/>
+                <a:cs typeface="Courier New" panose="02070309020205020404" pitchFamily="49" charset="0"/>
+              </a:rPr>
+              <a:t>GET /</a:t>
+            </a:r>
+            <a:r>
+              <a:rPr lang="en-US" sz="1600" dirty="0" err="1">
+                <a:latin typeface="Courier New" panose="02070309020205020404" pitchFamily="49" charset="0"/>
+                <a:cs typeface="Courier New" panose="02070309020205020404" pitchFamily="49" charset="0"/>
+              </a:rPr>
+              <a:t>api</a:t>
+            </a:r>
+            <a:r>
+              <a:rPr lang="en-US" sz="1600" dirty="0">
+                <a:latin typeface="Courier New" panose="02070309020205020404" pitchFamily="49" charset="0"/>
+                <a:cs typeface="Courier New" panose="02070309020205020404" pitchFamily="49" charset="0"/>
+              </a:rPr>
+              <a:t>/users</a:t>
+            </a:r>
+          </a:p>
+        </p:txBody>
+      </p:sp>
+      <p:sp>
+        <p:nvSpPr>
+          <p:cNvPr id="31" name="TextBox 30">
+            <a:extLst>
+              <a:ext uri="{FF2B5EF4-FFF2-40B4-BE49-F238E27FC236}">
+                <a16:creationId xmlns:a16="http://schemas.microsoft.com/office/drawing/2014/main" id="{62358C9D-BE54-4AC3-A85B-4062BB462D1F}"/>
+              </a:ext>
+            </a:extLst>
+          </p:cNvPr>
+          <p:cNvSpPr txBox="1"/>
+          <p:nvPr/>
+        </p:nvSpPr>
+        <p:spPr>
+          <a:xfrm>
+            <a:off x="3801771" y="2554724"/>
+            <a:ext cx="4011034" cy="338554"/>
+          </a:xfrm>
+          <a:prstGeom prst="rect">
+            <a:avLst/>
+          </a:prstGeom>
+          <a:noFill/>
+        </p:spPr>
+        <p:txBody>
+          <a:bodyPr wrap="none" rtlCol="0">
+            <a:spAutoFit/>
+          </a:bodyPr>
+          <a:lstStyle/>
+          <a:p>
+            <a:r>
+              <a:rPr lang="en-US" sz="1600" dirty="0">
+                <a:latin typeface="Courier New" panose="02070309020205020404" pitchFamily="49" charset="0"/>
+                <a:cs typeface="Courier New" panose="02070309020205020404" pitchFamily="49" charset="0"/>
+              </a:rPr>
+              <a:t>[{id: 1, username: '</a:t>
+            </a:r>
+            <a:r>
+              <a:rPr lang="en-US" sz="1600" dirty="0" err="1">
+                <a:latin typeface="Courier New" panose="02070309020205020404" pitchFamily="49" charset="0"/>
+                <a:cs typeface="Courier New" panose="02070309020205020404" pitchFamily="49" charset="0"/>
+              </a:rPr>
+              <a:t>jason</a:t>
+            </a:r>
+            <a:r>
+              <a:rPr lang="en-US" sz="1600" dirty="0">
+                <a:latin typeface="Courier New" panose="02070309020205020404" pitchFamily="49" charset="0"/>
+                <a:cs typeface="Courier New" panose="02070309020205020404" pitchFamily="49" charset="0"/>
+              </a:rPr>
+              <a:t>'}, …]</a:t>
+            </a:r>
+          </a:p>
+        </p:txBody>
+      </p:sp>
+      <p:sp>
+        <p:nvSpPr>
+          <p:cNvPr id="32" name="Flowchart: Data 31">
+            <a:extLst>
+              <a:ext uri="{FF2B5EF4-FFF2-40B4-BE49-F238E27FC236}">
+                <a16:creationId xmlns:a16="http://schemas.microsoft.com/office/drawing/2014/main" id="{A8E3380B-BE02-479D-AC74-559AFA928BCF}"/>
+              </a:ext>
+            </a:extLst>
+          </p:cNvPr>
+          <p:cNvSpPr/>
+          <p:nvPr/>
+        </p:nvSpPr>
+        <p:spPr>
+          <a:xfrm>
+            <a:off x="1521788" y="4050855"/>
+            <a:ext cx="2071396" cy="971451"/>
+          </a:xfrm>
+          <a:prstGeom prst="flowChartInputOutput">
+            <a:avLst/>
+          </a:prstGeom>
+          <a:solidFill>
+            <a:schemeClr val="accent6">
+              <a:lumMod val="75000"/>
+            </a:schemeClr>
+          </a:solidFill>
+        </p:spPr>
+        <p:style>
+          <a:lnRef idx="2">
+            <a:schemeClr val="accent1">
+              <a:shade val="50000"/>
+            </a:schemeClr>
+          </a:lnRef>
+          <a:fillRef idx="1">
+            <a:schemeClr val="accent1"/>
+          </a:fillRef>
+          <a:effectRef idx="0">
+            <a:schemeClr val="accent1"/>
+          </a:effectRef>
+          <a:fontRef idx="minor">
+            <a:schemeClr val="lt1"/>
+          </a:fontRef>
+        </p:style>
+        <p:txBody>
+          <a:bodyPr rtlCol="0" anchor="ctr"/>
+          <a:lstStyle/>
+          <a:p>
+            <a:pPr algn="ctr"/>
+            <a:r>
+              <a:rPr lang="en-US" dirty="0"/>
+              <a:t>Transform Data</a:t>
+            </a:r>
+          </a:p>
+        </p:txBody>
+      </p:sp>
+      <p:cxnSp>
+        <p:nvCxnSpPr>
+          <p:cNvPr id="34" name="Straight Arrow Connector 33">
+            <a:extLst>
+              <a:ext uri="{FF2B5EF4-FFF2-40B4-BE49-F238E27FC236}">
+                <a16:creationId xmlns:a16="http://schemas.microsoft.com/office/drawing/2014/main" id="{482171C8-C7FD-4BD5-89DF-26F1E1E1F3DD}"/>
+              </a:ext>
+            </a:extLst>
+          </p:cNvPr>
+          <p:cNvCxnSpPr>
+            <a:cxnSpLocks/>
+            <a:endCxn id="32" idx="1"/>
+          </p:cNvCxnSpPr>
+          <p:nvPr/>
+        </p:nvCxnSpPr>
+        <p:spPr>
+          <a:xfrm>
+            <a:off x="2557486" y="2353385"/>
+            <a:ext cx="0" cy="1697470"/>
+          </a:xfrm>
+          <a:prstGeom prst="straightConnector1">
+            <a:avLst/>
+          </a:prstGeom>
+          <a:ln>
+            <a:tailEnd type="triangle" w="lg" len="lg"/>
+          </a:ln>
+        </p:spPr>
+        <p:style>
+          <a:lnRef idx="1">
+            <a:schemeClr val="accent1"/>
+          </a:lnRef>
+          <a:fillRef idx="0">
+            <a:schemeClr val="accent1"/>
+          </a:fillRef>
+          <a:effectRef idx="0">
+            <a:schemeClr val="accent1"/>
+          </a:effectRef>
+          <a:fontRef idx="minor">
+            <a:schemeClr val="tx1"/>
+          </a:fontRef>
+        </p:style>
+      </p:cxnSp>
+      <p:pic>
+        <p:nvPicPr>
+          <p:cNvPr id="37" name="Picture 36">
+            <a:extLst>
+              <a:ext uri="{FF2B5EF4-FFF2-40B4-BE49-F238E27FC236}">
+                <a16:creationId xmlns:a16="http://schemas.microsoft.com/office/drawing/2014/main" id="{94CBC95A-B437-4778-AA60-7C8504CA4BDA}"/>
+              </a:ext>
+            </a:extLst>
+          </p:cNvPr>
+          <p:cNvPicPr>
+            <a:picLocks noChangeAspect="1"/>
+          </p:cNvPicPr>
+          <p:nvPr/>
+        </p:nvPicPr>
+        <p:blipFill>
+          <a:blip r:embed="rId2"/>
+          <a:stretch>
+            <a:fillRect/>
+          </a:stretch>
+        </p:blipFill>
+        <p:spPr>
+          <a:xfrm>
+            <a:off x="5590491" y="3305417"/>
+            <a:ext cx="4840425" cy="2919322"/>
+          </a:xfrm>
+          <a:prstGeom prst="rect">
+            <a:avLst/>
+          </a:prstGeom>
+        </p:spPr>
+      </p:pic>
+      <p:cxnSp>
+        <p:nvCxnSpPr>
+          <p:cNvPr id="39" name="Straight Arrow Connector 38">
+            <a:extLst>
+              <a:ext uri="{FF2B5EF4-FFF2-40B4-BE49-F238E27FC236}">
+                <a16:creationId xmlns:a16="http://schemas.microsoft.com/office/drawing/2014/main" id="{68B5B8FC-5D96-431B-8C22-24A6A65BE5BA}"/>
+              </a:ext>
+            </a:extLst>
+          </p:cNvPr>
+          <p:cNvCxnSpPr>
+            <a:stCxn id="32" idx="5"/>
+          </p:cNvCxnSpPr>
+          <p:nvPr/>
+        </p:nvCxnSpPr>
+        <p:spPr>
+          <a:xfrm flipV="1">
+            <a:off x="3386044" y="4536580"/>
+            <a:ext cx="2300979" cy="1"/>
+          </a:xfrm>
+          <a:prstGeom prst="straightConnector1">
+            <a:avLst/>
+          </a:prstGeom>
+          <a:ln>
+            <a:tailEnd type="triangle" w="lg" len="lg"/>
+          </a:ln>
+        </p:spPr>
+        <p:style>
+          <a:lnRef idx="1">
+            <a:schemeClr val="accent1"/>
+          </a:lnRef>
+          <a:fillRef idx="0">
+            <a:schemeClr val="accent1"/>
+          </a:fillRef>
+          <a:effectRef idx="0">
+            <a:schemeClr val="accent1"/>
+          </a:effectRef>
+          <a:fontRef idx="minor">
+            <a:schemeClr val="tx1"/>
+          </a:fontRef>
+        </p:style>
+      </p:cxnSp>
+      <p:sp>
+        <p:nvSpPr>
+          <p:cNvPr id="41" name="TextBox 40">
+            <a:extLst>
+              <a:ext uri="{FF2B5EF4-FFF2-40B4-BE49-F238E27FC236}">
+                <a16:creationId xmlns:a16="http://schemas.microsoft.com/office/drawing/2014/main" id="{6A140895-4E28-463F-BB70-EBED4A517C9D}"/>
+              </a:ext>
+            </a:extLst>
+          </p:cNvPr>
+          <p:cNvSpPr txBox="1"/>
+          <p:nvPr/>
+        </p:nvSpPr>
+        <p:spPr>
+          <a:xfrm>
+            <a:off x="1043388" y="839754"/>
+            <a:ext cx="1514098" cy="461665"/>
+          </a:xfrm>
+          <a:prstGeom prst="rect">
+            <a:avLst/>
+          </a:prstGeom>
+          <a:noFill/>
+        </p:spPr>
+        <p:txBody>
+          <a:bodyPr wrap="square" rtlCol="0">
+            <a:spAutoFit/>
+          </a:bodyPr>
+          <a:lstStyle/>
+          <a:p>
+            <a:r>
+              <a:rPr lang="en-US" sz="2400" dirty="0"/>
+              <a:t>Process:</a:t>
+            </a:r>
           </a:p>
         </p:txBody>
       </p:sp>
     </p:spTree>
     <p:extLst>
       <p:ext uri="{BB962C8B-B14F-4D97-AF65-F5344CB8AC3E}">
-        <p14:creationId xmlns:p14="http://schemas.microsoft.com/office/powerpoint/2010/main" val="3272526947"/>
+        <p14:creationId xmlns:p14="http://schemas.microsoft.com/office/powerpoint/2010/main" val="1957286117"/>
       </p:ext>
     </p:extLst>
   </p:cSld>
@@ -4852,7 +5761,7 @@
           <p:cNvPr id="2" name="Title 1">
             <a:extLst>
               <a:ext uri="{FF2B5EF4-FFF2-40B4-BE49-F238E27FC236}">
-                <a16:creationId xmlns:a16="http://schemas.microsoft.com/office/drawing/2014/main" id="{4668879E-16D8-41E3-9496-B4144A3A21A6}"/>
+                <a16:creationId xmlns:a16="http://schemas.microsoft.com/office/drawing/2014/main" id="{7BBA5516-1CE5-48F7-ACEF-469D78066822}"/>
               </a:ext>
             </a:extLst>
           </p:cNvPr>
@@ -4870,7 +5779,7 @@
           <a:p>
             <a:r>
               <a:rPr lang="en-US" dirty="0"/>
-              <a:t>REST Alternatives</a:t>
+              <a:t>REST Basics</a:t>
             </a:r>
           </a:p>
         </p:txBody>
@@ -4880,7 +5789,7 @@
           <p:cNvPr id="3" name="Content Placeholder 2">
             <a:extLst>
               <a:ext uri="{FF2B5EF4-FFF2-40B4-BE49-F238E27FC236}">
-                <a16:creationId xmlns:a16="http://schemas.microsoft.com/office/drawing/2014/main" id="{07E266C7-EB9C-4B6F-8AD8-601CE4EFED2F}"/>
+                <a16:creationId xmlns:a16="http://schemas.microsoft.com/office/drawing/2014/main" id="{5DABD2B0-4F42-4DF9-AA89-EBD5A3A2C279}"/>
               </a:ext>
             </a:extLst>
           </p:cNvPr>
@@ -4894,67 +5803,46 @@
         <p:spPr/>
         <p:txBody>
           <a:bodyPr>
-            <a:normAutofit fontScale="92500" lnSpcReduction="20000"/>
+            <a:normAutofit fontScale="85000" lnSpcReduction="20000"/>
           </a:bodyPr>
           <a:lstStyle/>
           <a:p>
             <a:r>
-              <a:rPr lang="en-US" dirty="0"/>
-              <a:t>SOAP (Simple Object Access Protocol)</a:t>
-            </a:r>
-          </a:p>
-          <a:p>
-            <a:pPr lvl="1"/>
-            <a:r>
-              <a:rPr lang="en-US" dirty="0"/>
-              <a:t>XML-based, no JSON support</a:t>
-            </a:r>
-          </a:p>
-          <a:p>
-            <a:pPr lvl="1"/>
-            <a:r>
-              <a:rPr lang="en-US" dirty="0"/>
-              <a:t>Generally slower, uses more bandwidth, rapidly going out of style</a:t>
-            </a:r>
-          </a:p>
-          <a:p>
-            <a:pPr lvl="1"/>
-            <a:r>
-              <a:rPr lang="en-US" dirty="0"/>
-              <a:t>Not fun to use</a:t>
-            </a:r>
-          </a:p>
-          <a:p>
-            <a:pPr marL="457200" lvl="1" indent="0">
-              <a:buNone/>
-            </a:pPr>
+              <a:rPr lang="en-US" b="1" dirty="0" err="1"/>
+              <a:t>RE</a:t>
+            </a:r>
+            <a:r>
+              <a:rPr lang="en-US" dirty="0" err="1"/>
+              <a:t>presentational</a:t>
+            </a:r>
+            <a:r>
+              <a:rPr lang="en-US" dirty="0"/>
+              <a:t> </a:t>
+            </a:r>
+            <a:r>
+              <a:rPr lang="en-US" b="1" dirty="0"/>
+              <a:t>S</a:t>
+            </a:r>
+            <a:r>
+              <a:rPr lang="en-US" dirty="0"/>
+              <a:t>tate </a:t>
+            </a:r>
+            <a:r>
+              <a:rPr lang="en-US" b="1" dirty="0"/>
+              <a:t>T</a:t>
+            </a:r>
+            <a:r>
+              <a:rPr lang="en-US" dirty="0"/>
+              <a:t>ransfer (REST)</a:t>
+            </a:r>
+          </a:p>
+          <a:p>
             <a:endParaRPr lang="en-US" dirty="0"/>
           </a:p>
           <a:p>
             <a:r>
               <a:rPr lang="en-US" dirty="0"/>
-              <a:t>RPC (Remote Procedure Calls)</a:t>
-            </a:r>
-          </a:p>
-          <a:p>
-            <a:pPr lvl="1"/>
-            <a:r>
-              <a:rPr lang="en-US" dirty="0"/>
-              <a:t>Verb-based – URI is the action</a:t>
-            </a:r>
-          </a:p>
-          <a:p>
-            <a:pPr lvl="1"/>
-            <a:r>
-              <a:rPr lang="en-US" dirty="0"/>
-              <a:t>Less Common</a:t>
-            </a:r>
-          </a:p>
-          <a:p>
-            <a:pPr lvl="1"/>
-            <a:r>
-              <a:rPr lang="en-US" dirty="0"/>
-              <a:t>Requires underlying knowledge of the system being accessed</a:t>
+              <a:t>Uniform communication architecture</a:t>
             </a:r>
           </a:p>
           <a:p>
@@ -4963,14 +5851,34 @@
           <a:p>
             <a:r>
               <a:rPr lang="en-US" dirty="0"/>
-              <a:t>Web Scraping</a:t>
-            </a:r>
-          </a:p>
-          <a:p>
-            <a:pPr lvl="1"/>
-            <a:r>
-              <a:rPr lang="en-US" dirty="0"/>
-              <a:t>Often your only choice</a:t>
+              <a:t>Stateless – each request treated as new/independent</a:t>
+            </a:r>
+          </a:p>
+          <a:p>
+            <a:endParaRPr lang="en-US" dirty="0"/>
+          </a:p>
+          <a:p>
+            <a:r>
+              <a:rPr lang="en-US" dirty="0"/>
+              <a:t>Client/Server – no dependency between each other</a:t>
+            </a:r>
+          </a:p>
+          <a:p>
+            <a:endParaRPr lang="en-US" dirty="0"/>
+          </a:p>
+          <a:p>
+            <a:r>
+              <a:rPr lang="en-US" dirty="0"/>
+              <a:t>Cacheable</a:t>
+            </a:r>
+          </a:p>
+          <a:p>
+            <a:endParaRPr lang="en-US" dirty="0"/>
+          </a:p>
+          <a:p>
+            <a:r>
+              <a:rPr lang="en-US" dirty="0"/>
+              <a:t>Layered</a:t>
             </a:r>
           </a:p>
         </p:txBody>
@@ -4978,7 +5886,7 @@
     </p:spTree>
     <p:extLst>
       <p:ext uri="{BB962C8B-B14F-4D97-AF65-F5344CB8AC3E}">
-        <p14:creationId xmlns:p14="http://schemas.microsoft.com/office/powerpoint/2010/main" val="952043324"/>
+        <p14:creationId xmlns:p14="http://schemas.microsoft.com/office/powerpoint/2010/main" val="769954474"/>
       </p:ext>
     </p:extLst>
   </p:cSld>
@@ -5010,7 +5918,7 @@
           <p:cNvPr id="2" name="Title 1">
             <a:extLst>
               <a:ext uri="{FF2B5EF4-FFF2-40B4-BE49-F238E27FC236}">
-                <a16:creationId xmlns:a16="http://schemas.microsoft.com/office/drawing/2014/main" id="{93A12AE6-E689-4B0B-A037-C639EC6231F2}"/>
+                <a16:creationId xmlns:a16="http://schemas.microsoft.com/office/drawing/2014/main" id="{B72D55D4-007F-4DDF-A765-7149095DB9E6}"/>
               </a:ext>
             </a:extLst>
           </p:cNvPr>
@@ -5028,7 +5936,7 @@
           <a:p>
             <a:r>
               <a:rPr lang="en-US" dirty="0"/>
-              <a:t>HTTP Request Methods</a:t>
+              <a:t>REST APIs</a:t>
             </a:r>
           </a:p>
         </p:txBody>
@@ -5038,7 +5946,7 @@
           <p:cNvPr id="3" name="Content Placeholder 2">
             <a:extLst>
               <a:ext uri="{FF2B5EF4-FFF2-40B4-BE49-F238E27FC236}">
-                <a16:creationId xmlns:a16="http://schemas.microsoft.com/office/drawing/2014/main" id="{52EF77AE-F9AB-433C-9AC2-B505129A28E0}"/>
+                <a16:creationId xmlns:a16="http://schemas.microsoft.com/office/drawing/2014/main" id="{330438BD-4938-4B65-B5C8-D9EDA468B39F}"/>
               </a:ext>
             </a:extLst>
           </p:cNvPr>
@@ -5052,80 +5960,90 @@
         <p:spPr/>
         <p:txBody>
           <a:bodyPr>
-            <a:normAutofit/>
+            <a:normAutofit fontScale="92500" lnSpcReduction="10000"/>
           </a:bodyPr>
           <a:lstStyle/>
           <a:p>
             <a:r>
               <a:rPr lang="en-US" dirty="0"/>
-              <a:t>Methods:</a:t>
+              <a:t>API – Application Program Interface</a:t>
+            </a:r>
+          </a:p>
+          <a:p>
+            <a:r>
+              <a:rPr lang="en-US" dirty="0"/>
+              <a:t>Used for retrieving and modifying data</a:t>
+            </a:r>
+          </a:p>
+          <a:p>
+            <a:r>
+              <a:rPr lang="en-US" dirty="0"/>
+              <a:t>HTTP request methods used to interact</a:t>
+            </a:r>
+          </a:p>
+          <a:p>
+            <a:r>
+              <a:rPr lang="en-US" dirty="0"/>
+              <a:t>Pros:</a:t>
             </a:r>
           </a:p>
           <a:p>
             <a:pPr lvl="1"/>
             <a:r>
               <a:rPr lang="en-US" dirty="0"/>
-              <a:t>GET – request resource – idempotent</a:t>
+              <a:t>Standard method of communication</a:t>
             </a:r>
           </a:p>
           <a:p>
             <a:pPr lvl="1"/>
             <a:r>
               <a:rPr lang="en-US" dirty="0"/>
-              <a:t>POST – submit resource – not idempotent</a:t>
+              <a:t>Programming language-agnostic ; use the best tool for the job</a:t>
             </a:r>
           </a:p>
           <a:p>
             <a:pPr lvl="1"/>
             <a:r>
               <a:rPr lang="en-US" dirty="0"/>
-              <a:t>PUT – replace a resource</a:t>
+              <a:t>Neither the server nor the client is dependent on each other</a:t>
             </a:r>
           </a:p>
           <a:p>
             <a:pPr lvl="1"/>
             <a:r>
               <a:rPr lang="en-US" dirty="0"/>
-              <a:t>PATCH – partially modify a resource</a:t>
+              <a:t>Can use without writing code (</a:t>
+            </a:r>
+            <a:r>
+              <a:rPr lang="en-US" dirty="0" err="1"/>
+              <a:t>cURL</a:t>
+            </a:r>
+            <a:r>
+              <a:rPr lang="en-US" dirty="0"/>
+              <a:t>, browser extensions)</a:t>
             </a:r>
           </a:p>
           <a:p>
             <a:pPr lvl="1"/>
             <a:r>
               <a:rPr lang="en-US" dirty="0"/>
-              <a:t>DELETE – delete a resource</a:t>
+              <a:t>Securable</a:t>
+            </a:r>
+          </a:p>
+          <a:p>
+            <a:r>
+              <a:rPr lang="en-US" dirty="0"/>
+              <a:t>Cons:</a:t>
             </a:r>
           </a:p>
           <a:p>
             <a:pPr lvl="1"/>
             <a:r>
               <a:rPr lang="en-US" dirty="0"/>
-              <a:t>HEAD, CONNECT, OPTIONS, TRACE – additional methods</a:t>
-            </a:r>
-          </a:p>
-          <a:p>
-            <a:pPr lvl="1"/>
-            <a:endParaRPr lang="en-US" dirty="0"/>
-          </a:p>
-          <a:p>
-            <a:r>
-              <a:rPr lang="en-US" dirty="0"/>
-              <a:t>Mirrors:</a:t>
-            </a:r>
-          </a:p>
-          <a:p>
-            <a:pPr lvl="1"/>
-            <a:r>
-              <a:rPr lang="en-US" dirty="0"/>
-              <a:t>Create (POST), Read (GET), Update (PUT/PATCH), Delete (DELETE)</a:t>
-            </a:r>
-          </a:p>
-          <a:p>
-            <a:pPr lvl="1"/>
-            <a:endParaRPr lang="en-US" dirty="0"/>
-          </a:p>
-          <a:p>
-            <a:pPr lvl="1"/>
+              <a:t>Not always available</a:t>
+            </a:r>
+          </a:p>
+          <a:p>
             <a:endParaRPr lang="en-US" dirty="0"/>
           </a:p>
         </p:txBody>
@@ -5133,7 +6051,7 @@
     </p:spTree>
     <p:extLst>
       <p:ext uri="{BB962C8B-B14F-4D97-AF65-F5344CB8AC3E}">
-        <p14:creationId xmlns:p14="http://schemas.microsoft.com/office/powerpoint/2010/main" val="2050633878"/>
+        <p14:creationId xmlns:p14="http://schemas.microsoft.com/office/powerpoint/2010/main" val="3272526947"/>
       </p:ext>
     </p:extLst>
   </p:cSld>
@@ -5165,7 +6083,7 @@
           <p:cNvPr id="2" name="Title 1">
             <a:extLst>
               <a:ext uri="{FF2B5EF4-FFF2-40B4-BE49-F238E27FC236}">
-                <a16:creationId xmlns:a16="http://schemas.microsoft.com/office/drawing/2014/main" id="{D8A9FAC0-E3C8-4AE3-AD56-4EA22B5A4795}"/>
+                <a16:creationId xmlns:a16="http://schemas.microsoft.com/office/drawing/2014/main" id="{4668879E-16D8-41E3-9496-B4144A3A21A6}"/>
               </a:ext>
             </a:extLst>
           </p:cNvPr>
@@ -5183,7 +6101,7 @@
           <a:p>
             <a:r>
               <a:rPr lang="en-US" dirty="0"/>
-              <a:t>HTTP Request Examples:</a:t>
+              <a:t>REST Alternatives</a:t>
             </a:r>
           </a:p>
         </p:txBody>
@@ -5193,7 +6111,7 @@
           <p:cNvPr id="3" name="Content Placeholder 2">
             <a:extLst>
               <a:ext uri="{FF2B5EF4-FFF2-40B4-BE49-F238E27FC236}">
-                <a16:creationId xmlns:a16="http://schemas.microsoft.com/office/drawing/2014/main" id="{458C901A-4D2F-4E57-B4E1-75F5EAC3D820}"/>
+                <a16:creationId xmlns:a16="http://schemas.microsoft.com/office/drawing/2014/main" id="{07E266C7-EB9C-4B6F-8AD8-601CE4EFED2F}"/>
               </a:ext>
             </a:extLst>
           </p:cNvPr>
@@ -5206,191 +6124,92 @@
         </p:nvSpPr>
         <p:spPr/>
         <p:txBody>
-          <a:bodyPr/>
-          <a:lstStyle/>
-          <a:p>
-            <a:pPr marL="0" indent="0">
-              <a:buNone/>
-            </a:pPr>
-            <a:r>
-              <a:rPr lang="en-US" dirty="0"/>
-              <a:t>Same endpoint - </a:t>
-            </a:r>
-            <a:r>
-              <a:rPr lang="en-US" sz="2400" dirty="0">
-                <a:latin typeface="Courier New" panose="02070309020205020404" pitchFamily="49" charset="0"/>
-                <a:cs typeface="Courier New" panose="02070309020205020404" pitchFamily="49" charset="0"/>
-              </a:rPr>
-              <a:t>/</a:t>
-            </a:r>
-            <a:r>
-              <a:rPr lang="en-US" sz="2400" dirty="0" err="1">
-                <a:latin typeface="Courier New" panose="02070309020205020404" pitchFamily="49" charset="0"/>
-                <a:cs typeface="Courier New" panose="02070309020205020404" pitchFamily="49" charset="0"/>
-              </a:rPr>
-              <a:t>api</a:t>
-            </a:r>
-            <a:r>
-              <a:rPr lang="en-US" sz="2400" dirty="0">
-                <a:latin typeface="Courier New" panose="02070309020205020404" pitchFamily="49" charset="0"/>
-                <a:cs typeface="Courier New" panose="02070309020205020404" pitchFamily="49" charset="0"/>
-              </a:rPr>
-              <a:t>/users/{id}</a:t>
-            </a:r>
-            <a:r>
-              <a:rPr lang="en-US" dirty="0"/>
-              <a:t> - used for multiple operations:</a:t>
-            </a:r>
-            <a:br>
-              <a:rPr lang="en-US" dirty="0"/>
-            </a:br>
-            <a:endParaRPr lang="en-US" dirty="0"/>
-          </a:p>
-          <a:p>
-            <a:r>
-              <a:rPr lang="en-US" sz="2200" dirty="0">
-                <a:latin typeface="Courier New" panose="02070309020205020404" pitchFamily="49" charset="0"/>
-                <a:ea typeface="Hack" panose="020B0609030202020204" pitchFamily="49" charset="0"/>
-                <a:cs typeface="Courier New" panose="02070309020205020404" pitchFamily="49" charset="0"/>
-              </a:rPr>
-              <a:t>GET /</a:t>
-            </a:r>
-            <a:r>
-              <a:rPr lang="en-US" sz="2200" dirty="0" err="1">
-                <a:latin typeface="Courier New" panose="02070309020205020404" pitchFamily="49" charset="0"/>
-                <a:ea typeface="Hack" panose="020B0609030202020204" pitchFamily="49" charset="0"/>
-                <a:cs typeface="Courier New" panose="02070309020205020404" pitchFamily="49" charset="0"/>
-              </a:rPr>
-              <a:t>api</a:t>
-            </a:r>
-            <a:r>
-              <a:rPr lang="en-US" sz="2200" dirty="0">
-                <a:latin typeface="Courier New" panose="02070309020205020404" pitchFamily="49" charset="0"/>
-                <a:ea typeface="Hack" panose="020B0609030202020204" pitchFamily="49" charset="0"/>
-                <a:cs typeface="Courier New" panose="02070309020205020404" pitchFamily="49" charset="0"/>
-              </a:rPr>
-              <a:t>/users/{id}</a:t>
-            </a:r>
-          </a:p>
-          <a:p>
-            <a:r>
-              <a:rPr lang="en-US" sz="2200" dirty="0">
-                <a:latin typeface="Courier New" panose="02070309020205020404" pitchFamily="49" charset="0"/>
-                <a:ea typeface="Hack" panose="020B0609030202020204" pitchFamily="49" charset="0"/>
-                <a:cs typeface="Courier New" panose="02070309020205020404" pitchFamily="49" charset="0"/>
-              </a:rPr>
-              <a:t>PUT /</a:t>
-            </a:r>
-            <a:r>
-              <a:rPr lang="en-US" sz="2200" dirty="0" err="1">
-                <a:latin typeface="Courier New" panose="02070309020205020404" pitchFamily="49" charset="0"/>
-                <a:ea typeface="Hack" panose="020B0609030202020204" pitchFamily="49" charset="0"/>
-                <a:cs typeface="Courier New" panose="02070309020205020404" pitchFamily="49" charset="0"/>
-              </a:rPr>
-              <a:t>api</a:t>
-            </a:r>
-            <a:r>
-              <a:rPr lang="en-US" sz="2200" dirty="0">
-                <a:latin typeface="Courier New" panose="02070309020205020404" pitchFamily="49" charset="0"/>
-                <a:ea typeface="Hack" panose="020B0609030202020204" pitchFamily="49" charset="0"/>
-                <a:cs typeface="Courier New" panose="02070309020205020404" pitchFamily="49" charset="0"/>
-              </a:rPr>
-              <a:t>/users/{id}</a:t>
-            </a:r>
-          </a:p>
-          <a:p>
-            <a:r>
-              <a:rPr lang="en-US" sz="2200" dirty="0">
-                <a:latin typeface="Courier New" panose="02070309020205020404" pitchFamily="49" charset="0"/>
-                <a:ea typeface="Hack" panose="020B0609030202020204" pitchFamily="49" charset="0"/>
-                <a:cs typeface="Courier New" panose="02070309020205020404" pitchFamily="49" charset="0"/>
-              </a:rPr>
-              <a:t>PATCH /</a:t>
-            </a:r>
-            <a:r>
-              <a:rPr lang="en-US" sz="2200" dirty="0" err="1">
-                <a:latin typeface="Courier New" panose="02070309020205020404" pitchFamily="49" charset="0"/>
-                <a:ea typeface="Hack" panose="020B0609030202020204" pitchFamily="49" charset="0"/>
-                <a:cs typeface="Courier New" panose="02070309020205020404" pitchFamily="49" charset="0"/>
-              </a:rPr>
-              <a:t>api</a:t>
-            </a:r>
-            <a:r>
-              <a:rPr lang="en-US" sz="2200" dirty="0">
-                <a:latin typeface="Courier New" panose="02070309020205020404" pitchFamily="49" charset="0"/>
-                <a:ea typeface="Hack" panose="020B0609030202020204" pitchFamily="49" charset="0"/>
-                <a:cs typeface="Courier New" panose="02070309020205020404" pitchFamily="49" charset="0"/>
-              </a:rPr>
-              <a:t>/users/{id}</a:t>
-            </a:r>
-          </a:p>
-          <a:p>
-            <a:r>
-              <a:rPr lang="en-US" sz="2200" dirty="0">
-                <a:latin typeface="Courier New" panose="02070309020205020404" pitchFamily="49" charset="0"/>
-                <a:ea typeface="Hack" panose="020B0609030202020204" pitchFamily="49" charset="0"/>
-                <a:cs typeface="Courier New" panose="02070309020205020404" pitchFamily="49" charset="0"/>
-              </a:rPr>
-              <a:t>DELETE /</a:t>
-            </a:r>
-            <a:r>
-              <a:rPr lang="en-US" sz="2200" dirty="0" err="1">
-                <a:latin typeface="Courier New" panose="02070309020205020404" pitchFamily="49" charset="0"/>
-                <a:ea typeface="Hack" panose="020B0609030202020204" pitchFamily="49" charset="0"/>
-                <a:cs typeface="Courier New" panose="02070309020205020404" pitchFamily="49" charset="0"/>
-              </a:rPr>
-              <a:t>api</a:t>
-            </a:r>
-            <a:r>
-              <a:rPr lang="en-US" sz="2200" dirty="0">
-                <a:latin typeface="Courier New" panose="02070309020205020404" pitchFamily="49" charset="0"/>
-                <a:ea typeface="Hack" panose="020B0609030202020204" pitchFamily="49" charset="0"/>
-                <a:cs typeface="Courier New" panose="02070309020205020404" pitchFamily="49" charset="0"/>
-              </a:rPr>
-              <a:t>/users/{id}</a:t>
-            </a:r>
-          </a:p>
-          <a:p>
-            <a:r>
-              <a:rPr lang="en-US" sz="2200" dirty="0">
-                <a:latin typeface="Courier New" panose="02070309020205020404" pitchFamily="49" charset="0"/>
-                <a:ea typeface="Hack" panose="020B0609030202020204" pitchFamily="49" charset="0"/>
-                <a:cs typeface="Courier New" panose="02070309020205020404" pitchFamily="49" charset="0"/>
-              </a:rPr>
-              <a:t>POST /</a:t>
-            </a:r>
-            <a:r>
-              <a:rPr lang="en-US" sz="2200" dirty="0" err="1">
-                <a:latin typeface="Courier New" panose="02070309020205020404" pitchFamily="49" charset="0"/>
-                <a:ea typeface="Hack" panose="020B0609030202020204" pitchFamily="49" charset="0"/>
-                <a:cs typeface="Courier New" panose="02070309020205020404" pitchFamily="49" charset="0"/>
-              </a:rPr>
-              <a:t>api</a:t>
-            </a:r>
-            <a:r>
-              <a:rPr lang="en-US" sz="2200" dirty="0">
-                <a:latin typeface="Courier New" panose="02070309020205020404" pitchFamily="49" charset="0"/>
-                <a:ea typeface="Hack" panose="020B0609030202020204" pitchFamily="49" charset="0"/>
-                <a:cs typeface="Courier New" panose="02070309020205020404" pitchFamily="49" charset="0"/>
-              </a:rPr>
-              <a:t>/users</a:t>
-            </a:r>
-          </a:p>
-          <a:p>
-            <a:endParaRPr lang="en-US" dirty="0"/>
-          </a:p>
-          <a:p>
-            <a:pPr marL="0" indent="0">
+          <a:bodyPr>
+            <a:normAutofit fontScale="92500" lnSpcReduction="20000"/>
+          </a:bodyPr>
+          <a:lstStyle/>
+          <a:p>
+            <a:r>
+              <a:rPr lang="en-US" dirty="0"/>
+              <a:t>SOAP (Simple Object Access Protocol)</a:t>
+            </a:r>
+          </a:p>
+          <a:p>
+            <a:pPr lvl="1"/>
+            <a:r>
+              <a:rPr lang="en-US" dirty="0"/>
+              <a:t>XML-based, no JSON support</a:t>
+            </a:r>
+          </a:p>
+          <a:p>
+            <a:pPr lvl="1"/>
+            <a:r>
+              <a:rPr lang="en-US" dirty="0"/>
+              <a:t>Generally slower, uses more bandwidth, rapidly going out of style</a:t>
+            </a:r>
+          </a:p>
+          <a:p>
+            <a:pPr lvl="1"/>
+            <a:r>
+              <a:rPr lang="en-US" dirty="0"/>
+              <a:t>Not fun to use</a:t>
+            </a:r>
+          </a:p>
+          <a:p>
+            <a:pPr marL="457200" lvl="1" indent="0">
               <a:buNone/>
             </a:pPr>
             <a:endParaRPr lang="en-US" dirty="0"/>
+          </a:p>
+          <a:p>
+            <a:r>
+              <a:rPr lang="en-US" dirty="0"/>
+              <a:t>RPC (Remote Procedure Calls)</a:t>
+            </a:r>
+          </a:p>
+          <a:p>
+            <a:pPr lvl="1"/>
+            <a:r>
+              <a:rPr lang="en-US" dirty="0"/>
+              <a:t>Verb-based – URI is the action</a:t>
+            </a:r>
+          </a:p>
+          <a:p>
+            <a:pPr lvl="1"/>
+            <a:r>
+              <a:rPr lang="en-US" dirty="0"/>
+              <a:t>Less Common</a:t>
+            </a:r>
+          </a:p>
+          <a:p>
+            <a:pPr lvl="1"/>
+            <a:r>
+              <a:rPr lang="en-US" dirty="0"/>
+              <a:t>Requires underlying knowledge of the system being accessed</a:t>
+            </a:r>
+          </a:p>
+          <a:p>
+            <a:endParaRPr lang="en-US" dirty="0"/>
+          </a:p>
+          <a:p>
+            <a:r>
+              <a:rPr lang="en-US" dirty="0"/>
+              <a:t>Web Scraping</a:t>
+            </a:r>
+          </a:p>
+          <a:p>
+            <a:pPr lvl="1"/>
+            <a:r>
+              <a:rPr lang="en-US" dirty="0"/>
+              <a:t>Often your only choice</a:t>
+            </a:r>
           </a:p>
         </p:txBody>
       </p:sp>
     </p:spTree>
     <p:extLst>
       <p:ext uri="{BB962C8B-B14F-4D97-AF65-F5344CB8AC3E}">
-        <p14:creationId xmlns:p14="http://schemas.microsoft.com/office/powerpoint/2010/main" val="555897768"/>
+        <p14:creationId xmlns:p14="http://schemas.microsoft.com/office/powerpoint/2010/main" val="952043324"/>
       </p:ext>
     </p:extLst>
   </p:cSld>
@@ -5422,7 +6241,7 @@
           <p:cNvPr id="2" name="Title 1">
             <a:extLst>
               <a:ext uri="{FF2B5EF4-FFF2-40B4-BE49-F238E27FC236}">
-                <a16:creationId xmlns:a16="http://schemas.microsoft.com/office/drawing/2014/main" id="{5AC061A8-3222-4737-BA67-2059BA44B4F2}"/>
+                <a16:creationId xmlns:a16="http://schemas.microsoft.com/office/drawing/2014/main" id="{93A12AE6-E689-4B0B-A037-C639EC6231F2}"/>
               </a:ext>
             </a:extLst>
           </p:cNvPr>
@@ -5440,7 +6259,7 @@
           <a:p>
             <a:r>
               <a:rPr lang="en-US" dirty="0"/>
-              <a:t>JSON</a:t>
+              <a:t>HTTP Request Methods</a:t>
             </a:r>
           </a:p>
         </p:txBody>
@@ -5450,7 +6269,7 @@
           <p:cNvPr id="3" name="Content Placeholder 2">
             <a:extLst>
               <a:ext uri="{FF2B5EF4-FFF2-40B4-BE49-F238E27FC236}">
-                <a16:creationId xmlns:a16="http://schemas.microsoft.com/office/drawing/2014/main" id="{F7807747-7275-4E78-8A60-F7803EF3B263}"/>
+                <a16:creationId xmlns:a16="http://schemas.microsoft.com/office/drawing/2014/main" id="{52EF77AE-F9AB-433C-9AC2-B505129A28E0}"/>
               </a:ext>
             </a:extLst>
           </p:cNvPr>
@@ -5464,97 +6283,112 @@
         <p:spPr/>
         <p:txBody>
           <a:bodyPr>
-            <a:normAutofit lnSpcReduction="10000"/>
+            <a:normAutofit/>
           </a:bodyPr>
           <a:lstStyle/>
           <a:p>
             <a:r>
+              <a:rPr lang="en-US" dirty="0"/>
+              <a:t>Methods:</a:t>
+            </a:r>
+          </a:p>
+          <a:p>
+            <a:pPr lvl="1"/>
+            <a:r>
               <a:rPr lang="en-US" b="1" dirty="0"/>
-              <a:t>J</a:t>
-            </a:r>
-            <a:r>
-              <a:rPr lang="en-US" dirty="0"/>
-              <a:t>ava</a:t>
-            </a:r>
+              <a:t>GET</a:t>
+            </a:r>
+            <a:r>
+              <a:rPr lang="en-US" dirty="0"/>
+              <a:t> – request resource – idempotent</a:t>
+            </a:r>
+          </a:p>
+          <a:p>
+            <a:pPr lvl="1"/>
             <a:r>
               <a:rPr lang="en-US" b="1" dirty="0"/>
-              <a:t>S</a:t>
-            </a:r>
-            <a:r>
-              <a:rPr lang="en-US" dirty="0"/>
-              <a:t>cript </a:t>
-            </a:r>
+              <a:t>POST</a:t>
+            </a:r>
+            <a:r>
+              <a:rPr lang="en-US" dirty="0"/>
+              <a:t> – submit resource – not idempotent</a:t>
+            </a:r>
+          </a:p>
+          <a:p>
+            <a:pPr lvl="1"/>
             <a:r>
               <a:rPr lang="en-US" b="1" dirty="0"/>
-              <a:t>O</a:t>
-            </a:r>
-            <a:r>
-              <a:rPr lang="en-US" dirty="0"/>
-              <a:t>bject </a:t>
-            </a:r>
+              <a:t>PUT</a:t>
+            </a:r>
+            <a:r>
+              <a:rPr lang="en-US" dirty="0"/>
+              <a:t> – replace a resource</a:t>
+            </a:r>
+          </a:p>
+          <a:p>
+            <a:pPr lvl="1"/>
             <a:r>
               <a:rPr lang="en-US" b="1" dirty="0"/>
-              <a:t>N</a:t>
-            </a:r>
-            <a:r>
-              <a:rPr lang="en-US" dirty="0"/>
-              <a:t>otation (JSON)</a:t>
-            </a:r>
-          </a:p>
-          <a:p>
-            <a:r>
-              <a:rPr lang="en-US" dirty="0"/>
-              <a:t>Open standard file format</a:t>
-            </a:r>
-          </a:p>
-          <a:p>
-            <a:r>
-              <a:rPr lang="en-US" dirty="0"/>
-              <a:t>Human-readable, less verbose</a:t>
-            </a:r>
-          </a:p>
-          <a:p>
-            <a:r>
-              <a:rPr lang="en-US" dirty="0"/>
-              <a:t>Attribute/value pairs</a:t>
-            </a:r>
-          </a:p>
-          <a:p>
-            <a:r>
-              <a:rPr lang="en-US" dirty="0"/>
-              <a:t>Language-independent, schema-less</a:t>
-            </a:r>
-          </a:p>
-          <a:p>
-            <a:r>
-              <a:rPr lang="en-US" dirty="0"/>
-              <a:t>Widely supported by most programming languages</a:t>
-            </a:r>
-          </a:p>
-          <a:p>
-            <a:r>
-              <a:rPr lang="en-US" dirty="0"/>
-              <a:t>Smaller footprint than XML</a:t>
-            </a:r>
-          </a:p>
-          <a:p>
-            <a:r>
-              <a:rPr lang="en-US" dirty="0"/>
-              <a:t>Faster</a:t>
-            </a:r>
-          </a:p>
-          <a:p>
-            <a:r>
-              <a:rPr lang="en-US" dirty="0"/>
-              <a:t>Natural fit with REST</a:t>
-            </a:r>
+              <a:t>PATCH</a:t>
+            </a:r>
+            <a:r>
+              <a:rPr lang="en-US" dirty="0"/>
+              <a:t> – partially modify a resource</a:t>
+            </a:r>
+          </a:p>
+          <a:p>
+            <a:pPr lvl="1"/>
+            <a:r>
+              <a:rPr lang="en-US" b="1" dirty="0"/>
+              <a:t>DELETE</a:t>
+            </a:r>
+            <a:r>
+              <a:rPr lang="en-US" dirty="0"/>
+              <a:t> – delete a resource</a:t>
+            </a:r>
+          </a:p>
+          <a:p>
+            <a:pPr lvl="1"/>
+            <a:r>
+              <a:rPr lang="en-US" b="1" dirty="0"/>
+              <a:t>HEAD, CONNECT, OPTIONS, TRACE</a:t>
+            </a:r>
+            <a:r>
+              <a:rPr lang="en-US" dirty="0"/>
+              <a:t> – additional methods</a:t>
+            </a:r>
+          </a:p>
+          <a:p>
+            <a:pPr lvl="1"/>
+            <a:endParaRPr lang="en-US" dirty="0"/>
+          </a:p>
+          <a:p>
+            <a:r>
+              <a:rPr lang="en-US" dirty="0"/>
+              <a:t>Mirrors CRUD:</a:t>
+            </a:r>
+          </a:p>
+          <a:p>
+            <a:pPr lvl="1"/>
+            <a:r>
+              <a:rPr lang="en-US" dirty="0"/>
+              <a:t>Create (POST), Read (GET), Update (PUT/PATCH), Delete (DELETE)</a:t>
+            </a:r>
+          </a:p>
+          <a:p>
+            <a:pPr lvl="1"/>
+            <a:endParaRPr lang="en-US" dirty="0"/>
+          </a:p>
+          <a:p>
+            <a:pPr lvl="1"/>
+            <a:endParaRPr lang="en-US" dirty="0"/>
           </a:p>
         </p:txBody>
       </p:sp>
     </p:spTree>
     <p:extLst>
       <p:ext uri="{BB962C8B-B14F-4D97-AF65-F5344CB8AC3E}">
-        <p14:creationId xmlns:p14="http://schemas.microsoft.com/office/powerpoint/2010/main" val="548842597"/>
+        <p14:creationId xmlns:p14="http://schemas.microsoft.com/office/powerpoint/2010/main" val="2050633878"/>
       </p:ext>
     </p:extLst>
   </p:cSld>
@@ -5586,7 +6420,7 @@
           <p:cNvPr id="2" name="Title 1">
             <a:extLst>
               <a:ext uri="{FF2B5EF4-FFF2-40B4-BE49-F238E27FC236}">
-                <a16:creationId xmlns:a16="http://schemas.microsoft.com/office/drawing/2014/main" id="{4668879E-16D8-41E3-9496-B4144A3A21A6}"/>
+                <a16:creationId xmlns:a16="http://schemas.microsoft.com/office/drawing/2014/main" id="{D8A9FAC0-E3C8-4AE3-AD56-4EA22B5A4795}"/>
               </a:ext>
             </a:extLst>
           </p:cNvPr>
@@ -5604,7 +6438,7 @@
           <a:p>
             <a:r>
               <a:rPr lang="en-US" dirty="0"/>
-              <a:t>JSON Alternatives</a:t>
+              <a:t>HTTP Request Examples:</a:t>
             </a:r>
           </a:p>
         </p:txBody>
@@ -5614,7 +6448,7 @@
           <p:cNvPr id="3" name="Content Placeholder 2">
             <a:extLst>
               <a:ext uri="{FF2B5EF4-FFF2-40B4-BE49-F238E27FC236}">
-                <a16:creationId xmlns:a16="http://schemas.microsoft.com/office/drawing/2014/main" id="{07E266C7-EB9C-4B6F-8AD8-601CE4EFED2F}"/>
+                <a16:creationId xmlns:a16="http://schemas.microsoft.com/office/drawing/2014/main" id="{458C901A-4D2F-4E57-B4E1-75F5EAC3D820}"/>
               </a:ext>
             </a:extLst>
           </p:cNvPr>
@@ -5627,109 +6461,47 @@
         </p:nvSpPr>
         <p:spPr>
           <a:xfrm>
-            <a:off x="838200" y="1825624"/>
-            <a:ext cx="10515600" cy="4399007"/>
+            <a:off x="838200" y="1548882"/>
+            <a:ext cx="10515600" cy="4683967"/>
           </a:xfrm>
         </p:spPr>
         <p:txBody>
           <a:bodyPr>
-            <a:normAutofit fontScale="70000" lnSpcReduction="20000"/>
+            <a:normAutofit fontScale="77500" lnSpcReduction="20000"/>
           </a:bodyPr>
           <a:lstStyle/>
           <a:p>
-            <a:r>
-              <a:rPr lang="en-US" dirty="0"/>
-              <a:t>XML (</a:t>
-            </a:r>
-            <a:r>
-              <a:rPr lang="en-US" dirty="0" err="1"/>
-              <a:t>e</a:t>
-            </a:r>
-            <a:r>
-              <a:rPr lang="en-US" b="1" dirty="0" err="1"/>
-              <a:t>X</a:t>
-            </a:r>
-            <a:r>
-              <a:rPr lang="en-US" dirty="0" err="1"/>
-              <a:t>tensible</a:t>
-            </a:r>
-            <a:r>
-              <a:rPr lang="en-US" dirty="0"/>
-              <a:t> </a:t>
-            </a:r>
-            <a:r>
-              <a:rPr lang="en-US" b="1" dirty="0"/>
-              <a:t>M</a:t>
-            </a:r>
-            <a:r>
-              <a:rPr lang="en-US" dirty="0"/>
-              <a:t>arkup </a:t>
-            </a:r>
-            <a:r>
-              <a:rPr lang="en-US" b="1" dirty="0"/>
-              <a:t>L</a:t>
-            </a:r>
-            <a:r>
-              <a:rPr lang="en-US" dirty="0"/>
-              <a:t>anguage)</a:t>
-            </a:r>
-          </a:p>
-          <a:p>
-            <a:pPr lvl="1"/>
-            <a:r>
-              <a:rPr lang="en-US" dirty="0"/>
-              <a:t>Schema-based</a:t>
-            </a:r>
-          </a:p>
-          <a:p>
-            <a:pPr lvl="1"/>
-            <a:r>
-              <a:rPr lang="en-US" dirty="0"/>
-              <a:t>Requires XML parser</a:t>
-            </a:r>
-          </a:p>
-          <a:p>
-            <a:pPr lvl="1"/>
-            <a:r>
-              <a:rPr lang="en-US" dirty="0"/>
-              <a:t>Less compact</a:t>
-            </a:r>
-            <a:br>
-              <a:rPr lang="en-US" dirty="0"/>
-            </a:br>
-            <a:endParaRPr lang="en-US" dirty="0"/>
-          </a:p>
-          <a:p>
-            <a:r>
-              <a:rPr lang="en-US" dirty="0"/>
-              <a:t>Programming language-specific serialization</a:t>
-            </a:r>
-          </a:p>
-          <a:p>
-            <a:pPr lvl="1"/>
-            <a:r>
-              <a:rPr lang="en-US" sz="1900" dirty="0">
+            <a:pPr marL="0" indent="0">
+              <a:buNone/>
+            </a:pPr>
+            <a:r>
+              <a:rPr lang="en-US" dirty="0"/>
+              <a:t>Same endpoint - </a:t>
+            </a:r>
+            <a:r>
+              <a:rPr lang="en-US" sz="2400" dirty="0">
                 <a:latin typeface="Courier New" panose="02070309020205020404" pitchFamily="49" charset="0"/>
                 <a:cs typeface="Courier New" panose="02070309020205020404" pitchFamily="49" charset="0"/>
               </a:rPr>
-              <a:t>serialize($object);</a:t>
-            </a:r>
-            <a:r>
-              <a:rPr lang="en-US" dirty="0">
+              <a:t>/</a:t>
+            </a:r>
+            <a:r>
+              <a:rPr lang="en-US" sz="2400" dirty="0" err="1">
+                <a:latin typeface="Courier New" panose="02070309020205020404" pitchFamily="49" charset="0"/>
                 <a:cs typeface="Courier New" panose="02070309020205020404" pitchFamily="49" charset="0"/>
               </a:rPr>
-              <a:t> </a:t>
-            </a:r>
-            <a:r>
-              <a:rPr lang="en-US" dirty="0"/>
-              <a:t>in PHP, for example</a:t>
-            </a:r>
-          </a:p>
-          <a:p>
-            <a:pPr lvl="1"/>
-            <a:r>
-              <a:rPr lang="en-US" dirty="0"/>
-              <a:t>Need to use same language to parse</a:t>
+              <a:t>api</a:t>
+            </a:r>
+            <a:r>
+              <a:rPr lang="en-US" sz="2400" dirty="0">
+                <a:latin typeface="Courier New" panose="02070309020205020404" pitchFamily="49" charset="0"/>
+                <a:cs typeface="Courier New" panose="02070309020205020404" pitchFamily="49" charset="0"/>
+              </a:rPr>
+              <a:t>/users/{id}</a:t>
+            </a:r>
+            <a:r>
+              <a:rPr lang="en-US" dirty="0"/>
+              <a:t> - used for multiple operations:</a:t>
             </a:r>
             <a:br>
               <a:rPr lang="en-US" dirty="0"/>
@@ -5738,67 +6510,308 @@
           </a:p>
           <a:p>
             <a:r>
-              <a:rPr lang="en-US" dirty="0"/>
-              <a:t>Custom string/binary data</a:t>
-            </a:r>
-          </a:p>
-          <a:p>
-            <a:pPr lvl="1"/>
-            <a:r>
-              <a:rPr lang="en-US" dirty="0"/>
-              <a:t>Must know data specification, write custom parser (Half-Life </a:t>
-            </a:r>
-            <a:r>
-              <a:rPr lang="en-US" dirty="0" err="1"/>
-              <a:t>rcon</a:t>
-            </a:r>
-            <a:r>
-              <a:rPr lang="en-US" dirty="0"/>
-              <a:t> protocol)</a:t>
+              <a:rPr lang="en-US" sz="2200" dirty="0">
+                <a:latin typeface="Courier New" panose="02070309020205020404" pitchFamily="49" charset="0"/>
+                <a:ea typeface="Hack" panose="020B0609030202020204" pitchFamily="49" charset="0"/>
+                <a:cs typeface="Courier New" panose="02070309020205020404" pitchFamily="49" charset="0"/>
+              </a:rPr>
+              <a:t>GET    /</a:t>
+            </a:r>
+            <a:r>
+              <a:rPr lang="en-US" sz="2200" dirty="0" err="1">
+                <a:latin typeface="Courier New" panose="02070309020205020404" pitchFamily="49" charset="0"/>
+                <a:ea typeface="Hack" panose="020B0609030202020204" pitchFamily="49" charset="0"/>
+                <a:cs typeface="Courier New" panose="02070309020205020404" pitchFamily="49" charset="0"/>
+              </a:rPr>
+              <a:t>api</a:t>
+            </a:r>
+            <a:r>
+              <a:rPr lang="en-US" sz="2200" dirty="0">
+                <a:latin typeface="Courier New" panose="02070309020205020404" pitchFamily="49" charset="0"/>
+                <a:ea typeface="Hack" panose="020B0609030202020204" pitchFamily="49" charset="0"/>
+                <a:cs typeface="Courier New" panose="02070309020205020404" pitchFamily="49" charset="0"/>
+              </a:rPr>
+              <a:t>/users/{id}</a:t>
+            </a:r>
+          </a:p>
+          <a:p>
+            <a:r>
+              <a:rPr lang="en-US" sz="2200" dirty="0">
+                <a:latin typeface="Courier New" panose="02070309020205020404" pitchFamily="49" charset="0"/>
+                <a:ea typeface="Hack" panose="020B0609030202020204" pitchFamily="49" charset="0"/>
+                <a:cs typeface="Courier New" panose="02070309020205020404" pitchFamily="49" charset="0"/>
+              </a:rPr>
+              <a:t>PUT    /</a:t>
+            </a:r>
+            <a:r>
+              <a:rPr lang="en-US" sz="2200" dirty="0" err="1">
+                <a:latin typeface="Courier New" panose="02070309020205020404" pitchFamily="49" charset="0"/>
+                <a:ea typeface="Hack" panose="020B0609030202020204" pitchFamily="49" charset="0"/>
+                <a:cs typeface="Courier New" panose="02070309020205020404" pitchFamily="49" charset="0"/>
+              </a:rPr>
+              <a:t>api</a:t>
+            </a:r>
+            <a:r>
+              <a:rPr lang="en-US" sz="2200" dirty="0">
+                <a:latin typeface="Courier New" panose="02070309020205020404" pitchFamily="49" charset="0"/>
+                <a:ea typeface="Hack" panose="020B0609030202020204" pitchFamily="49" charset="0"/>
+                <a:cs typeface="Courier New" panose="02070309020205020404" pitchFamily="49" charset="0"/>
+              </a:rPr>
+              <a:t>/users/{id}</a:t>
+            </a:r>
+          </a:p>
+          <a:p>
+            <a:r>
+              <a:rPr lang="en-US" sz="2200" dirty="0">
+                <a:latin typeface="Courier New" panose="02070309020205020404" pitchFamily="49" charset="0"/>
+                <a:ea typeface="Hack" panose="020B0609030202020204" pitchFamily="49" charset="0"/>
+                <a:cs typeface="Courier New" panose="02070309020205020404" pitchFamily="49" charset="0"/>
+              </a:rPr>
+              <a:t>PATCH  /</a:t>
+            </a:r>
+            <a:r>
+              <a:rPr lang="en-US" sz="2200" dirty="0" err="1">
+                <a:latin typeface="Courier New" panose="02070309020205020404" pitchFamily="49" charset="0"/>
+                <a:ea typeface="Hack" panose="020B0609030202020204" pitchFamily="49" charset="0"/>
+                <a:cs typeface="Courier New" panose="02070309020205020404" pitchFamily="49" charset="0"/>
+              </a:rPr>
+              <a:t>api</a:t>
+            </a:r>
+            <a:r>
+              <a:rPr lang="en-US" sz="2200" dirty="0">
+                <a:latin typeface="Courier New" panose="02070309020205020404" pitchFamily="49" charset="0"/>
+                <a:ea typeface="Hack" panose="020B0609030202020204" pitchFamily="49" charset="0"/>
+                <a:cs typeface="Courier New" panose="02070309020205020404" pitchFamily="49" charset="0"/>
+              </a:rPr>
+              <a:t>/users/{id}</a:t>
+            </a:r>
+          </a:p>
+          <a:p>
+            <a:r>
+              <a:rPr lang="en-US" sz="2200" dirty="0">
+                <a:latin typeface="Courier New" panose="02070309020205020404" pitchFamily="49" charset="0"/>
+                <a:ea typeface="Hack" panose="020B0609030202020204" pitchFamily="49" charset="0"/>
+                <a:cs typeface="Courier New" panose="02070309020205020404" pitchFamily="49" charset="0"/>
+              </a:rPr>
+              <a:t>DELETE /</a:t>
+            </a:r>
+            <a:r>
+              <a:rPr lang="en-US" sz="2200" dirty="0" err="1">
+                <a:latin typeface="Courier New" panose="02070309020205020404" pitchFamily="49" charset="0"/>
+                <a:ea typeface="Hack" panose="020B0609030202020204" pitchFamily="49" charset="0"/>
+                <a:cs typeface="Courier New" panose="02070309020205020404" pitchFamily="49" charset="0"/>
+              </a:rPr>
+              <a:t>api</a:t>
+            </a:r>
+            <a:r>
+              <a:rPr lang="en-US" sz="2200" dirty="0">
+                <a:latin typeface="Courier New" panose="02070309020205020404" pitchFamily="49" charset="0"/>
+                <a:ea typeface="Hack" panose="020B0609030202020204" pitchFamily="49" charset="0"/>
+                <a:cs typeface="Courier New" panose="02070309020205020404" pitchFamily="49" charset="0"/>
+              </a:rPr>
+              <a:t>/users/{id}</a:t>
+            </a:r>
+          </a:p>
+          <a:p>
+            <a:r>
+              <a:rPr lang="en-US" sz="2200" dirty="0">
+                <a:latin typeface="Courier New" panose="02070309020205020404" pitchFamily="49" charset="0"/>
+                <a:ea typeface="Hack" panose="020B0609030202020204" pitchFamily="49" charset="0"/>
+                <a:cs typeface="Courier New" panose="02070309020205020404" pitchFamily="49" charset="0"/>
+              </a:rPr>
+              <a:t>POST   /</a:t>
+            </a:r>
+            <a:r>
+              <a:rPr lang="en-US" sz="2200" dirty="0" err="1">
+                <a:latin typeface="Courier New" panose="02070309020205020404" pitchFamily="49" charset="0"/>
+                <a:ea typeface="Hack" panose="020B0609030202020204" pitchFamily="49" charset="0"/>
+                <a:cs typeface="Courier New" panose="02070309020205020404" pitchFamily="49" charset="0"/>
+              </a:rPr>
+              <a:t>api</a:t>
+            </a:r>
+            <a:r>
+              <a:rPr lang="en-US" sz="2200" dirty="0">
+                <a:latin typeface="Courier New" panose="02070309020205020404" pitchFamily="49" charset="0"/>
+                <a:ea typeface="Hack" panose="020B0609030202020204" pitchFamily="49" charset="0"/>
+                <a:cs typeface="Courier New" panose="02070309020205020404" pitchFamily="49" charset="0"/>
+              </a:rPr>
+              <a:t>/users</a:t>
+            </a:r>
+          </a:p>
+          <a:p>
+            <a:endParaRPr lang="en-US" sz="2200" dirty="0">
+              <a:latin typeface="Courier New" panose="02070309020205020404" pitchFamily="49" charset="0"/>
+              <a:ea typeface="Hack" panose="020B0609030202020204" pitchFamily="49" charset="0"/>
+              <a:cs typeface="Courier New" panose="02070309020205020404" pitchFamily="49" charset="0"/>
+            </a:endParaRPr>
+          </a:p>
+          <a:p>
+            <a:pPr marL="0" indent="0">
+              <a:buNone/>
+            </a:pPr>
+            <a:r>
+              <a:rPr lang="en-US" dirty="0">
+                <a:ea typeface="Hack" panose="020B0609030202020204" pitchFamily="49" charset="0"/>
+                <a:cs typeface="Courier New" panose="02070309020205020404" pitchFamily="49" charset="0"/>
+              </a:rPr>
+              <a:t>(Theoretical) RPC comparison:</a:t>
             </a:r>
             <a:br>
-              <a:rPr lang="en-US" dirty="0"/>
+              <a:rPr lang="en-US" dirty="0">
+                <a:ea typeface="Hack" panose="020B0609030202020204" pitchFamily="49" charset="0"/>
+                <a:cs typeface="Courier New" panose="02070309020205020404" pitchFamily="49" charset="0"/>
+              </a:rPr>
             </a:br>
+            <a:endParaRPr lang="en-US" dirty="0">
+              <a:ea typeface="Hack" panose="020B0609030202020204" pitchFamily="49" charset="0"/>
+              <a:cs typeface="Courier New" panose="02070309020205020404" pitchFamily="49" charset="0"/>
+            </a:endParaRPr>
+          </a:p>
+          <a:p>
+            <a:r>
+              <a:rPr lang="en-US" sz="2200" dirty="0">
+                <a:latin typeface="Courier New" panose="02070309020205020404" pitchFamily="49" charset="0"/>
+                <a:ea typeface="Hack" panose="020B0609030202020204" pitchFamily="49" charset="0"/>
+                <a:cs typeface="Courier New" panose="02070309020205020404" pitchFamily="49" charset="0"/>
+              </a:rPr>
+              <a:t>/</a:t>
+            </a:r>
+            <a:r>
+              <a:rPr lang="en-US" sz="2200" dirty="0" err="1">
+                <a:latin typeface="Courier New" panose="02070309020205020404" pitchFamily="49" charset="0"/>
+                <a:ea typeface="Hack" panose="020B0609030202020204" pitchFamily="49" charset="0"/>
+                <a:cs typeface="Courier New" panose="02070309020205020404" pitchFamily="49" charset="0"/>
+              </a:rPr>
+              <a:t>api</a:t>
+            </a:r>
+            <a:r>
+              <a:rPr lang="en-US" sz="2200" dirty="0">
+                <a:latin typeface="Courier New" panose="02070309020205020404" pitchFamily="49" charset="0"/>
+                <a:ea typeface="Hack" panose="020B0609030202020204" pitchFamily="49" charset="0"/>
+                <a:cs typeface="Courier New" panose="02070309020205020404" pitchFamily="49" charset="0"/>
+              </a:rPr>
+              <a:t>/users/{id}/info</a:t>
+            </a:r>
+          </a:p>
+          <a:p>
+            <a:r>
+              <a:rPr lang="en-US" sz="2200" dirty="0">
+                <a:latin typeface="Courier New" panose="02070309020205020404" pitchFamily="49" charset="0"/>
+                <a:ea typeface="Hack" panose="020B0609030202020204" pitchFamily="49" charset="0"/>
+                <a:cs typeface="Courier New" panose="02070309020205020404" pitchFamily="49" charset="0"/>
+              </a:rPr>
+              <a:t>/</a:t>
+            </a:r>
+            <a:r>
+              <a:rPr lang="en-US" sz="2200" dirty="0" err="1">
+                <a:latin typeface="Courier New" panose="02070309020205020404" pitchFamily="49" charset="0"/>
+                <a:ea typeface="Hack" panose="020B0609030202020204" pitchFamily="49" charset="0"/>
+                <a:cs typeface="Courier New" panose="02070309020205020404" pitchFamily="49" charset="0"/>
+              </a:rPr>
+              <a:t>api</a:t>
+            </a:r>
+            <a:r>
+              <a:rPr lang="en-US" sz="2200" dirty="0">
+                <a:latin typeface="Courier New" panose="02070309020205020404" pitchFamily="49" charset="0"/>
+                <a:ea typeface="Hack" panose="020B0609030202020204" pitchFamily="49" charset="0"/>
+                <a:cs typeface="Courier New" panose="02070309020205020404" pitchFamily="49" charset="0"/>
+              </a:rPr>
+              <a:t>/users/{id}/replace</a:t>
+            </a:r>
+          </a:p>
+          <a:p>
+            <a:r>
+              <a:rPr lang="en-US" sz="2200" dirty="0">
+                <a:latin typeface="Courier New" panose="02070309020205020404" pitchFamily="49" charset="0"/>
+                <a:ea typeface="Hack" panose="020B0609030202020204" pitchFamily="49" charset="0"/>
+                <a:cs typeface="Courier New" panose="02070309020205020404" pitchFamily="49" charset="0"/>
+              </a:rPr>
+              <a:t>/</a:t>
+            </a:r>
+            <a:r>
+              <a:rPr lang="en-US" sz="2200" dirty="0" err="1">
+                <a:latin typeface="Courier New" panose="02070309020205020404" pitchFamily="49" charset="0"/>
+                <a:ea typeface="Hack" panose="020B0609030202020204" pitchFamily="49" charset="0"/>
+                <a:cs typeface="Courier New" panose="02070309020205020404" pitchFamily="49" charset="0"/>
+              </a:rPr>
+              <a:t>api</a:t>
+            </a:r>
+            <a:r>
+              <a:rPr lang="en-US" sz="2200" dirty="0">
+                <a:latin typeface="Courier New" panose="02070309020205020404" pitchFamily="49" charset="0"/>
+                <a:ea typeface="Hack" panose="020B0609030202020204" pitchFamily="49" charset="0"/>
+                <a:cs typeface="Courier New" panose="02070309020205020404" pitchFamily="49" charset="0"/>
+              </a:rPr>
+              <a:t>/users/{id}/edit</a:t>
+            </a:r>
+          </a:p>
+          <a:p>
+            <a:r>
+              <a:rPr lang="en-US" sz="2200" dirty="0">
+                <a:latin typeface="Courier New" panose="02070309020205020404" pitchFamily="49" charset="0"/>
+                <a:ea typeface="Hack" panose="020B0609030202020204" pitchFamily="49" charset="0"/>
+                <a:cs typeface="Courier New" panose="02070309020205020404" pitchFamily="49" charset="0"/>
+              </a:rPr>
+              <a:t>/</a:t>
+            </a:r>
+            <a:r>
+              <a:rPr lang="en-US" sz="2200" dirty="0" err="1">
+                <a:latin typeface="Courier New" panose="02070309020205020404" pitchFamily="49" charset="0"/>
+                <a:ea typeface="Hack" panose="020B0609030202020204" pitchFamily="49" charset="0"/>
+                <a:cs typeface="Courier New" panose="02070309020205020404" pitchFamily="49" charset="0"/>
+              </a:rPr>
+              <a:t>api</a:t>
+            </a:r>
+            <a:r>
+              <a:rPr lang="en-US" sz="2200" dirty="0">
+                <a:latin typeface="Courier New" panose="02070309020205020404" pitchFamily="49" charset="0"/>
+                <a:ea typeface="Hack" panose="020B0609030202020204" pitchFamily="49" charset="0"/>
+                <a:cs typeface="Courier New" panose="02070309020205020404" pitchFamily="49" charset="0"/>
+              </a:rPr>
+              <a:t>/users/{id}/delete</a:t>
+            </a:r>
+          </a:p>
+          <a:p>
+            <a:r>
+              <a:rPr lang="en-US" sz="2200" dirty="0">
+                <a:latin typeface="Courier New" panose="02070309020205020404" pitchFamily="49" charset="0"/>
+                <a:ea typeface="Hack" panose="020B0609030202020204" pitchFamily="49" charset="0"/>
+                <a:cs typeface="Courier New" panose="02070309020205020404" pitchFamily="49" charset="0"/>
+              </a:rPr>
+              <a:t>/</a:t>
+            </a:r>
+            <a:r>
+              <a:rPr lang="en-US" sz="2200" dirty="0" err="1">
+                <a:latin typeface="Courier New" panose="02070309020205020404" pitchFamily="49" charset="0"/>
+                <a:ea typeface="Hack" panose="020B0609030202020204" pitchFamily="49" charset="0"/>
+                <a:cs typeface="Courier New" panose="02070309020205020404" pitchFamily="49" charset="0"/>
+              </a:rPr>
+              <a:t>api</a:t>
+            </a:r>
+            <a:r>
+              <a:rPr lang="en-US" sz="2200" dirty="0">
+                <a:latin typeface="Courier New" panose="02070309020205020404" pitchFamily="49" charset="0"/>
+                <a:ea typeface="Hack" panose="020B0609030202020204" pitchFamily="49" charset="0"/>
+                <a:cs typeface="Courier New" panose="02070309020205020404" pitchFamily="49" charset="0"/>
+              </a:rPr>
+              <a:t>/users/create</a:t>
+            </a:r>
+          </a:p>
+          <a:p>
             <a:endParaRPr lang="en-US" dirty="0"/>
           </a:p>
           <a:p>
-            <a:r>
-              <a:rPr lang="en-US" dirty="0"/>
-              <a:t>Other</a:t>
-            </a:r>
-          </a:p>
-          <a:p>
-            <a:pPr lvl="1"/>
-            <a:r>
-              <a:rPr lang="en-US" dirty="0"/>
-              <a:t>YAML</a:t>
-            </a:r>
-          </a:p>
-          <a:p>
-            <a:pPr lvl="1"/>
-            <a:r>
-              <a:rPr lang="en-US" dirty="0"/>
-              <a:t>BSON (MongoDB), </a:t>
-            </a:r>
-            <a:r>
-              <a:rPr lang="en-US" dirty="0" err="1"/>
-              <a:t>MessagePack</a:t>
-            </a:r>
+            <a:pPr marL="0" indent="0">
+              <a:buNone/>
+            </a:pPr>
             <a:endParaRPr lang="en-US" dirty="0"/>
-          </a:p>
-          <a:p>
-            <a:pPr lvl="1"/>
-            <a:r>
-              <a:rPr lang="en-US" dirty="0"/>
-              <a:t>Protocol Buffers (Google)</a:t>
-            </a:r>
           </a:p>
         </p:txBody>
       </p:sp>
     </p:spTree>
     <p:extLst>
       <p:ext uri="{BB962C8B-B14F-4D97-AF65-F5344CB8AC3E}">
-        <p14:creationId xmlns:p14="http://schemas.microsoft.com/office/powerpoint/2010/main" val="3611362657"/>
+        <p14:creationId xmlns:p14="http://schemas.microsoft.com/office/powerpoint/2010/main" val="555897768"/>
       </p:ext>
     </p:extLst>
   </p:cSld>

</xml_diff>

<commit_message>
Small updates to presentation, adding missing JS file
</commit_message>
<xml_diff>
--- a/presentation/rest-api-json-graphing.pptx
+++ b/presentation/rest-api-json-graphing.pptx
@@ -279,7 +279,7 @@
           <a:p>
             <a:fld id="{BE6EE1F1-89EF-4B99-8B75-ED2C5A1BA4D9}" type="datetimeFigureOut">
               <a:rPr lang="en-US" smtClean="0"/>
-              <a:t>2/19/2018</a:t>
+              <a:t>2/22/2018</a:t>
             </a:fld>
             <a:endParaRPr lang="en-US"/>
           </a:p>
@@ -477,7 +477,7 @@
           <a:p>
             <a:fld id="{BE6EE1F1-89EF-4B99-8B75-ED2C5A1BA4D9}" type="datetimeFigureOut">
               <a:rPr lang="en-US" smtClean="0"/>
-              <a:t>2/19/2018</a:t>
+              <a:t>2/22/2018</a:t>
             </a:fld>
             <a:endParaRPr lang="en-US"/>
           </a:p>
@@ -685,7 +685,7 @@
           <a:p>
             <a:fld id="{BE6EE1F1-89EF-4B99-8B75-ED2C5A1BA4D9}" type="datetimeFigureOut">
               <a:rPr lang="en-US" smtClean="0"/>
-              <a:t>2/19/2018</a:t>
+              <a:t>2/22/2018</a:t>
             </a:fld>
             <a:endParaRPr lang="en-US"/>
           </a:p>
@@ -883,7 +883,7 @@
           <a:p>
             <a:fld id="{BE6EE1F1-89EF-4B99-8B75-ED2C5A1BA4D9}" type="datetimeFigureOut">
               <a:rPr lang="en-US" smtClean="0"/>
-              <a:t>2/19/2018</a:t>
+              <a:t>2/22/2018</a:t>
             </a:fld>
             <a:endParaRPr lang="en-US"/>
           </a:p>
@@ -1158,7 +1158,7 @@
           <a:p>
             <a:fld id="{BE6EE1F1-89EF-4B99-8B75-ED2C5A1BA4D9}" type="datetimeFigureOut">
               <a:rPr lang="en-US" smtClean="0"/>
-              <a:t>2/19/2018</a:t>
+              <a:t>2/22/2018</a:t>
             </a:fld>
             <a:endParaRPr lang="en-US"/>
           </a:p>
@@ -1423,7 +1423,7 @@
           <a:p>
             <a:fld id="{BE6EE1F1-89EF-4B99-8B75-ED2C5A1BA4D9}" type="datetimeFigureOut">
               <a:rPr lang="en-US" smtClean="0"/>
-              <a:t>2/19/2018</a:t>
+              <a:t>2/22/2018</a:t>
             </a:fld>
             <a:endParaRPr lang="en-US"/>
           </a:p>
@@ -1835,7 +1835,7 @@
           <a:p>
             <a:fld id="{BE6EE1F1-89EF-4B99-8B75-ED2C5A1BA4D9}" type="datetimeFigureOut">
               <a:rPr lang="en-US" smtClean="0"/>
-              <a:t>2/19/2018</a:t>
+              <a:t>2/22/2018</a:t>
             </a:fld>
             <a:endParaRPr lang="en-US"/>
           </a:p>
@@ -1976,7 +1976,7 @@
           <a:p>
             <a:fld id="{BE6EE1F1-89EF-4B99-8B75-ED2C5A1BA4D9}" type="datetimeFigureOut">
               <a:rPr lang="en-US" smtClean="0"/>
-              <a:t>2/19/2018</a:t>
+              <a:t>2/22/2018</a:t>
             </a:fld>
             <a:endParaRPr lang="en-US"/>
           </a:p>
@@ -2089,7 +2089,7 @@
           <a:p>
             <a:fld id="{BE6EE1F1-89EF-4B99-8B75-ED2C5A1BA4D9}" type="datetimeFigureOut">
               <a:rPr lang="en-US" smtClean="0"/>
-              <a:t>2/19/2018</a:t>
+              <a:t>2/22/2018</a:t>
             </a:fld>
             <a:endParaRPr lang="en-US"/>
           </a:p>
@@ -2400,7 +2400,7 @@
           <a:p>
             <a:fld id="{BE6EE1F1-89EF-4B99-8B75-ED2C5A1BA4D9}" type="datetimeFigureOut">
               <a:rPr lang="en-US" smtClean="0"/>
-              <a:t>2/19/2018</a:t>
+              <a:t>2/22/2018</a:t>
             </a:fld>
             <a:endParaRPr lang="en-US"/>
           </a:p>
@@ -2688,7 +2688,7 @@
           <a:p>
             <a:fld id="{BE6EE1F1-89EF-4B99-8B75-ED2C5A1BA4D9}" type="datetimeFigureOut">
               <a:rPr lang="en-US" smtClean="0"/>
-              <a:t>2/19/2018</a:t>
+              <a:t>2/22/2018</a:t>
             </a:fld>
             <a:endParaRPr lang="en-US"/>
           </a:p>
@@ -2929,7 +2929,7 @@
           <a:p>
             <a:fld id="{BE6EE1F1-89EF-4B99-8B75-ED2C5A1BA4D9}" type="datetimeFigureOut">
               <a:rPr lang="en-US" smtClean="0"/>
-              <a:t>2/19/2018</a:t>
+              <a:t>2/22/2018</a:t>
             </a:fld>
             <a:endParaRPr lang="en-US"/>
           </a:p>
@@ -3493,9 +3493,28 @@
         <p:spPr/>
         <p:txBody>
           <a:bodyPr>
-            <a:normAutofit lnSpcReduction="10000"/>
+            <a:normAutofit fontScale="85000" lnSpcReduction="20000"/>
           </a:bodyPr>
           <a:lstStyle/>
+          <a:p>
+            <a:pPr marL="0" indent="0">
+              <a:buNone/>
+            </a:pPr>
+            <a:r>
+              <a:rPr lang="en-US" sz="1600" dirty="0">
+                <a:latin typeface="Courier New" panose="02070309020205020404" pitchFamily="49" charset="0"/>
+                <a:cs typeface="Courier New" panose="02070309020205020404" pitchFamily="49" charset="0"/>
+              </a:rPr>
+              <a:t>[{"id":1,"username":"jason","email":"j@jayroman.com"},{"id":2,"username":"sloan","email":null]</a:t>
+            </a:r>
+            <a:endParaRPr lang="en-US" sz="1600" b="1" dirty="0">
+              <a:latin typeface="Courier New" panose="02070309020205020404" pitchFamily="49" charset="0"/>
+              <a:cs typeface="Courier New" panose="02070309020205020404" pitchFamily="49" charset="0"/>
+            </a:endParaRPr>
+          </a:p>
+          <a:p>
+            <a:endParaRPr lang="en-US" b="1" dirty="0"/>
+          </a:p>
           <a:p>
             <a:r>
               <a:rPr lang="en-US" b="1" dirty="0"/>
@@ -4965,86 +4984,76 @@
               </a:rPr>
               <a:t>http://sloan.jayroman.com</a:t>
             </a:r>
-            <a:r>
-              <a:rPr lang="en-US" dirty="0"/>
-              <a:t> / </a:t>
+            <a:endParaRPr lang="en-US" dirty="0"/>
+          </a:p>
+          <a:p>
+            <a:endParaRPr lang="en-US" dirty="0"/>
+          </a:p>
+          <a:p>
+            <a:r>
+              <a:rPr lang="en-US" dirty="0"/>
+              <a:t>You will need either of the following:</a:t>
+            </a:r>
+          </a:p>
+          <a:p>
+            <a:pPr lvl="1"/>
+            <a:r>
+              <a:rPr lang="en-US" dirty="0" err="1"/>
+              <a:t>cURL</a:t>
+            </a:r>
+            <a:r>
+              <a:rPr lang="en-US" dirty="0"/>
+              <a:t>: </a:t>
             </a:r>
             <a:r>
               <a:rPr lang="en-US" dirty="0">
                 <a:hlinkClick r:id="rId4"/>
               </a:rPr>
-              <a:t>http://sloan-client.jayroman.com</a:t>
+              <a:t>https://curl.haxx.se/download.html</a:t>
             </a:r>
             <a:endParaRPr lang="en-US" dirty="0"/>
           </a:p>
           <a:p>
+            <a:pPr lvl="1"/>
+            <a:r>
+              <a:rPr lang="en-US" dirty="0"/>
+              <a:t>Web browser REST client (Chrome extension: Yet Another REST Client)</a:t>
+            </a:r>
+          </a:p>
+          <a:p>
+            <a:pPr lvl="1"/>
             <a:endParaRPr lang="en-US" dirty="0"/>
           </a:p>
           <a:p>
             <a:r>
               <a:rPr lang="en-US" dirty="0"/>
-              <a:t>You will need either of the following:</a:t>
+              <a:t>Recommended:</a:t>
             </a:r>
           </a:p>
           <a:p>
             <a:pPr lvl="1"/>
             <a:r>
+              <a:rPr lang="en-US" dirty="0"/>
+              <a:t>Web browser JSON viewer (Chrome extension: </a:t>
+            </a:r>
+            <a:r>
               <a:rPr lang="en-US" dirty="0" err="1"/>
-              <a:t>cURL</a:t>
-            </a:r>
-            <a:r>
-              <a:rPr lang="en-US" dirty="0"/>
-              <a:t>: </a:t>
+              <a:t>JSONView</a:t>
+            </a:r>
+            <a:r>
+              <a:rPr lang="en-US" dirty="0"/>
+              <a:t>)</a:t>
+            </a:r>
+          </a:p>
+          <a:p>
+            <a:pPr lvl="1"/>
+            <a:r>
+              <a:rPr lang="en-US" dirty="0"/>
+              <a:t>Git: </a:t>
             </a:r>
             <a:r>
               <a:rPr lang="en-US" dirty="0">
                 <a:hlinkClick r:id="rId5"/>
-              </a:rPr>
-              <a:t>https://curl.haxx.se/download.html</a:t>
-            </a:r>
-            <a:endParaRPr lang="en-US" dirty="0"/>
-          </a:p>
-          <a:p>
-            <a:pPr lvl="1"/>
-            <a:r>
-              <a:rPr lang="en-US" dirty="0"/>
-              <a:t>Web browser REST client (Chrome extension: Yet Another REST Client)</a:t>
-            </a:r>
-          </a:p>
-          <a:p>
-            <a:pPr lvl="1"/>
-            <a:endParaRPr lang="en-US" dirty="0"/>
-          </a:p>
-          <a:p>
-            <a:r>
-              <a:rPr lang="en-US" dirty="0"/>
-              <a:t>Recommended:</a:t>
-            </a:r>
-          </a:p>
-          <a:p>
-            <a:pPr lvl="1"/>
-            <a:r>
-              <a:rPr lang="en-US" dirty="0"/>
-              <a:t>Web browser JSON viewer (Chrome extension: </a:t>
-            </a:r>
-            <a:r>
-              <a:rPr lang="en-US" dirty="0" err="1"/>
-              <a:t>JSONView</a:t>
-            </a:r>
-            <a:r>
-              <a:rPr lang="en-US" dirty="0"/>
-              <a:t>)</a:t>
-            </a:r>
-          </a:p>
-          <a:p>
-            <a:pPr lvl="1"/>
-            <a:r>
-              <a:rPr lang="en-US" dirty="0"/>
-              <a:t>Git: </a:t>
-            </a:r>
-            <a:r>
-              <a:rPr lang="en-US" dirty="0">
-                <a:hlinkClick r:id="rId6"/>
               </a:rPr>
               <a:t>https://git-scm.com/downloads</a:t>
             </a:r>
@@ -5434,8 +5443,8 @@
         </p:nvSpPr>
         <p:spPr>
           <a:xfrm>
-            <a:off x="4634140" y="1522938"/>
-            <a:ext cx="1912703" cy="338554"/>
+            <a:off x="3685161" y="1548293"/>
+            <a:ext cx="3810659" cy="276999"/>
           </a:xfrm>
           <a:prstGeom prst="rect">
             <a:avLst/>
@@ -5449,25 +5458,11 @@
           <a:lstStyle/>
           <a:p>
             <a:r>
-              <a:rPr lang="en-US" sz="1600" dirty="0">
+              <a:rPr lang="en-US" sz="1200" dirty="0">
                 <a:latin typeface="Courier New" panose="02070309020205020404" pitchFamily="49" charset="0"/>
                 <a:cs typeface="Courier New" panose="02070309020205020404" pitchFamily="49" charset="0"/>
               </a:rPr>
-              <a:t>GET /</a:t>
-            </a:r>
-            <a:r>
-              <a:rPr lang="en-US" sz="1600" dirty="0" err="1">
-                <a:latin typeface="Courier New" panose="02070309020205020404" pitchFamily="49" charset="0"/>
-                <a:cs typeface="Courier New" panose="02070309020205020404" pitchFamily="49" charset="0"/>
-              </a:rPr>
-              <a:t>api</a:t>
-            </a:r>
-            <a:r>
-              <a:rPr lang="en-US" sz="1600" dirty="0">
-                <a:latin typeface="Courier New" panose="02070309020205020404" pitchFamily="49" charset="0"/>
-                <a:cs typeface="Courier New" panose="02070309020205020404" pitchFamily="49" charset="0"/>
-              </a:rPr>
-              <a:t>/users</a:t>
+              <a:t>GET http://sloan.jayroman.com/api/users</a:t>
             </a:r>
           </a:p>
         </p:txBody>
@@ -5486,7 +5481,7 @@
         </p:nvSpPr>
         <p:spPr>
           <a:xfrm>
-            <a:off x="3801771" y="2554724"/>
+            <a:off x="3685161" y="2554724"/>
             <a:ext cx="4011034" cy="338554"/>
           </a:xfrm>
           <a:prstGeom prst="rect">
@@ -5519,7 +5514,7 @@
                 <a:latin typeface="Courier New" panose="02070309020205020404" pitchFamily="49" charset="0"/>
                 <a:cs typeface="Courier New" panose="02070309020205020404" pitchFamily="49" charset="0"/>
               </a:rPr>
-              <a:t>'}, …]</a:t>
+              <a:t>’}, …]</a:t>
             </a:r>
           </a:p>
         </p:txBody>
@@ -5726,6 +5721,41 @@
           </a:p>
         </p:txBody>
       </p:sp>
+      <p:sp>
+        <p:nvSpPr>
+          <p:cNvPr id="2" name="TextBox 1">
+            <a:extLst>
+              <a:ext uri="{FF2B5EF4-FFF2-40B4-BE49-F238E27FC236}">
+                <a16:creationId xmlns:a16="http://schemas.microsoft.com/office/drawing/2014/main" id="{98629567-1CB5-42BD-B165-6C14EEA84C3B}"/>
+              </a:ext>
+            </a:extLst>
+          </p:cNvPr>
+          <p:cNvSpPr txBox="1"/>
+          <p:nvPr/>
+        </p:nvSpPr>
+        <p:spPr>
+          <a:xfrm>
+            <a:off x="670269" y="5131660"/>
+            <a:ext cx="3972498" cy="369332"/>
+          </a:xfrm>
+          <a:prstGeom prst="rect">
+            <a:avLst/>
+          </a:prstGeom>
+          <a:noFill/>
+        </p:spPr>
+        <p:txBody>
+          <a:bodyPr wrap="none" rtlCol="0">
+            <a:spAutoFit/>
+          </a:bodyPr>
+          <a:lstStyle/>
+          <a:p>
+            <a:r>
+              <a:rPr lang="en-US" dirty="0"/>
+              <a:t>(some assembly/programming required)</a:t>
+            </a:r>
+          </a:p>
+        </p:txBody>
+      </p:sp>
     </p:spTree>
     <p:extLst>
       <p:ext uri="{BB962C8B-B14F-4D97-AF65-F5344CB8AC3E}">
@@ -6515,23 +6545,17 @@
                 <a:ea typeface="Hack" panose="020B0609030202020204" pitchFamily="49" charset="0"/>
                 <a:cs typeface="Courier New" panose="02070309020205020404" pitchFamily="49" charset="0"/>
               </a:rPr>
-              <a:t>GET    /</a:t>
-            </a:r>
-            <a:r>
-              <a:rPr lang="en-US" sz="2200" dirty="0" err="1">
-                <a:latin typeface="Courier New" panose="02070309020205020404" pitchFamily="49" charset="0"/>
-                <a:ea typeface="Hack" panose="020B0609030202020204" pitchFamily="49" charset="0"/>
-                <a:cs typeface="Courier New" panose="02070309020205020404" pitchFamily="49" charset="0"/>
-              </a:rPr>
-              <a:t>api</a:t>
-            </a:r>
+              <a:t>GET    http://sloan.jayroman.com/api/users/{id}</a:t>
+            </a:r>
+          </a:p>
+          <a:p>
             <a:r>
               <a:rPr lang="en-US" sz="2200" dirty="0">
                 <a:latin typeface="Courier New" panose="02070309020205020404" pitchFamily="49" charset="0"/>
                 <a:ea typeface="Hack" panose="020B0609030202020204" pitchFamily="49" charset="0"/>
                 <a:cs typeface="Courier New" panose="02070309020205020404" pitchFamily="49" charset="0"/>
               </a:rPr>
-              <a:t>/users/{id}</a:t>
+              <a:t>PUT    http://sloan.jayroman.com/api/users/{id}</a:t>
             </a:r>
           </a:p>
           <a:p>
@@ -6541,23 +6565,17 @@
                 <a:ea typeface="Hack" panose="020B0609030202020204" pitchFamily="49" charset="0"/>
                 <a:cs typeface="Courier New" panose="02070309020205020404" pitchFamily="49" charset="0"/>
               </a:rPr>
-              <a:t>PUT    /</a:t>
-            </a:r>
-            <a:r>
-              <a:rPr lang="en-US" sz="2200" dirty="0" err="1">
-                <a:latin typeface="Courier New" panose="02070309020205020404" pitchFamily="49" charset="0"/>
-                <a:ea typeface="Hack" panose="020B0609030202020204" pitchFamily="49" charset="0"/>
-                <a:cs typeface="Courier New" panose="02070309020205020404" pitchFamily="49" charset="0"/>
-              </a:rPr>
-              <a:t>api</a:t>
-            </a:r>
+              <a:t>PATCH  http://sloan.jayroman.com/api/users/{id}</a:t>
+            </a:r>
+          </a:p>
+          <a:p>
             <a:r>
               <a:rPr lang="en-US" sz="2200" dirty="0">
                 <a:latin typeface="Courier New" panose="02070309020205020404" pitchFamily="49" charset="0"/>
                 <a:ea typeface="Hack" panose="020B0609030202020204" pitchFamily="49" charset="0"/>
                 <a:cs typeface="Courier New" panose="02070309020205020404" pitchFamily="49" charset="0"/>
               </a:rPr>
-              <a:t>/users/{id}</a:t>
+              <a:t>DELETE http://sloan.jayroman.com/api/users/{id}</a:t>
             </a:r>
           </a:p>
           <a:p>
@@ -6567,75 +6585,7 @@
                 <a:ea typeface="Hack" panose="020B0609030202020204" pitchFamily="49" charset="0"/>
                 <a:cs typeface="Courier New" panose="02070309020205020404" pitchFamily="49" charset="0"/>
               </a:rPr>
-              <a:t>PATCH  /</a:t>
-            </a:r>
-            <a:r>
-              <a:rPr lang="en-US" sz="2200" dirty="0" err="1">
-                <a:latin typeface="Courier New" panose="02070309020205020404" pitchFamily="49" charset="0"/>
-                <a:ea typeface="Hack" panose="020B0609030202020204" pitchFamily="49" charset="0"/>
-                <a:cs typeface="Courier New" panose="02070309020205020404" pitchFamily="49" charset="0"/>
-              </a:rPr>
-              <a:t>api</a:t>
-            </a:r>
-            <a:r>
-              <a:rPr lang="en-US" sz="2200" dirty="0">
-                <a:latin typeface="Courier New" panose="02070309020205020404" pitchFamily="49" charset="0"/>
-                <a:ea typeface="Hack" panose="020B0609030202020204" pitchFamily="49" charset="0"/>
-                <a:cs typeface="Courier New" panose="02070309020205020404" pitchFamily="49" charset="0"/>
-              </a:rPr>
-              <a:t>/users/{id}</a:t>
-            </a:r>
-          </a:p>
-          <a:p>
-            <a:r>
-              <a:rPr lang="en-US" sz="2200" dirty="0">
-                <a:latin typeface="Courier New" panose="02070309020205020404" pitchFamily="49" charset="0"/>
-                <a:ea typeface="Hack" panose="020B0609030202020204" pitchFamily="49" charset="0"/>
-                <a:cs typeface="Courier New" panose="02070309020205020404" pitchFamily="49" charset="0"/>
-              </a:rPr>
-              <a:t>DELETE /</a:t>
-            </a:r>
-            <a:r>
-              <a:rPr lang="en-US" sz="2200" dirty="0" err="1">
-                <a:latin typeface="Courier New" panose="02070309020205020404" pitchFamily="49" charset="0"/>
-                <a:ea typeface="Hack" panose="020B0609030202020204" pitchFamily="49" charset="0"/>
-                <a:cs typeface="Courier New" panose="02070309020205020404" pitchFamily="49" charset="0"/>
-              </a:rPr>
-              <a:t>api</a:t>
-            </a:r>
-            <a:r>
-              <a:rPr lang="en-US" sz="2200" dirty="0">
-                <a:latin typeface="Courier New" panose="02070309020205020404" pitchFamily="49" charset="0"/>
-                <a:ea typeface="Hack" panose="020B0609030202020204" pitchFamily="49" charset="0"/>
-                <a:cs typeface="Courier New" panose="02070309020205020404" pitchFamily="49" charset="0"/>
-              </a:rPr>
-              <a:t>/users/{id}</a:t>
-            </a:r>
-          </a:p>
-          <a:p>
-            <a:r>
-              <a:rPr lang="en-US" sz="2200" dirty="0">
-                <a:latin typeface="Courier New" panose="02070309020205020404" pitchFamily="49" charset="0"/>
-                <a:ea typeface="Hack" panose="020B0609030202020204" pitchFamily="49" charset="0"/>
-                <a:cs typeface="Courier New" panose="02070309020205020404" pitchFamily="49" charset="0"/>
-              </a:rPr>
-              <a:t>POST   /</a:t>
-            </a:r>
-            <a:r>
-              <a:rPr lang="en-US" sz="2200" dirty="0" err="1">
-                <a:latin typeface="Courier New" panose="02070309020205020404" pitchFamily="49" charset="0"/>
-                <a:ea typeface="Hack" panose="020B0609030202020204" pitchFamily="49" charset="0"/>
-                <a:cs typeface="Courier New" panose="02070309020205020404" pitchFamily="49" charset="0"/>
-              </a:rPr>
-              <a:t>api</a:t>
-            </a:r>
-            <a:r>
-              <a:rPr lang="en-US" sz="2200" dirty="0">
-                <a:latin typeface="Courier New" panose="02070309020205020404" pitchFamily="49" charset="0"/>
-                <a:ea typeface="Hack" panose="020B0609030202020204" pitchFamily="49" charset="0"/>
-                <a:cs typeface="Courier New" panose="02070309020205020404" pitchFamily="49" charset="0"/>
-              </a:rPr>
-              <a:t>/users</a:t>
+              <a:t>POST   http://sloan.jayroman.com/api/users</a:t>
             </a:r>
           </a:p>
           <a:p>

</xml_diff>